<commit_message>
Updating selenium 1 slides
</commit_message>
<xml_diff>
--- a/tyler/meena/cs320/s23/lec/15-graphsearch2/slides.pptx
+++ b/tyler/meena/cs320/s23/lec/15-graphsearch2/slides.pptx
@@ -334,6 +334,11 @@
       </a:defRPr>
     </a:lvl9pPr>
   </p:defaultTextStyle>
+  <p:extLst>
+    <p:ext uri="{EFAFB233-063F-42B5-8137-9DF3F51BA10A}">
+      <p15:sldGuideLst xmlns:p15="http://schemas.microsoft.com/office/powerpoint/2012/main"/>
+    </p:ext>
+  </p:extLst>
 </p:presentation>
 </file>
 
@@ -697,143 +702,6 @@
 
 <file path=ppt/slideLayouts/slideLayout10.xml><?xml version="1.0" encoding="utf-8"?>
 <p:sldLayout xmlns:a="http://schemas.openxmlformats.org/drawingml/2006/main" xmlns:r="http://schemas.openxmlformats.org/officeDocument/2006/relationships" xmlns:p="http://schemas.openxmlformats.org/presentationml/2006/main" type="tx">
-  <p:cSld name="Quote">
-    <p:spTree>
-      <p:nvGrpSpPr>
-        <p:cNvPr id="1" name=""/>
-        <p:cNvGrpSpPr/>
-        <p:nvPr/>
-      </p:nvGrpSpPr>
-      <p:grpSpPr>
-        <a:xfrm>
-          <a:off x="0" y="0"/>
-          <a:ext cx="0" cy="0"/>
-          <a:chOff x="0" y="0"/>
-          <a:chExt cx="0" cy="0"/>
-        </a:xfrm>
-      </p:grpSpPr>
-      <p:sp>
-        <p:nvSpPr>
-          <p:cNvPr id="93" name="–Johnny Appleseed"/>
-          <p:cNvSpPr txBox="1">
-            <a:spLocks noGrp="1"/>
-          </p:cNvSpPr>
-          <p:nvPr>
-            <p:ph type="body" sz="quarter" idx="21"/>
-          </p:nvPr>
-        </p:nvSpPr>
-        <p:spPr>
-          <a:xfrm>
-            <a:off x="1270000" y="6362700"/>
-            <a:ext cx="10464800" cy="457200"/>
-          </a:xfrm>
-          <a:prstGeom prst="rect">
-            <a:avLst/>
-          </a:prstGeom>
-        </p:spPr>
-        <p:txBody>
-          <a:bodyPr anchor="t">
-            <a:spAutoFit/>
-          </a:bodyPr>
-          <a:lstStyle>
-            <a:lvl1pPr marL="0" indent="0" algn="ctr">
-              <a:spcBef>
-                <a:spcPts val="0"/>
-              </a:spcBef>
-              <a:buSzTx/>
-              <a:buNone/>
-              <a:defRPr sz="2400" i="1"/>
-            </a:lvl1pPr>
-          </a:lstStyle>
-          <a:p>
-            <a:r>
-              <a:t>–Johnny Appleseed</a:t>
-            </a:r>
-          </a:p>
-        </p:txBody>
-      </p:sp>
-      <p:sp>
-        <p:nvSpPr>
-          <p:cNvPr id="94" name="“Type a quote here.”"/>
-          <p:cNvSpPr txBox="1">
-            <a:spLocks noGrp="1"/>
-          </p:cNvSpPr>
-          <p:nvPr>
-            <p:ph type="body" sz="quarter" idx="22"/>
-          </p:nvPr>
-        </p:nvSpPr>
-        <p:spPr>
-          <a:xfrm>
-            <a:off x="1270000" y="4260849"/>
-            <a:ext cx="10464800" cy="622301"/>
-          </a:xfrm>
-          <a:prstGeom prst="rect">
-            <a:avLst/>
-          </a:prstGeom>
-        </p:spPr>
-        <p:txBody>
-          <a:bodyPr>
-            <a:spAutoFit/>
-          </a:bodyPr>
-          <a:lstStyle>
-            <a:lvl1pPr marL="0" indent="0" algn="ctr">
-              <a:spcBef>
-                <a:spcPts val="0"/>
-              </a:spcBef>
-              <a:buSzTx/>
-              <a:buNone/>
-              <a:defRPr sz="3400">
-                <a:latin typeface="+mn-lt"/>
-                <a:ea typeface="+mn-ea"/>
-                <a:cs typeface="+mn-cs"/>
-                <a:sym typeface="Gill Sans SemiBold"/>
-              </a:defRPr>
-            </a:lvl1pPr>
-          </a:lstStyle>
-          <a:p>
-            <a:r>
-              <a:t>“Type a quote here.” </a:t>
-            </a:r>
-          </a:p>
-        </p:txBody>
-      </p:sp>
-      <p:sp>
-        <p:nvSpPr>
-          <p:cNvPr id="95" name="Slide Number"/>
-          <p:cNvSpPr txBox="1">
-            <a:spLocks noGrp="1"/>
-          </p:cNvSpPr>
-          <p:nvPr>
-            <p:ph type="sldNum" sz="quarter" idx="2"/>
-          </p:nvPr>
-        </p:nvSpPr>
-        <p:spPr>
-          <a:prstGeom prst="rect">
-            <a:avLst/>
-          </a:prstGeom>
-        </p:spPr>
-        <p:txBody>
-          <a:bodyPr/>
-          <a:lstStyle/>
-          <a:p>
-            <a:fld id="{86CB4B4D-7CA3-9044-876B-883B54F8677D}" type="slidenum">
-              <a:t>‹#›</a:t>
-            </a:fld>
-            <a:endParaRPr/>
-          </a:p>
-        </p:txBody>
-      </p:sp>
-    </p:spTree>
-  </p:cSld>
-  <p:clrMapOvr>
-    <a:masterClrMapping/>
-  </p:clrMapOvr>
-  <p:transition spd="med"/>
-</p:sldLayout>
-</file>
-
-<file path=ppt/slideLayouts/slideLayout11.xml><?xml version="1.0" encoding="utf-8"?>
-<p:sldLayout xmlns:a="http://schemas.openxmlformats.org/drawingml/2006/main" xmlns:r="http://schemas.openxmlformats.org/officeDocument/2006/relationships" xmlns:p="http://schemas.openxmlformats.org/presentationml/2006/main" type="tx">
   <p:cSld name="Photo">
     <p:spTree>
       <p:nvGrpSpPr>
@@ -913,7 +781,7 @@
 </p:sldLayout>
 </file>
 
-<file path=ppt/slideLayouts/slideLayout12.xml><?xml version="1.0" encoding="utf-8"?>
+<file path=ppt/slideLayouts/slideLayout11.xml><?xml version="1.0" encoding="utf-8"?>
 <p:sldLayout xmlns:a="http://schemas.openxmlformats.org/drawingml/2006/main" xmlns:r="http://schemas.openxmlformats.org/officeDocument/2006/relationships" xmlns:p="http://schemas.openxmlformats.org/presentationml/2006/main" type="tx">
   <p:cSld name="Blank">
     <p:spTree>
@@ -965,7 +833,7 @@
 </p:sldLayout>
 </file>
 
-<file path=ppt/slideLayouts/slideLayout13.xml><?xml version="1.0" encoding="utf-8"?>
+<file path=ppt/slideLayouts/slideLayout12.xml><?xml version="1.0" encoding="utf-8"?>
 <p:sldLayout xmlns:a="http://schemas.openxmlformats.org/drawingml/2006/main" xmlns:r="http://schemas.openxmlformats.org/officeDocument/2006/relationships" xmlns:p="http://schemas.openxmlformats.org/presentationml/2006/main" type="tx">
   <p:cSld name="Title &amp; Bullets">
     <p:spTree>
@@ -1104,7 +972,7 @@
 </p:sldLayout>
 </file>
 
-<file path=ppt/slideLayouts/slideLayout14.xml><?xml version="1.0" encoding="utf-8"?>
+<file path=ppt/slideLayouts/slideLayout13.xml><?xml version="1.0" encoding="utf-8"?>
 <p:sldLayout xmlns:a="http://schemas.openxmlformats.org/drawingml/2006/main" xmlns:r="http://schemas.openxmlformats.org/officeDocument/2006/relationships" xmlns:p="http://schemas.openxmlformats.org/presentationml/2006/main" type="tx">
   <p:cSld name="Title &amp; Bullets">
     <p:spTree>
@@ -1811,182 +1679,6 @@
 
 <file path=ppt/slideLayouts/slideLayout6.xml><?xml version="1.0" encoding="utf-8"?>
 <p:sldLayout xmlns:a="http://schemas.openxmlformats.org/drawingml/2006/main" xmlns:r="http://schemas.openxmlformats.org/officeDocument/2006/relationships" xmlns:p="http://schemas.openxmlformats.org/presentationml/2006/main" type="tx">
-  <p:cSld name="Title &amp; Bullets">
-    <p:spTree>
-      <p:nvGrpSpPr>
-        <p:cNvPr id="1" name=""/>
-        <p:cNvGrpSpPr/>
-        <p:nvPr/>
-      </p:nvGrpSpPr>
-      <p:grpSpPr>
-        <a:xfrm>
-          <a:off x="0" y="0"/>
-          <a:ext cx="0" cy="0"/>
-          <a:chOff x="0" y="0"/>
-          <a:chExt cx="0" cy="0"/>
-        </a:xfrm>
-      </p:grpSpPr>
-      <p:sp>
-        <p:nvSpPr>
-          <p:cNvPr id="56" name="Title Text"/>
-          <p:cNvSpPr txBox="1">
-            <a:spLocks noGrp="1"/>
-          </p:cNvSpPr>
-          <p:nvPr>
-            <p:ph type="title"/>
-          </p:nvPr>
-        </p:nvSpPr>
-        <p:spPr>
-          <a:prstGeom prst="rect">
-            <a:avLst/>
-          </a:prstGeom>
-        </p:spPr>
-        <p:txBody>
-          <a:bodyPr/>
-          <a:lstStyle>
-            <a:lvl1pPr>
-              <a:defRPr>
-                <a:latin typeface="Gill Sans Light"/>
-                <a:ea typeface="Gill Sans Light"/>
-                <a:cs typeface="Gill Sans Light"/>
-                <a:sym typeface="Gill Sans Light"/>
-              </a:defRPr>
-            </a:lvl1pPr>
-          </a:lstStyle>
-          <a:p>
-            <a:r>
-              <a:t>Title Text</a:t>
-            </a:r>
-          </a:p>
-        </p:txBody>
-      </p:sp>
-      <p:sp>
-        <p:nvSpPr>
-          <p:cNvPr id="57" name="Body Level One…"/>
-          <p:cNvSpPr txBox="1">
-            <a:spLocks noGrp="1"/>
-          </p:cNvSpPr>
-          <p:nvPr>
-            <p:ph type="body" idx="1"/>
-          </p:nvPr>
-        </p:nvSpPr>
-        <p:spPr>
-          <a:prstGeom prst="rect">
-            <a:avLst/>
-          </a:prstGeom>
-        </p:spPr>
-        <p:txBody>
-          <a:bodyPr/>
-          <a:lstStyle>
-            <a:lvl1pPr>
-              <a:defRPr>
-                <a:latin typeface="Gill Sans Light"/>
-                <a:ea typeface="Gill Sans Light"/>
-                <a:cs typeface="Gill Sans Light"/>
-                <a:sym typeface="Gill Sans Light"/>
-              </a:defRPr>
-            </a:lvl1pPr>
-            <a:lvl2pPr>
-              <a:defRPr>
-                <a:latin typeface="Gill Sans Light"/>
-                <a:ea typeface="Gill Sans Light"/>
-                <a:cs typeface="Gill Sans Light"/>
-                <a:sym typeface="Gill Sans Light"/>
-              </a:defRPr>
-            </a:lvl2pPr>
-            <a:lvl3pPr>
-              <a:defRPr>
-                <a:latin typeface="Gill Sans Light"/>
-                <a:ea typeface="Gill Sans Light"/>
-                <a:cs typeface="Gill Sans Light"/>
-                <a:sym typeface="Gill Sans Light"/>
-              </a:defRPr>
-            </a:lvl3pPr>
-            <a:lvl4pPr>
-              <a:defRPr>
-                <a:latin typeface="Gill Sans Light"/>
-                <a:ea typeface="Gill Sans Light"/>
-                <a:cs typeface="Gill Sans Light"/>
-                <a:sym typeface="Gill Sans Light"/>
-              </a:defRPr>
-            </a:lvl4pPr>
-            <a:lvl5pPr>
-              <a:defRPr>
-                <a:latin typeface="Gill Sans Light"/>
-                <a:ea typeface="Gill Sans Light"/>
-                <a:cs typeface="Gill Sans Light"/>
-                <a:sym typeface="Gill Sans Light"/>
-              </a:defRPr>
-            </a:lvl5pPr>
-          </a:lstStyle>
-          <a:p>
-            <a:r>
-              <a:t>Body Level One</a:t>
-            </a:r>
-          </a:p>
-          <a:p>
-            <a:pPr lvl="1"/>
-            <a:r>
-              <a:t>Body Level Two</a:t>
-            </a:r>
-          </a:p>
-          <a:p>
-            <a:pPr lvl="2"/>
-            <a:r>
-              <a:t>Body Level Three</a:t>
-            </a:r>
-          </a:p>
-          <a:p>
-            <a:pPr lvl="3"/>
-            <a:r>
-              <a:t>Body Level Four</a:t>
-            </a:r>
-          </a:p>
-          <a:p>
-            <a:pPr lvl="4"/>
-            <a:r>
-              <a:t>Body Level Five</a:t>
-            </a:r>
-          </a:p>
-        </p:txBody>
-      </p:sp>
-      <p:sp>
-        <p:nvSpPr>
-          <p:cNvPr id="58" name="Slide Number"/>
-          <p:cNvSpPr txBox="1">
-            <a:spLocks noGrp="1"/>
-          </p:cNvSpPr>
-          <p:nvPr>
-            <p:ph type="sldNum" sz="quarter" idx="2"/>
-          </p:nvPr>
-        </p:nvSpPr>
-        <p:spPr>
-          <a:prstGeom prst="rect">
-            <a:avLst/>
-          </a:prstGeom>
-        </p:spPr>
-        <p:txBody>
-          <a:bodyPr/>
-          <a:lstStyle/>
-          <a:p>
-            <a:fld id="{86CB4B4D-7CA3-9044-876B-883B54F8677D}" type="slidenum">
-              <a:t>‹#›</a:t>
-            </a:fld>
-            <a:endParaRPr/>
-          </a:p>
-        </p:txBody>
-      </p:sp>
-    </p:spTree>
-  </p:cSld>
-  <p:clrMapOvr>
-    <a:masterClrMapping/>
-  </p:clrMapOvr>
-  <p:transition spd="med"/>
-</p:sldLayout>
-</file>
-
-<file path=ppt/slideLayouts/slideLayout7.xml><?xml version="1.0" encoding="utf-8"?>
-<p:sldLayout xmlns:a="http://schemas.openxmlformats.org/drawingml/2006/main" xmlns:r="http://schemas.openxmlformats.org/officeDocument/2006/relationships" xmlns:p="http://schemas.openxmlformats.org/presentationml/2006/main" type="tx">
   <p:cSld name="Title, Bullets &amp; Photo">
     <p:spTree>
       <p:nvGrpSpPr>
@@ -2175,7 +1867,7 @@
 </p:sldLayout>
 </file>
 
-<file path=ppt/slideLayouts/slideLayout8.xml><?xml version="1.0" encoding="utf-8"?>
+<file path=ppt/slideLayouts/slideLayout7.xml><?xml version="1.0" encoding="utf-8"?>
 <p:sldLayout xmlns:a="http://schemas.openxmlformats.org/drawingml/2006/main" xmlns:r="http://schemas.openxmlformats.org/officeDocument/2006/relationships" xmlns:p="http://schemas.openxmlformats.org/presentationml/2006/main" type="tx">
   <p:cSld name="Bullets">
     <p:spTree>
@@ -2280,7 +1972,7 @@
 </p:sldLayout>
 </file>
 
-<file path=ppt/slideLayouts/slideLayout9.xml><?xml version="1.0" encoding="utf-8"?>
+<file path=ppt/slideLayouts/slideLayout8.xml><?xml version="1.0" encoding="utf-8"?>
 <p:sldLayout xmlns:a="http://schemas.openxmlformats.org/drawingml/2006/main" xmlns:r="http://schemas.openxmlformats.org/officeDocument/2006/relationships" xmlns:p="http://schemas.openxmlformats.org/presentationml/2006/main" type="tx">
   <p:cSld name="Photo - 3 Up">
     <p:spTree>
@@ -2387,6 +2079,143 @@
       <p:sp>
         <p:nvSpPr>
           <p:cNvPr id="86" name="Slide Number"/>
+          <p:cNvSpPr txBox="1">
+            <a:spLocks noGrp="1"/>
+          </p:cNvSpPr>
+          <p:nvPr>
+            <p:ph type="sldNum" sz="quarter" idx="2"/>
+          </p:nvPr>
+        </p:nvSpPr>
+        <p:spPr>
+          <a:prstGeom prst="rect">
+            <a:avLst/>
+          </a:prstGeom>
+        </p:spPr>
+        <p:txBody>
+          <a:bodyPr/>
+          <a:lstStyle/>
+          <a:p>
+            <a:fld id="{86CB4B4D-7CA3-9044-876B-883B54F8677D}" type="slidenum">
+              <a:t>‹#›</a:t>
+            </a:fld>
+            <a:endParaRPr/>
+          </a:p>
+        </p:txBody>
+      </p:sp>
+    </p:spTree>
+  </p:cSld>
+  <p:clrMapOvr>
+    <a:masterClrMapping/>
+  </p:clrMapOvr>
+  <p:transition spd="med"/>
+</p:sldLayout>
+</file>
+
+<file path=ppt/slideLayouts/slideLayout9.xml><?xml version="1.0" encoding="utf-8"?>
+<p:sldLayout xmlns:a="http://schemas.openxmlformats.org/drawingml/2006/main" xmlns:r="http://schemas.openxmlformats.org/officeDocument/2006/relationships" xmlns:p="http://schemas.openxmlformats.org/presentationml/2006/main" type="tx">
+  <p:cSld name="Quote">
+    <p:spTree>
+      <p:nvGrpSpPr>
+        <p:cNvPr id="1" name=""/>
+        <p:cNvGrpSpPr/>
+        <p:nvPr/>
+      </p:nvGrpSpPr>
+      <p:grpSpPr>
+        <a:xfrm>
+          <a:off x="0" y="0"/>
+          <a:ext cx="0" cy="0"/>
+          <a:chOff x="0" y="0"/>
+          <a:chExt cx="0" cy="0"/>
+        </a:xfrm>
+      </p:grpSpPr>
+      <p:sp>
+        <p:nvSpPr>
+          <p:cNvPr id="93" name="–Johnny Appleseed"/>
+          <p:cNvSpPr txBox="1">
+            <a:spLocks noGrp="1"/>
+          </p:cNvSpPr>
+          <p:nvPr>
+            <p:ph type="body" sz="quarter" idx="21"/>
+          </p:nvPr>
+        </p:nvSpPr>
+        <p:spPr>
+          <a:xfrm>
+            <a:off x="1270000" y="6362700"/>
+            <a:ext cx="10464800" cy="457200"/>
+          </a:xfrm>
+          <a:prstGeom prst="rect">
+            <a:avLst/>
+          </a:prstGeom>
+        </p:spPr>
+        <p:txBody>
+          <a:bodyPr anchor="t">
+            <a:spAutoFit/>
+          </a:bodyPr>
+          <a:lstStyle>
+            <a:lvl1pPr marL="0" indent="0" algn="ctr">
+              <a:spcBef>
+                <a:spcPts val="0"/>
+              </a:spcBef>
+              <a:buSzTx/>
+              <a:buNone/>
+              <a:defRPr sz="2400" i="1"/>
+            </a:lvl1pPr>
+          </a:lstStyle>
+          <a:p>
+            <a:r>
+              <a:t>–Johnny Appleseed</a:t>
+            </a:r>
+          </a:p>
+        </p:txBody>
+      </p:sp>
+      <p:sp>
+        <p:nvSpPr>
+          <p:cNvPr id="94" name="“Type a quote here.”"/>
+          <p:cNvSpPr txBox="1">
+            <a:spLocks noGrp="1"/>
+          </p:cNvSpPr>
+          <p:nvPr>
+            <p:ph type="body" sz="quarter" idx="22"/>
+          </p:nvPr>
+        </p:nvSpPr>
+        <p:spPr>
+          <a:xfrm>
+            <a:off x="1270000" y="4260849"/>
+            <a:ext cx="10464800" cy="622301"/>
+          </a:xfrm>
+          <a:prstGeom prst="rect">
+            <a:avLst/>
+          </a:prstGeom>
+        </p:spPr>
+        <p:txBody>
+          <a:bodyPr>
+            <a:spAutoFit/>
+          </a:bodyPr>
+          <a:lstStyle>
+            <a:lvl1pPr marL="0" indent="0" algn="ctr">
+              <a:spcBef>
+                <a:spcPts val="0"/>
+              </a:spcBef>
+              <a:buSzTx/>
+              <a:buNone/>
+              <a:defRPr sz="3400">
+                <a:latin typeface="+mn-lt"/>
+                <a:ea typeface="+mn-ea"/>
+                <a:cs typeface="+mn-cs"/>
+                <a:sym typeface="Gill Sans SemiBold"/>
+              </a:defRPr>
+            </a:lvl1pPr>
+          </a:lstStyle>
+          <a:p>
+            <a:r>
+              <a:t>“Type a quote here.” </a:t>
+            </a:r>
+          </a:p>
+        </p:txBody>
+      </p:sp>
+      <p:sp>
+        <p:nvSpPr>
+          <p:cNvPr id="95" name="Slide Number"/>
           <p:cNvSpPr txBox="1">
             <a:spLocks noGrp="1"/>
           </p:cNvSpPr>
@@ -2467,7 +2296,7 @@
           </a:ln>
           <a:extLst>
             <a:ext uri="{C572A759-6A51-4108-AA02-DFA0A04FC94B}">
-              <ma14:wrappingTextBoxFlag xmlns:ma14="http://schemas.microsoft.com/office/mac/drawingml/2011/main" xmlns:a14="http://schemas.microsoft.com/office/drawing/2010/main" xmlns:m="http://schemas.openxmlformats.org/officeDocument/2006/math" xmlns="" val="1"/>
+              <ma14:wrappingTextBoxFlag xmlns="" xmlns:m="http://schemas.openxmlformats.org/officeDocument/2006/math" xmlns:a14="http://schemas.microsoft.com/office/drawing/2010/main" xmlns:ma14="http://schemas.microsoft.com/office/mac/drawingml/2011/main" val="1"/>
             </a:ext>
           </a:extLst>
         </p:spPr>
@@ -2506,7 +2335,7 @@
           </a:ln>
           <a:extLst>
             <a:ext uri="{C572A759-6A51-4108-AA02-DFA0A04FC94B}">
-              <ma14:wrappingTextBoxFlag xmlns:ma14="http://schemas.microsoft.com/office/mac/drawingml/2011/main" xmlns:a14="http://schemas.microsoft.com/office/drawing/2010/main" xmlns:m="http://schemas.openxmlformats.org/officeDocument/2006/math" xmlns="" val="1"/>
+              <ma14:wrappingTextBoxFlag xmlns="" xmlns:m="http://schemas.openxmlformats.org/officeDocument/2006/math" xmlns:a14="http://schemas.microsoft.com/office/drawing/2010/main" xmlns:ma14="http://schemas.microsoft.com/office/mac/drawingml/2011/main" val="1"/>
             </a:ext>
           </a:extLst>
         </p:spPr>
@@ -2594,15 +2423,14 @@
     <p:sldLayoutId id="2147483651" r:id="rId3"/>
     <p:sldLayoutId id="2147483652" r:id="rId4"/>
     <p:sldLayoutId id="2147483653" r:id="rId5"/>
-    <p:sldLayoutId id="2147483654" r:id="rId6"/>
-    <p:sldLayoutId id="2147483655" r:id="rId7"/>
-    <p:sldLayoutId id="2147483656" r:id="rId8"/>
-    <p:sldLayoutId id="2147483657" r:id="rId9"/>
-    <p:sldLayoutId id="2147483658" r:id="rId10"/>
-    <p:sldLayoutId id="2147483659" r:id="rId11"/>
-    <p:sldLayoutId id="2147483660" r:id="rId12"/>
-    <p:sldLayoutId id="2147483661" r:id="rId13"/>
-    <p:sldLayoutId id="2147483662" r:id="rId14"/>
+    <p:sldLayoutId id="2147483655" r:id="rId6"/>
+    <p:sldLayoutId id="2147483656" r:id="rId7"/>
+    <p:sldLayoutId id="2147483657" r:id="rId8"/>
+    <p:sldLayoutId id="2147483658" r:id="rId9"/>
+    <p:sldLayoutId id="2147483659" r:id="rId10"/>
+    <p:sldLayoutId id="2147483660" r:id="rId11"/>
+    <p:sldLayoutId id="2147483661" r:id="rId12"/>
+    <p:sldLayoutId id="2147483662" r:id="rId13"/>
   </p:sldLayoutIdLst>
   <p:transition spd="med"/>
   <p:txStyles>
@@ -3698,7 +3526,7 @@
           </a:ln>
           <a:extLst>
             <a:ext uri="{C572A759-6A51-4108-AA02-DFA0A04FC94B}">
-              <ma14:wrappingTextBoxFlag xmlns:ma14="http://schemas.microsoft.com/office/mac/drawingml/2011/main" xmlns:a14="http://schemas.microsoft.com/office/drawing/2010/main" xmlns:m="http://schemas.openxmlformats.org/officeDocument/2006/math" xmlns="" val="1"/>
+              <ma14:wrappingTextBoxFlag xmlns="" xmlns:m="http://schemas.openxmlformats.org/officeDocument/2006/math" xmlns:a14="http://schemas.microsoft.com/office/drawing/2010/main" xmlns:ma14="http://schemas.microsoft.com/office/mac/drawingml/2011/main" val="1"/>
             </a:ext>
           </a:extLst>
         </p:spPr>
@@ -3749,7 +3577,7 @@
           </a:ln>
           <a:extLst>
             <a:ext uri="{C572A759-6A51-4108-AA02-DFA0A04FC94B}">
-              <ma14:wrappingTextBoxFlag xmlns:ma14="http://schemas.microsoft.com/office/mac/drawingml/2011/main" xmlns:a14="http://schemas.microsoft.com/office/drawing/2010/main" xmlns:m="http://schemas.openxmlformats.org/officeDocument/2006/math" xmlns="" val="1"/>
+              <ma14:wrappingTextBoxFlag xmlns="" xmlns:m="http://schemas.openxmlformats.org/officeDocument/2006/math" xmlns:a14="http://schemas.microsoft.com/office/drawing/2010/main" xmlns:ma14="http://schemas.microsoft.com/office/mac/drawingml/2011/main" val="1"/>
             </a:ext>
           </a:extLst>
         </p:spPr>
@@ -3876,7 +3704,7 @@
           </a:ln>
           <a:extLst>
             <a:ext uri="{C572A759-6A51-4108-AA02-DFA0A04FC94B}">
-              <ma14:wrappingTextBoxFlag xmlns:ma14="http://schemas.microsoft.com/office/mac/drawingml/2011/main" xmlns:a14="http://schemas.microsoft.com/office/drawing/2010/main" xmlns:m="http://schemas.openxmlformats.org/officeDocument/2006/math" xmlns="" val="1"/>
+              <ma14:wrappingTextBoxFlag xmlns="" xmlns:m="http://schemas.openxmlformats.org/officeDocument/2006/math" xmlns:a14="http://schemas.microsoft.com/office/drawing/2010/main" xmlns:ma14="http://schemas.microsoft.com/office/mac/drawingml/2011/main" val="1"/>
             </a:ext>
           </a:extLst>
         </p:spPr>
@@ -3924,7 +3752,7 @@
           </a:ln>
           <a:extLst>
             <a:ext uri="{C572A759-6A51-4108-AA02-DFA0A04FC94B}">
-              <ma14:wrappingTextBoxFlag xmlns:ma14="http://schemas.microsoft.com/office/mac/drawingml/2011/main" xmlns:a14="http://schemas.microsoft.com/office/drawing/2010/main" xmlns:m="http://schemas.openxmlformats.org/officeDocument/2006/math" xmlns="" val="1"/>
+              <ma14:wrappingTextBoxFlag xmlns="" xmlns:m="http://schemas.openxmlformats.org/officeDocument/2006/math" xmlns:a14="http://schemas.microsoft.com/office/drawing/2010/main" xmlns:ma14="http://schemas.microsoft.com/office/mac/drawingml/2011/main" val="1"/>
             </a:ext>
           </a:extLst>
         </p:spPr>
@@ -3972,7 +3800,7 @@
           </a:ln>
           <a:extLst>
             <a:ext uri="{C572A759-6A51-4108-AA02-DFA0A04FC94B}">
-              <ma14:wrappingTextBoxFlag xmlns:ma14="http://schemas.microsoft.com/office/mac/drawingml/2011/main" xmlns:a14="http://schemas.microsoft.com/office/drawing/2010/main" xmlns:m="http://schemas.openxmlformats.org/officeDocument/2006/math" xmlns="" val="1"/>
+              <ma14:wrappingTextBoxFlag xmlns="" xmlns:m="http://schemas.openxmlformats.org/officeDocument/2006/math" xmlns:a14="http://schemas.microsoft.com/office/drawing/2010/main" xmlns:ma14="http://schemas.microsoft.com/office/mac/drawingml/2011/main" val="1"/>
             </a:ext>
           </a:extLst>
         </p:spPr>
@@ -4020,7 +3848,7 @@
           </a:ln>
           <a:extLst>
             <a:ext uri="{C572A759-6A51-4108-AA02-DFA0A04FC94B}">
-              <ma14:wrappingTextBoxFlag xmlns:ma14="http://schemas.microsoft.com/office/mac/drawingml/2011/main" xmlns:a14="http://schemas.microsoft.com/office/drawing/2010/main" xmlns:m="http://schemas.openxmlformats.org/officeDocument/2006/math" xmlns="" val="1"/>
+              <ma14:wrappingTextBoxFlag xmlns="" xmlns:m="http://schemas.openxmlformats.org/officeDocument/2006/math" xmlns:a14="http://schemas.microsoft.com/office/drawing/2010/main" xmlns:ma14="http://schemas.microsoft.com/office/mac/drawingml/2011/main" val="1"/>
             </a:ext>
           </a:extLst>
         </p:spPr>
@@ -4068,7 +3896,7 @@
           </a:ln>
           <a:extLst>
             <a:ext uri="{C572A759-6A51-4108-AA02-DFA0A04FC94B}">
-              <ma14:wrappingTextBoxFlag xmlns:ma14="http://schemas.microsoft.com/office/mac/drawingml/2011/main" xmlns:a14="http://schemas.microsoft.com/office/drawing/2010/main" xmlns:m="http://schemas.openxmlformats.org/officeDocument/2006/math" xmlns="" val="1"/>
+              <ma14:wrappingTextBoxFlag xmlns="" xmlns:m="http://schemas.openxmlformats.org/officeDocument/2006/math" xmlns:a14="http://schemas.microsoft.com/office/drawing/2010/main" xmlns:ma14="http://schemas.microsoft.com/office/mac/drawingml/2011/main" val="1"/>
             </a:ext>
           </a:extLst>
         </p:spPr>
@@ -4417,7 +4245,7 @@
           </a:ln>
           <a:extLst>
             <a:ext uri="{C572A759-6A51-4108-AA02-DFA0A04FC94B}">
-              <ma14:wrappingTextBoxFlag xmlns:ma14="http://schemas.microsoft.com/office/mac/drawingml/2011/main" xmlns:a14="http://schemas.microsoft.com/office/drawing/2010/main" xmlns:m="http://schemas.openxmlformats.org/officeDocument/2006/math" xmlns="" val="1"/>
+              <ma14:wrappingTextBoxFlag xmlns="" xmlns:m="http://schemas.openxmlformats.org/officeDocument/2006/math" xmlns:a14="http://schemas.microsoft.com/office/drawing/2010/main" xmlns:ma14="http://schemas.microsoft.com/office/mac/drawingml/2011/main" val="1"/>
             </a:ext>
           </a:extLst>
         </p:spPr>
@@ -4469,7 +4297,7 @@
           </a:ln>
           <a:extLst>
             <a:ext uri="{C572A759-6A51-4108-AA02-DFA0A04FC94B}">
-              <ma14:wrappingTextBoxFlag xmlns:ma14="http://schemas.microsoft.com/office/mac/drawingml/2011/main" xmlns:a14="http://schemas.microsoft.com/office/drawing/2010/main" xmlns:m="http://schemas.openxmlformats.org/officeDocument/2006/math" xmlns="" val="1"/>
+              <ma14:wrappingTextBoxFlag xmlns="" xmlns:m="http://schemas.openxmlformats.org/officeDocument/2006/math" xmlns:a14="http://schemas.microsoft.com/office/drawing/2010/main" xmlns:ma14="http://schemas.microsoft.com/office/mac/drawingml/2011/main" val="1"/>
             </a:ext>
           </a:extLst>
         </p:spPr>
@@ -4517,7 +4345,7 @@
           </a:ln>
           <a:extLst>
             <a:ext uri="{C572A759-6A51-4108-AA02-DFA0A04FC94B}">
-              <ma14:wrappingTextBoxFlag xmlns:ma14="http://schemas.microsoft.com/office/mac/drawingml/2011/main" xmlns:a14="http://schemas.microsoft.com/office/drawing/2010/main" xmlns:m="http://schemas.openxmlformats.org/officeDocument/2006/math" xmlns="" val="1"/>
+              <ma14:wrappingTextBoxFlag xmlns="" xmlns:m="http://schemas.openxmlformats.org/officeDocument/2006/math" xmlns:a14="http://schemas.microsoft.com/office/drawing/2010/main" xmlns:ma14="http://schemas.microsoft.com/office/mac/drawingml/2011/main" val="1"/>
             </a:ext>
           </a:extLst>
         </p:spPr>
@@ -4565,7 +4393,7 @@
           </a:ln>
           <a:extLst>
             <a:ext uri="{C572A759-6A51-4108-AA02-DFA0A04FC94B}">
-              <ma14:wrappingTextBoxFlag xmlns:ma14="http://schemas.microsoft.com/office/mac/drawingml/2011/main" xmlns:a14="http://schemas.microsoft.com/office/drawing/2010/main" xmlns:m="http://schemas.openxmlformats.org/officeDocument/2006/math" xmlns="" val="1"/>
+              <ma14:wrappingTextBoxFlag xmlns="" xmlns:m="http://schemas.openxmlformats.org/officeDocument/2006/math" xmlns:a14="http://schemas.microsoft.com/office/drawing/2010/main" xmlns:ma14="http://schemas.microsoft.com/office/mac/drawingml/2011/main" val="1"/>
             </a:ext>
           </a:extLst>
         </p:spPr>
@@ -4613,7 +4441,7 @@
           </a:ln>
           <a:extLst>
             <a:ext uri="{C572A759-6A51-4108-AA02-DFA0A04FC94B}">
-              <ma14:wrappingTextBoxFlag xmlns:ma14="http://schemas.microsoft.com/office/mac/drawingml/2011/main" xmlns:a14="http://schemas.microsoft.com/office/drawing/2010/main" xmlns:m="http://schemas.openxmlformats.org/officeDocument/2006/math" xmlns="" val="1"/>
+              <ma14:wrappingTextBoxFlag xmlns="" xmlns:m="http://schemas.openxmlformats.org/officeDocument/2006/math" xmlns:a14="http://schemas.microsoft.com/office/drawing/2010/main" xmlns:ma14="http://schemas.microsoft.com/office/mac/drawingml/2011/main" val="1"/>
             </a:ext>
           </a:extLst>
         </p:spPr>
@@ -4953,7 +4781,7 @@
           </a:ln>
           <a:extLst>
             <a:ext uri="{C572A759-6A51-4108-AA02-DFA0A04FC94B}">
-              <ma14:wrappingTextBoxFlag xmlns:ma14="http://schemas.microsoft.com/office/mac/drawingml/2011/main" xmlns:a14="http://schemas.microsoft.com/office/drawing/2010/main" xmlns:m="http://schemas.openxmlformats.org/officeDocument/2006/math" xmlns="" val="1"/>
+              <ma14:wrappingTextBoxFlag xmlns="" xmlns:m="http://schemas.openxmlformats.org/officeDocument/2006/math" xmlns:a14="http://schemas.microsoft.com/office/drawing/2010/main" xmlns:ma14="http://schemas.microsoft.com/office/mac/drawingml/2011/main" val="1"/>
             </a:ext>
           </a:extLst>
         </p:spPr>
@@ -5032,7 +4860,7 @@
           </a:ln>
           <a:extLst>
             <a:ext uri="{C572A759-6A51-4108-AA02-DFA0A04FC94B}">
-              <ma14:wrappingTextBoxFlag xmlns:ma14="http://schemas.microsoft.com/office/mac/drawingml/2011/main" xmlns:a14="http://schemas.microsoft.com/office/drawing/2010/main" xmlns:m="http://schemas.openxmlformats.org/officeDocument/2006/math" xmlns="" val="1"/>
+              <ma14:wrappingTextBoxFlag xmlns="" xmlns:m="http://schemas.openxmlformats.org/officeDocument/2006/math" xmlns:a14="http://schemas.microsoft.com/office/drawing/2010/main" xmlns:ma14="http://schemas.microsoft.com/office/mac/drawingml/2011/main" val="1"/>
             </a:ext>
           </a:extLst>
         </p:spPr>
@@ -5690,7 +5518,7 @@
           </a:ln>
           <a:extLst>
             <a:ext uri="{C572A759-6A51-4108-AA02-DFA0A04FC94B}">
-              <ma14:wrappingTextBoxFlag xmlns:ma14="http://schemas.microsoft.com/office/mac/drawingml/2011/main" xmlns:a14="http://schemas.microsoft.com/office/drawing/2010/main" xmlns:m="http://schemas.openxmlformats.org/officeDocument/2006/math" xmlns="" val="1"/>
+              <ma14:wrappingTextBoxFlag xmlns="" xmlns:m="http://schemas.openxmlformats.org/officeDocument/2006/math" xmlns:a14="http://schemas.microsoft.com/office/drawing/2010/main" xmlns:ma14="http://schemas.microsoft.com/office/mac/drawingml/2011/main" val="1"/>
             </a:ext>
           </a:extLst>
         </p:spPr>
@@ -5741,7 +5569,7 @@
           </a:ln>
           <a:extLst>
             <a:ext uri="{C572A759-6A51-4108-AA02-DFA0A04FC94B}">
-              <ma14:wrappingTextBoxFlag xmlns:ma14="http://schemas.microsoft.com/office/mac/drawingml/2011/main" xmlns:a14="http://schemas.microsoft.com/office/drawing/2010/main" xmlns:m="http://schemas.openxmlformats.org/officeDocument/2006/math" xmlns="" val="1"/>
+              <ma14:wrappingTextBoxFlag xmlns="" xmlns:m="http://schemas.openxmlformats.org/officeDocument/2006/math" xmlns:a14="http://schemas.microsoft.com/office/drawing/2010/main" xmlns:ma14="http://schemas.microsoft.com/office/mac/drawingml/2011/main" val="1"/>
             </a:ext>
           </a:extLst>
         </p:spPr>
@@ -5868,7 +5696,7 @@
           </a:ln>
           <a:extLst>
             <a:ext uri="{C572A759-6A51-4108-AA02-DFA0A04FC94B}">
-              <ma14:wrappingTextBoxFlag xmlns:ma14="http://schemas.microsoft.com/office/mac/drawingml/2011/main" xmlns:a14="http://schemas.microsoft.com/office/drawing/2010/main" xmlns:m="http://schemas.openxmlformats.org/officeDocument/2006/math" xmlns="" val="1"/>
+              <ma14:wrappingTextBoxFlag xmlns="" xmlns:m="http://schemas.openxmlformats.org/officeDocument/2006/math" xmlns:a14="http://schemas.microsoft.com/office/drawing/2010/main" xmlns:ma14="http://schemas.microsoft.com/office/mac/drawingml/2011/main" val="1"/>
             </a:ext>
           </a:extLst>
         </p:spPr>
@@ -5916,7 +5744,7 @@
           </a:ln>
           <a:extLst>
             <a:ext uri="{C572A759-6A51-4108-AA02-DFA0A04FC94B}">
-              <ma14:wrappingTextBoxFlag xmlns:ma14="http://schemas.microsoft.com/office/mac/drawingml/2011/main" xmlns:a14="http://schemas.microsoft.com/office/drawing/2010/main" xmlns:m="http://schemas.openxmlformats.org/officeDocument/2006/math" xmlns="" val="1"/>
+              <ma14:wrappingTextBoxFlag xmlns="" xmlns:m="http://schemas.openxmlformats.org/officeDocument/2006/math" xmlns:a14="http://schemas.microsoft.com/office/drawing/2010/main" xmlns:ma14="http://schemas.microsoft.com/office/mac/drawingml/2011/main" val="1"/>
             </a:ext>
           </a:extLst>
         </p:spPr>
@@ -5964,7 +5792,7 @@
           </a:ln>
           <a:extLst>
             <a:ext uri="{C572A759-6A51-4108-AA02-DFA0A04FC94B}">
-              <ma14:wrappingTextBoxFlag xmlns:ma14="http://schemas.microsoft.com/office/mac/drawingml/2011/main" xmlns:a14="http://schemas.microsoft.com/office/drawing/2010/main" xmlns:m="http://schemas.openxmlformats.org/officeDocument/2006/math" xmlns="" val="1"/>
+              <ma14:wrappingTextBoxFlag xmlns="" xmlns:m="http://schemas.openxmlformats.org/officeDocument/2006/math" xmlns:a14="http://schemas.microsoft.com/office/drawing/2010/main" xmlns:ma14="http://schemas.microsoft.com/office/mac/drawingml/2011/main" val="1"/>
             </a:ext>
           </a:extLst>
         </p:spPr>
@@ -6272,7 +6100,7 @@
           </a:ln>
           <a:extLst>
             <a:ext uri="{C572A759-6A51-4108-AA02-DFA0A04FC94B}">
-              <ma14:wrappingTextBoxFlag xmlns:ma14="http://schemas.microsoft.com/office/mac/drawingml/2011/main" xmlns:a14="http://schemas.microsoft.com/office/drawing/2010/main" xmlns:m="http://schemas.openxmlformats.org/officeDocument/2006/math" xmlns="" val="1"/>
+              <ma14:wrappingTextBoxFlag xmlns="" xmlns:m="http://schemas.openxmlformats.org/officeDocument/2006/math" xmlns:a14="http://schemas.microsoft.com/office/drawing/2010/main" xmlns:ma14="http://schemas.microsoft.com/office/mac/drawingml/2011/main" val="1"/>
             </a:ext>
           </a:extLst>
         </p:spPr>
@@ -6324,7 +6152,7 @@
           </a:ln>
           <a:extLst>
             <a:ext uri="{C572A759-6A51-4108-AA02-DFA0A04FC94B}">
-              <ma14:wrappingTextBoxFlag xmlns:ma14="http://schemas.microsoft.com/office/mac/drawingml/2011/main" xmlns:a14="http://schemas.microsoft.com/office/drawing/2010/main" xmlns:m="http://schemas.openxmlformats.org/officeDocument/2006/math" xmlns="" val="1"/>
+              <ma14:wrappingTextBoxFlag xmlns="" xmlns:m="http://schemas.openxmlformats.org/officeDocument/2006/math" xmlns:a14="http://schemas.microsoft.com/office/drawing/2010/main" xmlns:ma14="http://schemas.microsoft.com/office/mac/drawingml/2011/main" val="1"/>
             </a:ext>
           </a:extLst>
         </p:spPr>
@@ -6372,7 +6200,7 @@
           </a:ln>
           <a:extLst>
             <a:ext uri="{C572A759-6A51-4108-AA02-DFA0A04FC94B}">
-              <ma14:wrappingTextBoxFlag xmlns:ma14="http://schemas.microsoft.com/office/mac/drawingml/2011/main" xmlns:a14="http://schemas.microsoft.com/office/drawing/2010/main" xmlns:m="http://schemas.openxmlformats.org/officeDocument/2006/math" xmlns="" val="1"/>
+              <ma14:wrappingTextBoxFlag xmlns="" xmlns:m="http://schemas.openxmlformats.org/officeDocument/2006/math" xmlns:a14="http://schemas.microsoft.com/office/drawing/2010/main" xmlns:ma14="http://schemas.microsoft.com/office/mac/drawingml/2011/main" val="1"/>
             </a:ext>
           </a:extLst>
         </p:spPr>
@@ -6420,7 +6248,7 @@
           </a:ln>
           <a:extLst>
             <a:ext uri="{C572A759-6A51-4108-AA02-DFA0A04FC94B}">
-              <ma14:wrappingTextBoxFlag xmlns:ma14="http://schemas.microsoft.com/office/mac/drawingml/2011/main" xmlns:a14="http://schemas.microsoft.com/office/drawing/2010/main" xmlns:m="http://schemas.openxmlformats.org/officeDocument/2006/math" xmlns="" val="1"/>
+              <ma14:wrappingTextBoxFlag xmlns="" xmlns:m="http://schemas.openxmlformats.org/officeDocument/2006/math" xmlns:a14="http://schemas.microsoft.com/office/drawing/2010/main" xmlns:ma14="http://schemas.microsoft.com/office/mac/drawingml/2011/main" val="1"/>
             </a:ext>
           </a:extLst>
         </p:spPr>
@@ -6468,7 +6296,7 @@
           </a:ln>
           <a:extLst>
             <a:ext uri="{C572A759-6A51-4108-AA02-DFA0A04FC94B}">
-              <ma14:wrappingTextBoxFlag xmlns:ma14="http://schemas.microsoft.com/office/mac/drawingml/2011/main" xmlns:a14="http://schemas.microsoft.com/office/drawing/2010/main" xmlns:m="http://schemas.openxmlformats.org/officeDocument/2006/math" xmlns="" val="1"/>
+              <ma14:wrappingTextBoxFlag xmlns="" xmlns:m="http://schemas.openxmlformats.org/officeDocument/2006/math" xmlns:a14="http://schemas.microsoft.com/office/drawing/2010/main" xmlns:ma14="http://schemas.microsoft.com/office/mac/drawingml/2011/main" val="1"/>
             </a:ext>
           </a:extLst>
         </p:spPr>
@@ -6808,7 +6636,7 @@
           </a:ln>
           <a:extLst>
             <a:ext uri="{C572A759-6A51-4108-AA02-DFA0A04FC94B}">
-              <ma14:wrappingTextBoxFlag xmlns:ma14="http://schemas.microsoft.com/office/mac/drawingml/2011/main" xmlns:a14="http://schemas.microsoft.com/office/drawing/2010/main" xmlns:m="http://schemas.openxmlformats.org/officeDocument/2006/math" xmlns="" val="1"/>
+              <ma14:wrappingTextBoxFlag xmlns="" xmlns:m="http://schemas.openxmlformats.org/officeDocument/2006/math" xmlns:a14="http://schemas.microsoft.com/office/drawing/2010/main" xmlns:ma14="http://schemas.microsoft.com/office/mac/drawingml/2011/main" val="1"/>
             </a:ext>
           </a:extLst>
         </p:spPr>
@@ -6926,7 +6754,7 @@
           </a:ln>
           <a:extLst>
             <a:ext uri="{C572A759-6A51-4108-AA02-DFA0A04FC94B}">
-              <ma14:wrappingTextBoxFlag xmlns:ma14="http://schemas.microsoft.com/office/mac/drawingml/2011/main" xmlns:a14="http://schemas.microsoft.com/office/drawing/2010/main" xmlns:m="http://schemas.openxmlformats.org/officeDocument/2006/math" xmlns="" val="1"/>
+              <ma14:wrappingTextBoxFlag xmlns="" xmlns:m="http://schemas.openxmlformats.org/officeDocument/2006/math" xmlns:a14="http://schemas.microsoft.com/office/drawing/2010/main" xmlns:ma14="http://schemas.microsoft.com/office/mac/drawingml/2011/main" val="1"/>
             </a:ext>
           </a:extLst>
         </p:spPr>
@@ -6974,7 +6802,7 @@
           </a:ln>
           <a:extLst>
             <a:ext uri="{C572A759-6A51-4108-AA02-DFA0A04FC94B}">
-              <ma14:wrappingTextBoxFlag xmlns:ma14="http://schemas.microsoft.com/office/mac/drawingml/2011/main" xmlns:a14="http://schemas.microsoft.com/office/drawing/2010/main" xmlns:m="http://schemas.openxmlformats.org/officeDocument/2006/math" xmlns="" val="1"/>
+              <ma14:wrappingTextBoxFlag xmlns="" xmlns:m="http://schemas.openxmlformats.org/officeDocument/2006/math" xmlns:a14="http://schemas.microsoft.com/office/drawing/2010/main" xmlns:ma14="http://schemas.microsoft.com/office/mac/drawingml/2011/main" val="1"/>
             </a:ext>
           </a:extLst>
         </p:spPr>
@@ -7060,7 +6888,7 @@
           </a:ln>
           <a:extLst>
             <a:ext uri="{C572A759-6A51-4108-AA02-DFA0A04FC94B}">
-              <ma14:wrappingTextBoxFlag xmlns:ma14="http://schemas.microsoft.com/office/mac/drawingml/2011/main" xmlns:a14="http://schemas.microsoft.com/office/drawing/2010/main" xmlns:m="http://schemas.openxmlformats.org/officeDocument/2006/math" xmlns="" val="1"/>
+              <ma14:wrappingTextBoxFlag xmlns="" xmlns:m="http://schemas.openxmlformats.org/officeDocument/2006/math" xmlns:a14="http://schemas.microsoft.com/office/drawing/2010/main" xmlns:ma14="http://schemas.microsoft.com/office/mac/drawingml/2011/main" val="1"/>
             </a:ext>
           </a:extLst>
         </p:spPr>
@@ -7111,7 +6939,7 @@
           </a:ln>
           <a:extLst>
             <a:ext uri="{C572A759-6A51-4108-AA02-DFA0A04FC94B}">
-              <ma14:wrappingTextBoxFlag xmlns:ma14="http://schemas.microsoft.com/office/mac/drawingml/2011/main" xmlns:a14="http://schemas.microsoft.com/office/drawing/2010/main" xmlns:m="http://schemas.openxmlformats.org/officeDocument/2006/math" xmlns="" val="1"/>
+              <ma14:wrappingTextBoxFlag xmlns="" xmlns:m="http://schemas.openxmlformats.org/officeDocument/2006/math" xmlns:a14="http://schemas.microsoft.com/office/drawing/2010/main" xmlns:ma14="http://schemas.microsoft.com/office/mac/drawingml/2011/main" val="1"/>
             </a:ext>
           </a:extLst>
         </p:spPr>
@@ -7165,7 +6993,7 @@
           </a:ln>
           <a:extLst>
             <a:ext uri="{C572A759-6A51-4108-AA02-DFA0A04FC94B}">
-              <ma14:wrappingTextBoxFlag xmlns:ma14="http://schemas.microsoft.com/office/mac/drawingml/2011/main" xmlns:a14="http://schemas.microsoft.com/office/drawing/2010/main" xmlns:m="http://schemas.openxmlformats.org/officeDocument/2006/math" xmlns="" val="1"/>
+              <ma14:wrappingTextBoxFlag xmlns="" xmlns:m="http://schemas.openxmlformats.org/officeDocument/2006/math" xmlns:a14="http://schemas.microsoft.com/office/drawing/2010/main" xmlns:ma14="http://schemas.microsoft.com/office/mac/drawingml/2011/main" val="1"/>
             </a:ext>
           </a:extLst>
         </p:spPr>
@@ -7823,7 +7651,7 @@
           </a:ln>
           <a:extLst>
             <a:ext uri="{C572A759-6A51-4108-AA02-DFA0A04FC94B}">
-              <ma14:wrappingTextBoxFlag xmlns:ma14="http://schemas.microsoft.com/office/mac/drawingml/2011/main" xmlns:a14="http://schemas.microsoft.com/office/drawing/2010/main" xmlns:m="http://schemas.openxmlformats.org/officeDocument/2006/math" xmlns="" val="1"/>
+              <ma14:wrappingTextBoxFlag xmlns="" xmlns:m="http://schemas.openxmlformats.org/officeDocument/2006/math" xmlns:a14="http://schemas.microsoft.com/office/drawing/2010/main" xmlns:ma14="http://schemas.microsoft.com/office/mac/drawingml/2011/main" val="1"/>
             </a:ext>
           </a:extLst>
         </p:spPr>
@@ -7874,7 +7702,7 @@
           </a:ln>
           <a:extLst>
             <a:ext uri="{C572A759-6A51-4108-AA02-DFA0A04FC94B}">
-              <ma14:wrappingTextBoxFlag xmlns:ma14="http://schemas.microsoft.com/office/mac/drawingml/2011/main" xmlns:a14="http://schemas.microsoft.com/office/drawing/2010/main" xmlns:m="http://schemas.openxmlformats.org/officeDocument/2006/math" xmlns="" val="1"/>
+              <ma14:wrappingTextBoxFlag xmlns="" xmlns:m="http://schemas.openxmlformats.org/officeDocument/2006/math" xmlns:a14="http://schemas.microsoft.com/office/drawing/2010/main" xmlns:ma14="http://schemas.microsoft.com/office/mac/drawingml/2011/main" val="1"/>
             </a:ext>
           </a:extLst>
         </p:spPr>
@@ -8001,7 +7829,7 @@
           </a:ln>
           <a:extLst>
             <a:ext uri="{C572A759-6A51-4108-AA02-DFA0A04FC94B}">
-              <ma14:wrappingTextBoxFlag xmlns:ma14="http://schemas.microsoft.com/office/mac/drawingml/2011/main" xmlns:a14="http://schemas.microsoft.com/office/drawing/2010/main" xmlns:m="http://schemas.openxmlformats.org/officeDocument/2006/math" xmlns="" val="1"/>
+              <ma14:wrappingTextBoxFlag xmlns="" xmlns:m="http://schemas.openxmlformats.org/officeDocument/2006/math" xmlns:a14="http://schemas.microsoft.com/office/drawing/2010/main" xmlns:ma14="http://schemas.microsoft.com/office/mac/drawingml/2011/main" val="1"/>
             </a:ext>
           </a:extLst>
         </p:spPr>
@@ -8049,7 +7877,7 @@
           </a:ln>
           <a:extLst>
             <a:ext uri="{C572A759-6A51-4108-AA02-DFA0A04FC94B}">
-              <ma14:wrappingTextBoxFlag xmlns:ma14="http://schemas.microsoft.com/office/mac/drawingml/2011/main" xmlns:a14="http://schemas.microsoft.com/office/drawing/2010/main" xmlns:m="http://schemas.openxmlformats.org/officeDocument/2006/math" xmlns="" val="1"/>
+              <ma14:wrappingTextBoxFlag xmlns="" xmlns:m="http://schemas.openxmlformats.org/officeDocument/2006/math" xmlns:a14="http://schemas.microsoft.com/office/drawing/2010/main" xmlns:ma14="http://schemas.microsoft.com/office/mac/drawingml/2011/main" val="1"/>
             </a:ext>
           </a:extLst>
         </p:spPr>
@@ -8097,7 +7925,7 @@
           </a:ln>
           <a:extLst>
             <a:ext uri="{C572A759-6A51-4108-AA02-DFA0A04FC94B}">
-              <ma14:wrappingTextBoxFlag xmlns:ma14="http://schemas.microsoft.com/office/mac/drawingml/2011/main" xmlns:a14="http://schemas.microsoft.com/office/drawing/2010/main" xmlns:m="http://schemas.openxmlformats.org/officeDocument/2006/math" xmlns="" val="1"/>
+              <ma14:wrappingTextBoxFlag xmlns="" xmlns:m="http://schemas.openxmlformats.org/officeDocument/2006/math" xmlns:a14="http://schemas.microsoft.com/office/drawing/2010/main" xmlns:ma14="http://schemas.microsoft.com/office/mac/drawingml/2011/main" val="1"/>
             </a:ext>
           </a:extLst>
         </p:spPr>
@@ -8405,7 +8233,7 @@
           </a:ln>
           <a:extLst>
             <a:ext uri="{C572A759-6A51-4108-AA02-DFA0A04FC94B}">
-              <ma14:wrappingTextBoxFlag xmlns:ma14="http://schemas.microsoft.com/office/mac/drawingml/2011/main" xmlns:a14="http://schemas.microsoft.com/office/drawing/2010/main" xmlns:m="http://schemas.openxmlformats.org/officeDocument/2006/math" xmlns="" val="1"/>
+              <ma14:wrappingTextBoxFlag xmlns="" xmlns:m="http://schemas.openxmlformats.org/officeDocument/2006/math" xmlns:a14="http://schemas.microsoft.com/office/drawing/2010/main" xmlns:ma14="http://schemas.microsoft.com/office/mac/drawingml/2011/main" val="1"/>
             </a:ext>
           </a:extLst>
         </p:spPr>
@@ -8457,7 +8285,7 @@
           </a:ln>
           <a:extLst>
             <a:ext uri="{C572A759-6A51-4108-AA02-DFA0A04FC94B}">
-              <ma14:wrappingTextBoxFlag xmlns:ma14="http://schemas.microsoft.com/office/mac/drawingml/2011/main" xmlns:a14="http://schemas.microsoft.com/office/drawing/2010/main" xmlns:m="http://schemas.openxmlformats.org/officeDocument/2006/math" xmlns="" val="1"/>
+              <ma14:wrappingTextBoxFlag xmlns="" xmlns:m="http://schemas.openxmlformats.org/officeDocument/2006/math" xmlns:a14="http://schemas.microsoft.com/office/drawing/2010/main" xmlns:ma14="http://schemas.microsoft.com/office/mac/drawingml/2011/main" val="1"/>
             </a:ext>
           </a:extLst>
         </p:spPr>
@@ -8505,7 +8333,7 @@
           </a:ln>
           <a:extLst>
             <a:ext uri="{C572A759-6A51-4108-AA02-DFA0A04FC94B}">
-              <ma14:wrappingTextBoxFlag xmlns:ma14="http://schemas.microsoft.com/office/mac/drawingml/2011/main" xmlns:a14="http://schemas.microsoft.com/office/drawing/2010/main" xmlns:m="http://schemas.openxmlformats.org/officeDocument/2006/math" xmlns="" val="1"/>
+              <ma14:wrappingTextBoxFlag xmlns="" xmlns:m="http://schemas.openxmlformats.org/officeDocument/2006/math" xmlns:a14="http://schemas.microsoft.com/office/drawing/2010/main" xmlns:ma14="http://schemas.microsoft.com/office/mac/drawingml/2011/main" val="1"/>
             </a:ext>
           </a:extLst>
         </p:spPr>
@@ -8553,7 +8381,7 @@
           </a:ln>
           <a:extLst>
             <a:ext uri="{C572A759-6A51-4108-AA02-DFA0A04FC94B}">
-              <ma14:wrappingTextBoxFlag xmlns:ma14="http://schemas.microsoft.com/office/mac/drawingml/2011/main" xmlns:a14="http://schemas.microsoft.com/office/drawing/2010/main" xmlns:m="http://schemas.openxmlformats.org/officeDocument/2006/math" xmlns="" val="1"/>
+              <ma14:wrappingTextBoxFlag xmlns="" xmlns:m="http://schemas.openxmlformats.org/officeDocument/2006/math" xmlns:a14="http://schemas.microsoft.com/office/drawing/2010/main" xmlns:ma14="http://schemas.microsoft.com/office/mac/drawingml/2011/main" val="1"/>
             </a:ext>
           </a:extLst>
         </p:spPr>
@@ -8601,7 +8429,7 @@
           </a:ln>
           <a:extLst>
             <a:ext uri="{C572A759-6A51-4108-AA02-DFA0A04FC94B}">
-              <ma14:wrappingTextBoxFlag xmlns:ma14="http://schemas.microsoft.com/office/mac/drawingml/2011/main" xmlns:a14="http://schemas.microsoft.com/office/drawing/2010/main" xmlns:m="http://schemas.openxmlformats.org/officeDocument/2006/math" xmlns="" val="1"/>
+              <ma14:wrappingTextBoxFlag xmlns="" xmlns:m="http://schemas.openxmlformats.org/officeDocument/2006/math" xmlns:a14="http://schemas.microsoft.com/office/drawing/2010/main" xmlns:ma14="http://schemas.microsoft.com/office/mac/drawingml/2011/main" val="1"/>
             </a:ext>
           </a:extLst>
         </p:spPr>
@@ -8944,7 +8772,7 @@
           </a:ln>
           <a:extLst>
             <a:ext uri="{C572A759-6A51-4108-AA02-DFA0A04FC94B}">
-              <ma14:wrappingTextBoxFlag xmlns:ma14="http://schemas.microsoft.com/office/mac/drawingml/2011/main" xmlns:a14="http://schemas.microsoft.com/office/drawing/2010/main" xmlns:m="http://schemas.openxmlformats.org/officeDocument/2006/math" xmlns="" val="1"/>
+              <ma14:wrappingTextBoxFlag xmlns="" xmlns:m="http://schemas.openxmlformats.org/officeDocument/2006/math" xmlns:a14="http://schemas.microsoft.com/office/drawing/2010/main" xmlns:ma14="http://schemas.microsoft.com/office/mac/drawingml/2011/main" val="1"/>
             </a:ext>
           </a:extLst>
         </p:spPr>
@@ -8992,7 +8820,7 @@
           </a:ln>
           <a:extLst>
             <a:ext uri="{C572A759-6A51-4108-AA02-DFA0A04FC94B}">
-              <ma14:wrappingTextBoxFlag xmlns:ma14="http://schemas.microsoft.com/office/mac/drawingml/2011/main" xmlns:a14="http://schemas.microsoft.com/office/drawing/2010/main" xmlns:m="http://schemas.openxmlformats.org/officeDocument/2006/math" xmlns="" val="1"/>
+              <ma14:wrappingTextBoxFlag xmlns="" xmlns:m="http://schemas.openxmlformats.org/officeDocument/2006/math" xmlns:a14="http://schemas.microsoft.com/office/drawing/2010/main" xmlns:ma14="http://schemas.microsoft.com/office/mac/drawingml/2011/main" val="1"/>
             </a:ext>
           </a:extLst>
         </p:spPr>
@@ -9078,7 +8906,7 @@
           </a:ln>
           <a:extLst>
             <a:ext uri="{C572A759-6A51-4108-AA02-DFA0A04FC94B}">
-              <ma14:wrappingTextBoxFlag xmlns:ma14="http://schemas.microsoft.com/office/mac/drawingml/2011/main" xmlns:a14="http://schemas.microsoft.com/office/drawing/2010/main" xmlns:m="http://schemas.openxmlformats.org/officeDocument/2006/math" xmlns="" val="1"/>
+              <ma14:wrappingTextBoxFlag xmlns="" xmlns:m="http://schemas.openxmlformats.org/officeDocument/2006/math" xmlns:a14="http://schemas.microsoft.com/office/drawing/2010/main" xmlns:ma14="http://schemas.microsoft.com/office/mac/drawingml/2011/main" val="1"/>
             </a:ext>
           </a:extLst>
         </p:spPr>
@@ -9129,7 +8957,7 @@
           </a:ln>
           <a:extLst>
             <a:ext uri="{C572A759-6A51-4108-AA02-DFA0A04FC94B}">
-              <ma14:wrappingTextBoxFlag xmlns:ma14="http://schemas.microsoft.com/office/mac/drawingml/2011/main" xmlns:a14="http://schemas.microsoft.com/office/drawing/2010/main" xmlns:m="http://schemas.openxmlformats.org/officeDocument/2006/math" xmlns="" val="1"/>
+              <ma14:wrappingTextBoxFlag xmlns="" xmlns:m="http://schemas.openxmlformats.org/officeDocument/2006/math" xmlns:a14="http://schemas.microsoft.com/office/drawing/2010/main" xmlns:ma14="http://schemas.microsoft.com/office/mac/drawingml/2011/main" val="1"/>
             </a:ext>
           </a:extLst>
         </p:spPr>
@@ -9183,7 +9011,7 @@
           </a:ln>
           <a:extLst>
             <a:ext uri="{C572A759-6A51-4108-AA02-DFA0A04FC94B}">
-              <ma14:wrappingTextBoxFlag xmlns:ma14="http://schemas.microsoft.com/office/mac/drawingml/2011/main" xmlns:a14="http://schemas.microsoft.com/office/drawing/2010/main" xmlns:m="http://schemas.openxmlformats.org/officeDocument/2006/math" xmlns="" val="1"/>
+              <ma14:wrappingTextBoxFlag xmlns="" xmlns:m="http://schemas.openxmlformats.org/officeDocument/2006/math" xmlns:a14="http://schemas.microsoft.com/office/drawing/2010/main" xmlns:ma14="http://schemas.microsoft.com/office/mac/drawingml/2011/main" val="1"/>
             </a:ext>
           </a:extLst>
         </p:spPr>
@@ -9216,6 +9044,7 @@
               </a:defRPr>
             </a:pPr>
             <a:r>
+              <a:rPr dirty="0"/>
               <a:t>HTTP/1.0 200 OK</a:t>
             </a:r>
           </a:p>
@@ -9243,6 +9072,7 @@
               </a:defRPr>
             </a:pPr>
             <a:r>
+              <a:rPr dirty="0"/>
               <a:t>Content-Type: text/html; charset=utf-8</a:t>
             </a:r>
           </a:p>
@@ -9270,6 +9100,7 @@
               </a:defRPr>
             </a:pPr>
             <a:r>
+              <a:rPr dirty="0"/>
               <a:t>Content-Length: 74</a:t>
             </a:r>
           </a:p>
@@ -9296,7 +9127,7 @@
                 <a:sym typeface="Menlo Regular"/>
               </a:defRPr>
             </a:pPr>
-            <a:endParaRPr/>
+            <a:endParaRPr dirty="0"/>
           </a:p>
           <a:p>
             <a:pPr algn="l" defTabSz="12700">
@@ -9329,6 +9160,7 @@
               </a:defRPr>
             </a:pPr>
             <a:r>
+              <a:rPr dirty="0"/>
               <a:t>&lt;html&gt;</a:t>
             </a:r>
           </a:p>
@@ -9363,13 +9195,15 @@
               </a:defRPr>
             </a:pPr>
             <a:r>
+              <a:rPr dirty="0"/>
               <a:t>  &lt;head&gt;</a:t>
             </a:r>
             <a:r>
-              <a:rPr b="1"/>
+              <a:rPr b="1" dirty="0"/>
               <a:t>&lt;script&gt;...&lt;/script&gt;</a:t>
             </a:r>
             <a:r>
+              <a:rPr dirty="0"/>
               <a:t>&lt;/head&gt;</a:t>
             </a:r>
           </a:p>
@@ -9404,6 +9238,7 @@
               </a:defRPr>
             </a:pPr>
             <a:r>
+              <a:rPr dirty="0"/>
               <a:t>  &lt;body&gt;</a:t>
             </a:r>
           </a:p>
@@ -9438,6 +9273,7 @@
               </a:defRPr>
             </a:pPr>
             <a:r>
+              <a:rPr dirty="0"/>
               <a:t>    &lt;h1&gt;Welcome&lt;/h1&gt;</a:t>
             </a:r>
           </a:p>
@@ -9472,7 +9308,24 @@
               </a:defRPr>
             </a:pPr>
             <a:r>
-              <a:t>    &lt;a href="about.html"&gt;About&lt;/a&gt;</a:t>
+              <a:rPr dirty="0"/>
+              <a:t>    &lt;a </a:t>
+            </a:r>
+            <a:r>
+              <a:rPr dirty="0" err="1"/>
+              <a:t>href</a:t>
+            </a:r>
+            <a:r>
+              <a:rPr dirty="0"/>
+              <a:t>="</a:t>
+            </a:r>
+            <a:r>
+              <a:rPr dirty="0" err="1"/>
+              <a:t>about.html</a:t>
+            </a:r>
+            <a:r>
+              <a:rPr dirty="0"/>
+              <a:t>"&gt;About&lt;/a&gt;</a:t>
             </a:r>
           </a:p>
           <a:p>
@@ -9506,7 +9359,24 @@
               </a:defRPr>
             </a:pPr>
             <a:r>
-              <a:t>    &lt;a href="contact.html"&gt;Contact&lt;/a&gt;</a:t>
+              <a:rPr dirty="0"/>
+              <a:t>    &lt;a </a:t>
+            </a:r>
+            <a:r>
+              <a:rPr dirty="0" err="1"/>
+              <a:t>href</a:t>
+            </a:r>
+            <a:r>
+              <a:rPr dirty="0"/>
+              <a:t>="</a:t>
+            </a:r>
+            <a:r>
+              <a:rPr dirty="0" err="1"/>
+              <a:t>contact.html</a:t>
+            </a:r>
+            <a:r>
+              <a:rPr dirty="0"/>
+              <a:t>"&gt;Contact&lt;/a&gt;</a:t>
             </a:r>
           </a:p>
           <a:p>
@@ -9540,6 +9410,7 @@
               </a:defRPr>
             </a:pPr>
             <a:r>
+              <a:rPr dirty="0"/>
               <a:t>  &lt;/body&gt;</a:t>
             </a:r>
           </a:p>
@@ -9574,6 +9445,7 @@
               </a:defRPr>
             </a:pPr>
             <a:r>
+              <a:rPr dirty="0"/>
               <a:t>&lt;/html&gt;</a:t>
             </a:r>
           </a:p>
@@ -9783,7 +9655,7 @@
           </a:ln>
           <a:extLst>
             <a:ext uri="{C572A759-6A51-4108-AA02-DFA0A04FC94B}">
-              <ma14:wrappingTextBoxFlag xmlns:ma14="http://schemas.microsoft.com/office/mac/drawingml/2011/main" xmlns:a14="http://schemas.microsoft.com/office/drawing/2010/main" xmlns:m="http://schemas.openxmlformats.org/officeDocument/2006/math" xmlns="" val="1"/>
+              <ma14:wrappingTextBoxFlag xmlns="" xmlns:m="http://schemas.openxmlformats.org/officeDocument/2006/math" xmlns:a14="http://schemas.microsoft.com/office/drawing/2010/main" xmlns:ma14="http://schemas.microsoft.com/office/mac/drawingml/2011/main" val="1"/>
             </a:ext>
           </a:extLst>
         </p:spPr>
@@ -9869,7 +9741,7 @@
           </a:ln>
           <a:extLst>
             <a:ext uri="{C572A759-6A51-4108-AA02-DFA0A04FC94B}">
-              <ma14:wrappingTextBoxFlag xmlns:ma14="http://schemas.microsoft.com/office/mac/drawingml/2011/main" xmlns:a14="http://schemas.microsoft.com/office/drawing/2010/main" xmlns:m="http://schemas.openxmlformats.org/officeDocument/2006/math" xmlns="" val="1"/>
+              <ma14:wrappingTextBoxFlag xmlns="" xmlns:m="http://schemas.openxmlformats.org/officeDocument/2006/math" xmlns:a14="http://schemas.microsoft.com/office/drawing/2010/main" xmlns:ma14="http://schemas.microsoft.com/office/mac/drawingml/2011/main" val="1"/>
             </a:ext>
           </a:extLst>
         </p:spPr>
@@ -9916,7 +9788,7 @@
           </a:ln>
           <a:extLst>
             <a:ext uri="{C572A759-6A51-4108-AA02-DFA0A04FC94B}">
-              <ma14:wrappingTextBoxFlag xmlns:ma14="http://schemas.microsoft.com/office/mac/drawingml/2011/main" xmlns:a14="http://schemas.microsoft.com/office/drawing/2010/main" xmlns:m="http://schemas.openxmlformats.org/officeDocument/2006/math" xmlns="" val="1"/>
+              <ma14:wrappingTextBoxFlag xmlns="" xmlns:m="http://schemas.openxmlformats.org/officeDocument/2006/math" xmlns:a14="http://schemas.microsoft.com/office/drawing/2010/main" xmlns:ma14="http://schemas.microsoft.com/office/mac/drawingml/2011/main" val="1"/>
             </a:ext>
           </a:extLst>
         </p:spPr>
@@ -10316,7 +10188,7 @@
           </a:ln>
           <a:extLst>
             <a:ext uri="{C572A759-6A51-4108-AA02-DFA0A04FC94B}">
-              <ma14:wrappingTextBoxFlag xmlns:ma14="http://schemas.microsoft.com/office/mac/drawingml/2011/main" xmlns:a14="http://schemas.microsoft.com/office/drawing/2010/main" xmlns:m="http://schemas.openxmlformats.org/officeDocument/2006/math" xmlns="" val="1"/>
+              <ma14:wrappingTextBoxFlag xmlns="" xmlns:m="http://schemas.openxmlformats.org/officeDocument/2006/math" xmlns:a14="http://schemas.microsoft.com/office/drawing/2010/main" xmlns:ma14="http://schemas.microsoft.com/office/mac/drawingml/2011/main" val="1"/>
             </a:ext>
           </a:extLst>
         </p:spPr>
@@ -10367,7 +10239,7 @@
           </a:ln>
           <a:extLst>
             <a:ext uri="{C572A759-6A51-4108-AA02-DFA0A04FC94B}">
-              <ma14:wrappingTextBoxFlag xmlns:ma14="http://schemas.microsoft.com/office/mac/drawingml/2011/main" xmlns:a14="http://schemas.microsoft.com/office/drawing/2010/main" xmlns:m="http://schemas.openxmlformats.org/officeDocument/2006/math" xmlns="" val="1"/>
+              <ma14:wrappingTextBoxFlag xmlns="" xmlns:m="http://schemas.openxmlformats.org/officeDocument/2006/math" xmlns:a14="http://schemas.microsoft.com/office/drawing/2010/main" xmlns:ma14="http://schemas.microsoft.com/office/mac/drawingml/2011/main" val="1"/>
             </a:ext>
           </a:extLst>
         </p:spPr>
@@ -10491,7 +10363,7 @@
           </a:ln>
           <a:extLst>
             <a:ext uri="{C572A759-6A51-4108-AA02-DFA0A04FC94B}">
-              <ma14:wrappingTextBoxFlag xmlns:ma14="http://schemas.microsoft.com/office/mac/drawingml/2011/main" xmlns:a14="http://schemas.microsoft.com/office/drawing/2010/main" xmlns:m="http://schemas.openxmlformats.org/officeDocument/2006/math" xmlns="" val="1"/>
+              <ma14:wrappingTextBoxFlag xmlns="" xmlns:m="http://schemas.openxmlformats.org/officeDocument/2006/math" xmlns:a14="http://schemas.microsoft.com/office/drawing/2010/main" xmlns:ma14="http://schemas.microsoft.com/office/mac/drawingml/2011/main" val="1"/>
             </a:ext>
           </a:extLst>
         </p:spPr>
@@ -10585,7 +10457,7 @@
           </a:ln>
           <a:extLst>
             <a:ext uri="{C572A759-6A51-4108-AA02-DFA0A04FC94B}">
-              <ma14:wrappingTextBoxFlag xmlns:ma14="http://schemas.microsoft.com/office/mac/drawingml/2011/main" xmlns:a14="http://schemas.microsoft.com/office/drawing/2010/main" xmlns:m="http://schemas.openxmlformats.org/officeDocument/2006/math" xmlns="" val="1"/>
+              <ma14:wrappingTextBoxFlag xmlns="" xmlns:m="http://schemas.openxmlformats.org/officeDocument/2006/math" xmlns:a14="http://schemas.microsoft.com/office/drawing/2010/main" xmlns:ma14="http://schemas.microsoft.com/office/mac/drawingml/2011/main" val="1"/>
             </a:ext>
           </a:extLst>
         </p:spPr>
@@ -10632,7 +10504,7 @@
           </a:ln>
           <a:extLst>
             <a:ext uri="{C572A759-6A51-4108-AA02-DFA0A04FC94B}">
-              <ma14:wrappingTextBoxFlag xmlns:ma14="http://schemas.microsoft.com/office/mac/drawingml/2011/main" xmlns:a14="http://schemas.microsoft.com/office/drawing/2010/main" xmlns:m="http://schemas.openxmlformats.org/officeDocument/2006/math" xmlns="" val="1"/>
+              <ma14:wrappingTextBoxFlag xmlns="" xmlns:m="http://schemas.openxmlformats.org/officeDocument/2006/math" xmlns:a14="http://schemas.microsoft.com/office/drawing/2010/main" xmlns:ma14="http://schemas.microsoft.com/office/mac/drawingml/2011/main" val="1"/>
             </a:ext>
           </a:extLst>
         </p:spPr>
@@ -10665,6 +10537,7 @@
               </a:defRPr>
             </a:pPr>
             <a:r>
+              <a:rPr dirty="0"/>
               <a:t>HTTP/1.0 200 OK</a:t>
             </a:r>
           </a:p>
@@ -10692,6 +10565,7 @@
               </a:defRPr>
             </a:pPr>
             <a:r>
+              <a:rPr dirty="0"/>
               <a:t>Content-Type: text/html; charset=utf-8</a:t>
             </a:r>
           </a:p>
@@ -10719,6 +10593,7 @@
               </a:defRPr>
             </a:pPr>
             <a:r>
+              <a:rPr dirty="0"/>
               <a:t>Content-Length: 74</a:t>
             </a:r>
           </a:p>
@@ -10745,7 +10620,7 @@
                 <a:sym typeface="Menlo Regular"/>
               </a:defRPr>
             </a:pPr>
-            <a:endParaRPr/>
+            <a:endParaRPr dirty="0"/>
           </a:p>
           <a:p>
             <a:pPr algn="l" defTabSz="12700">
@@ -10778,6 +10653,7 @@
               </a:defRPr>
             </a:pPr>
             <a:r>
+              <a:rPr dirty="0"/>
               <a:t>&lt;html&gt;</a:t>
             </a:r>
           </a:p>
@@ -10812,6 +10688,7 @@
               </a:defRPr>
             </a:pPr>
             <a:r>
+              <a:rPr dirty="0"/>
               <a:t>  &lt;head&gt;&lt;script&gt;...&lt;/script&gt;&lt;/head&gt;</a:t>
             </a:r>
           </a:p>
@@ -10846,6 +10723,7 @@
               </a:defRPr>
             </a:pPr>
             <a:r>
+              <a:rPr dirty="0"/>
               <a:t>  &lt;body&gt;</a:t>
             </a:r>
           </a:p>
@@ -10880,6 +10758,7 @@
               </a:defRPr>
             </a:pPr>
             <a:r>
+              <a:rPr dirty="0"/>
               <a:t>    &lt;h1&gt;Welcome&lt;/h1&gt;</a:t>
             </a:r>
           </a:p>
@@ -10914,7 +10793,24 @@
               </a:defRPr>
             </a:pPr>
             <a:r>
-              <a:t>    &lt;a href="about.html"&gt;About&lt;/a&gt;</a:t>
+              <a:rPr dirty="0"/>
+              <a:t>    &lt;a </a:t>
+            </a:r>
+            <a:r>
+              <a:rPr dirty="0" err="1"/>
+              <a:t>href</a:t>
+            </a:r>
+            <a:r>
+              <a:rPr dirty="0"/>
+              <a:t>="</a:t>
+            </a:r>
+            <a:r>
+              <a:rPr dirty="0" err="1"/>
+              <a:t>about.html</a:t>
+            </a:r>
+            <a:r>
+              <a:rPr dirty="0"/>
+              <a:t>"&gt;About&lt;/a&gt;</a:t>
             </a:r>
           </a:p>
           <a:p>
@@ -10948,7 +10844,24 @@
               </a:defRPr>
             </a:pPr>
             <a:r>
-              <a:t>    &lt;a href="contact.html"&gt;Contact&lt;/a&gt;</a:t>
+              <a:rPr dirty="0"/>
+              <a:t>    &lt;a </a:t>
+            </a:r>
+            <a:r>
+              <a:rPr dirty="0" err="1"/>
+              <a:t>href</a:t>
+            </a:r>
+            <a:r>
+              <a:rPr dirty="0"/>
+              <a:t>="</a:t>
+            </a:r>
+            <a:r>
+              <a:rPr dirty="0" err="1"/>
+              <a:t>contact.html</a:t>
+            </a:r>
+            <a:r>
+              <a:rPr dirty="0"/>
+              <a:t>"&gt;Contact&lt;/a&gt;</a:t>
             </a:r>
           </a:p>
           <a:p>
@@ -10982,6 +10895,7 @@
               </a:defRPr>
             </a:pPr>
             <a:r>
+              <a:rPr dirty="0"/>
               <a:t>  &lt;/body&gt;</a:t>
             </a:r>
           </a:p>
@@ -11016,6 +10930,7 @@
               </a:defRPr>
             </a:pPr>
             <a:r>
+              <a:rPr dirty="0"/>
               <a:t>&lt;/html&gt;</a:t>
             </a:r>
           </a:p>
@@ -11280,7 +11195,7 @@
           </a:ln>
           <a:extLst>
             <a:ext uri="{C572A759-6A51-4108-AA02-DFA0A04FC94B}">
-              <ma14:wrappingTextBoxFlag xmlns:ma14="http://schemas.microsoft.com/office/mac/drawingml/2011/main" xmlns:a14="http://schemas.microsoft.com/office/drawing/2010/main" xmlns:m="http://schemas.openxmlformats.org/officeDocument/2006/math" xmlns="" val="1"/>
+              <ma14:wrappingTextBoxFlag xmlns="" xmlns:m="http://schemas.openxmlformats.org/officeDocument/2006/math" xmlns:a14="http://schemas.microsoft.com/office/drawing/2010/main" xmlns:ma14="http://schemas.microsoft.com/office/mac/drawingml/2011/main" val="1"/>
             </a:ext>
           </a:extLst>
         </p:spPr>
@@ -11495,7 +11410,7 @@
           </a:ln>
           <a:extLst>
             <a:ext uri="{C572A759-6A51-4108-AA02-DFA0A04FC94B}">
-              <ma14:wrappingTextBoxFlag xmlns:ma14="http://schemas.microsoft.com/office/mac/drawingml/2011/main" xmlns:a14="http://schemas.microsoft.com/office/drawing/2010/main" xmlns:m="http://schemas.openxmlformats.org/officeDocument/2006/math" xmlns="" val="1"/>
+              <ma14:wrappingTextBoxFlag xmlns="" xmlns:m="http://schemas.openxmlformats.org/officeDocument/2006/math" xmlns:a14="http://schemas.microsoft.com/office/drawing/2010/main" xmlns:ma14="http://schemas.microsoft.com/office/mac/drawingml/2011/main" val="1"/>
             </a:ext>
           </a:extLst>
         </p:spPr>
@@ -11551,7 +11466,7 @@
           </a:ln>
           <a:extLst>
             <a:ext uri="{C572A759-6A51-4108-AA02-DFA0A04FC94B}">
-              <ma14:wrappingTextBoxFlag xmlns:ma14="http://schemas.microsoft.com/office/mac/drawingml/2011/main" xmlns:a14="http://schemas.microsoft.com/office/drawing/2010/main" xmlns:m="http://schemas.openxmlformats.org/officeDocument/2006/math" xmlns="" val="1"/>
+              <ma14:wrappingTextBoxFlag xmlns="" xmlns:m="http://schemas.openxmlformats.org/officeDocument/2006/math" xmlns:a14="http://schemas.microsoft.com/office/drawing/2010/main" xmlns:ma14="http://schemas.microsoft.com/office/mac/drawingml/2011/main" val="1"/>
             </a:ext>
           </a:extLst>
         </p:spPr>
@@ -11570,10 +11485,11 @@
               </a:defRPr>
             </a:pPr>
             <a:r>
+              <a:rPr dirty="0"/>
               <a:t>IP address: </a:t>
             </a:r>
             <a:r>
-              <a:rPr>
+              <a:rPr dirty="0">
                 <a:latin typeface="Courier"/>
                 <a:ea typeface="Courier"/>
                 <a:cs typeface="Courier"/>
@@ -11706,7 +11622,7 @@
           </a:ln>
           <a:extLst>
             <a:ext uri="{C572A759-6A51-4108-AA02-DFA0A04FC94B}">
-              <ma14:wrappingTextBoxFlag xmlns:ma14="http://schemas.microsoft.com/office/mac/drawingml/2011/main" xmlns:a14="http://schemas.microsoft.com/office/drawing/2010/main" xmlns:m="http://schemas.openxmlformats.org/officeDocument/2006/math" xmlns="" val="1"/>
+              <ma14:wrappingTextBoxFlag xmlns="" xmlns:m="http://schemas.openxmlformats.org/officeDocument/2006/math" xmlns:a14="http://schemas.microsoft.com/office/drawing/2010/main" xmlns:ma14="http://schemas.microsoft.com/office/mac/drawingml/2011/main" val="1"/>
             </a:ext>
           </a:extLst>
         </p:spPr>
@@ -11803,7 +11719,7 @@
           </a:ln>
           <a:extLst>
             <a:ext uri="{C572A759-6A51-4108-AA02-DFA0A04FC94B}">
-              <ma14:wrappingTextBoxFlag xmlns:ma14="http://schemas.microsoft.com/office/mac/drawingml/2011/main" xmlns:a14="http://schemas.microsoft.com/office/drawing/2010/main" xmlns:m="http://schemas.openxmlformats.org/officeDocument/2006/math" xmlns="" val="1"/>
+              <ma14:wrappingTextBoxFlag xmlns="" xmlns:m="http://schemas.openxmlformats.org/officeDocument/2006/math" xmlns:a14="http://schemas.microsoft.com/office/drawing/2010/main" xmlns:ma14="http://schemas.microsoft.com/office/mac/drawingml/2011/main" val="1"/>
             </a:ext>
           </a:extLst>
         </p:spPr>
@@ -11868,8 +11784,8 @@
         </p:nvSpPr>
         <p:spPr>
           <a:xfrm>
-            <a:off x="4906686" y="5749290"/>
-            <a:ext cx="2921547" cy="2403724"/>
+            <a:off x="4906686" y="5749289"/>
+            <a:ext cx="3221926" cy="2620653"/>
           </a:xfrm>
           <a:prstGeom prst="rect">
             <a:avLst/>
@@ -11885,7 +11801,7 @@
           </a:ln>
           <a:extLst>
             <a:ext uri="{C572A759-6A51-4108-AA02-DFA0A04FC94B}">
-              <ma14:wrappingTextBoxFlag xmlns:ma14="http://schemas.microsoft.com/office/mac/drawingml/2011/main" xmlns:a14="http://schemas.microsoft.com/office/drawing/2010/main" xmlns:m="http://schemas.openxmlformats.org/officeDocument/2006/math" xmlns="" val="1"/>
+              <ma14:wrappingTextBoxFlag xmlns="" xmlns:m="http://schemas.openxmlformats.org/officeDocument/2006/math" xmlns:a14="http://schemas.microsoft.com/office/drawing/2010/main" xmlns:ma14="http://schemas.microsoft.com/office/mac/drawingml/2011/main" val="1"/>
             </a:ext>
           </a:extLst>
         </p:spPr>
@@ -11893,184 +11809,370 @@
           <a:bodyPr lIns="50800" tIns="50800" rIns="50800" bIns="50800"/>
           <a:lstStyle/>
           <a:p>
-            <a:pPr algn="l" defTabSz="457200">
-              <a:lnSpc>
-                <a:spcPts val="3900"/>
-              </a:lnSpc>
-              <a:defRPr sz="1900">
-                <a:solidFill>
-                  <a:srgbClr val="0000CD"/>
-                </a:solidFill>
-                <a:latin typeface="Courier New"/>
-                <a:ea typeface="Courier New"/>
-                <a:cs typeface="Courier New"/>
-                <a:sym typeface="Courier New"/>
-              </a:defRPr>
-            </a:pPr>
-            <a:r>
+            <a:pPr algn="l" defTabSz="12700">
+              <a:tabLst>
+                <a:tab pos="355600" algn="l"/>
+                <a:tab pos="711200" algn="l"/>
+                <a:tab pos="1066800" algn="l"/>
+                <a:tab pos="1422400" algn="l"/>
+                <a:tab pos="1778000" algn="l"/>
+                <a:tab pos="2133600" algn="l"/>
+                <a:tab pos="2489200" algn="l"/>
+                <a:tab pos="2844800" algn="l"/>
+                <a:tab pos="3200400" algn="l"/>
+                <a:tab pos="3556000" algn="l"/>
+                <a:tab pos="3911600" algn="l"/>
+                <a:tab pos="4267200" algn="l"/>
+              </a:tabLst>
+              <a:defRPr sz="2000">
+                <a:solidFill>
+                  <a:schemeClr val="accent5">
+                    <a:hueOff val="-82419"/>
+                    <a:satOff val="-9513"/>
+                    <a:lumOff val="-16343"/>
+                  </a:schemeClr>
+                </a:solidFill>
+                <a:latin typeface="Menlo Regular"/>
+                <a:ea typeface="Menlo Regular"/>
+                <a:cs typeface="Menlo Regular"/>
+                <a:sym typeface="Menlo Regular"/>
+              </a:defRPr>
+            </a:pPr>
+            <a:r>
+              <a:rPr lang="en-US" dirty="0">
+                <a:solidFill>
+                  <a:srgbClr val="0070C0"/>
+                </a:solidFill>
+              </a:rPr>
               <a:t>&lt;html&gt;</a:t>
             </a:r>
           </a:p>
           <a:p>
-            <a:pPr algn="l" defTabSz="457200">
-              <a:lnSpc>
-                <a:spcPts val="3900"/>
-              </a:lnSpc>
-              <a:defRPr sz="1900">
-                <a:solidFill>
-                  <a:srgbClr val="0000CD"/>
-                </a:solidFill>
-                <a:latin typeface="Courier New"/>
-                <a:ea typeface="Courier New"/>
-                <a:cs typeface="Courier New"/>
-                <a:sym typeface="Courier New"/>
-              </a:defRPr>
-            </a:pPr>
-            <a:r>
+            <a:pPr algn="l" defTabSz="12700">
+              <a:tabLst>
+                <a:tab pos="355600" algn="l"/>
+                <a:tab pos="711200" algn="l"/>
+                <a:tab pos="1066800" algn="l"/>
+                <a:tab pos="1422400" algn="l"/>
+                <a:tab pos="1778000" algn="l"/>
+                <a:tab pos="2133600" algn="l"/>
+                <a:tab pos="2489200" algn="l"/>
+                <a:tab pos="2844800" algn="l"/>
+                <a:tab pos="3200400" algn="l"/>
+                <a:tab pos="3556000" algn="l"/>
+                <a:tab pos="3911600" algn="l"/>
+                <a:tab pos="4267200" algn="l"/>
+              </a:tabLst>
+              <a:defRPr sz="2000">
+                <a:solidFill>
+                  <a:schemeClr val="accent5">
+                    <a:hueOff val="-82419"/>
+                    <a:satOff val="-9513"/>
+                    <a:lumOff val="-16343"/>
+                  </a:schemeClr>
+                </a:solidFill>
+                <a:latin typeface="Menlo Regular"/>
+                <a:ea typeface="Menlo Regular"/>
+                <a:cs typeface="Menlo Regular"/>
+                <a:sym typeface="Menlo Regular"/>
+              </a:defRPr>
+            </a:pPr>
+            <a:r>
+              <a:rPr lang="en-US" dirty="0">
+                <a:solidFill>
+                  <a:srgbClr val="0070C0"/>
+                </a:solidFill>
+              </a:rPr>
               <a:t>&lt;body&gt;</a:t>
             </a:r>
           </a:p>
           <a:p>
-            <a:pPr algn="l" defTabSz="457200">
-              <a:lnSpc>
-                <a:spcPts val="3900"/>
-              </a:lnSpc>
-              <a:defRPr sz="1900">
-                <a:solidFill>
-                  <a:srgbClr val="0000CD"/>
-                </a:solidFill>
-                <a:latin typeface="Courier New"/>
-                <a:ea typeface="Courier New"/>
-                <a:cs typeface="Courier New"/>
-                <a:sym typeface="Courier New"/>
-              </a:defRPr>
-            </a:pPr>
-            <a:r>
-              <a:t>&lt;img src="A.png"&gt;</a:t>
-            </a:r>
-          </a:p>
-          <a:p>
-            <a:pPr algn="l" defTabSz="457200">
-              <a:lnSpc>
-                <a:spcPts val="3900"/>
-              </a:lnSpc>
-              <a:defRPr sz="1900">
-                <a:solidFill>
-                  <a:srgbClr val="0000CD"/>
-                </a:solidFill>
-                <a:latin typeface="Courier New"/>
-                <a:ea typeface="Courier New"/>
-                <a:cs typeface="Courier New"/>
-                <a:sym typeface="Courier New"/>
-              </a:defRPr>
-            </a:pPr>
-            <a:r>
+            <a:pPr algn="l" defTabSz="12700">
+              <a:tabLst>
+                <a:tab pos="355600" algn="l"/>
+                <a:tab pos="711200" algn="l"/>
+                <a:tab pos="1066800" algn="l"/>
+                <a:tab pos="1422400" algn="l"/>
+                <a:tab pos="1778000" algn="l"/>
+                <a:tab pos="2133600" algn="l"/>
+                <a:tab pos="2489200" algn="l"/>
+                <a:tab pos="2844800" algn="l"/>
+                <a:tab pos="3200400" algn="l"/>
+                <a:tab pos="3556000" algn="l"/>
+                <a:tab pos="3911600" algn="l"/>
+                <a:tab pos="4267200" algn="l"/>
+              </a:tabLst>
+              <a:defRPr sz="2000">
+                <a:solidFill>
+                  <a:schemeClr val="accent5">
+                    <a:hueOff val="-82419"/>
+                    <a:satOff val="-9513"/>
+                    <a:lumOff val="-16343"/>
+                  </a:schemeClr>
+                </a:solidFill>
+                <a:latin typeface="Menlo Regular"/>
+                <a:ea typeface="Menlo Regular"/>
+                <a:cs typeface="Menlo Regular"/>
+                <a:sym typeface="Menlo Regular"/>
+              </a:defRPr>
+            </a:pPr>
+            <a:r>
+              <a:rPr lang="en-US" dirty="0">
+                <a:solidFill>
+                  <a:srgbClr val="0070C0"/>
+                </a:solidFill>
+              </a:rPr>
+              <a:t>&lt;img src=“</a:t>
+            </a:r>
+            <a:r>
+              <a:rPr lang="en-US" dirty="0" err="1">
+                <a:solidFill>
+                  <a:srgbClr val="0070C0"/>
+                </a:solidFill>
+              </a:rPr>
+              <a:t>A.png</a:t>
+            </a:r>
+            <a:r>
+              <a:rPr lang="en-US" dirty="0">
+                <a:solidFill>
+                  <a:srgbClr val="0070C0"/>
+                </a:solidFill>
+              </a:rPr>
+              <a:t>”&gt;</a:t>
+            </a:r>
+          </a:p>
+          <a:p>
+            <a:pPr algn="l" defTabSz="12700">
+              <a:tabLst>
+                <a:tab pos="355600" algn="l"/>
+                <a:tab pos="711200" algn="l"/>
+                <a:tab pos="1066800" algn="l"/>
+                <a:tab pos="1422400" algn="l"/>
+                <a:tab pos="1778000" algn="l"/>
+                <a:tab pos="2133600" algn="l"/>
+                <a:tab pos="2489200" algn="l"/>
+                <a:tab pos="2844800" algn="l"/>
+                <a:tab pos="3200400" algn="l"/>
+                <a:tab pos="3556000" algn="l"/>
+                <a:tab pos="3911600" algn="l"/>
+                <a:tab pos="4267200" algn="l"/>
+              </a:tabLst>
+              <a:defRPr sz="2000">
+                <a:solidFill>
+                  <a:schemeClr val="accent5">
+                    <a:hueOff val="-82419"/>
+                    <a:satOff val="-9513"/>
+                    <a:lumOff val="-16343"/>
+                  </a:schemeClr>
+                </a:solidFill>
+                <a:latin typeface="Menlo Regular"/>
+                <a:ea typeface="Menlo Regular"/>
+                <a:cs typeface="Menlo Regular"/>
+                <a:sym typeface="Menlo Regular"/>
+              </a:defRPr>
+            </a:pPr>
+            <a:r>
+              <a:rPr lang="en-US" dirty="0">
+                <a:solidFill>
+                  <a:srgbClr val="0070C0"/>
+                </a:solidFill>
+              </a:rPr>
               <a:t>&lt;b&gt;Hello&lt;/b&gt;</a:t>
             </a:r>
           </a:p>
           <a:p>
-            <a:pPr algn="l" defTabSz="457200">
-              <a:lnSpc>
-                <a:spcPts val="3900"/>
-              </a:lnSpc>
-              <a:defRPr sz="1900">
-                <a:solidFill>
-                  <a:srgbClr val="0000CD"/>
-                </a:solidFill>
-                <a:latin typeface="Courier New"/>
-                <a:ea typeface="Courier New"/>
-                <a:cs typeface="Courier New"/>
-                <a:sym typeface="Courier New"/>
-              </a:defRPr>
-            </a:pPr>
-            <a:r>
+            <a:pPr algn="l" defTabSz="12700">
+              <a:tabLst>
+                <a:tab pos="355600" algn="l"/>
+                <a:tab pos="711200" algn="l"/>
+                <a:tab pos="1066800" algn="l"/>
+                <a:tab pos="1422400" algn="l"/>
+                <a:tab pos="1778000" algn="l"/>
+                <a:tab pos="2133600" algn="l"/>
+                <a:tab pos="2489200" algn="l"/>
+                <a:tab pos="2844800" algn="l"/>
+                <a:tab pos="3200400" algn="l"/>
+                <a:tab pos="3556000" algn="l"/>
+                <a:tab pos="3911600" algn="l"/>
+                <a:tab pos="4267200" algn="l"/>
+              </a:tabLst>
+              <a:defRPr sz="2000">
+                <a:solidFill>
+                  <a:schemeClr val="accent5">
+                    <a:hueOff val="-82419"/>
+                    <a:satOff val="-9513"/>
+                    <a:lumOff val="-16343"/>
+                  </a:schemeClr>
+                </a:solidFill>
+                <a:latin typeface="Menlo Regular"/>
+                <a:ea typeface="Menlo Regular"/>
+                <a:cs typeface="Menlo Regular"/>
+                <a:sym typeface="Menlo Regular"/>
+              </a:defRPr>
+            </a:pPr>
+            <a:r>
+              <a:rPr lang="en-US" dirty="0">
+                <a:solidFill>
+                  <a:srgbClr val="0070C0"/>
+                </a:solidFill>
+              </a:rPr>
               <a:t>&lt;</a:t>
             </a:r>
             <a:r>
-              <a:rPr>
-                <a:solidFill>
-                  <a:srgbClr val="A52A2A"/>
+              <a:rPr lang="en-US" dirty="0"/>
+              <a:t>script src</a:t>
+            </a:r>
+            <a:r>
+              <a:rPr lang="en-US" dirty="0">
+                <a:solidFill>
+                  <a:srgbClr val="0070C0"/>
                 </a:solidFill>
               </a:rPr>
+              <a:t>=“</a:t>
+            </a:r>
+            <a:r>
+              <a:rPr lang="en-US" dirty="0" err="1">
+                <a:solidFill>
+                  <a:srgbClr val="0070C0"/>
+                </a:solidFill>
+              </a:rPr>
+              <a:t>B.js</a:t>
+            </a:r>
+            <a:r>
+              <a:rPr lang="en-US" dirty="0">
+                <a:solidFill>
+                  <a:srgbClr val="0070C0"/>
+                </a:solidFill>
+              </a:rPr>
+              <a:t>”&gt;</a:t>
+            </a:r>
+          </a:p>
+          <a:p>
+            <a:pPr algn="l" defTabSz="12700">
+              <a:tabLst>
+                <a:tab pos="355600" algn="l"/>
+                <a:tab pos="711200" algn="l"/>
+                <a:tab pos="1066800" algn="l"/>
+                <a:tab pos="1422400" algn="l"/>
+                <a:tab pos="1778000" algn="l"/>
+                <a:tab pos="2133600" algn="l"/>
+                <a:tab pos="2489200" algn="l"/>
+                <a:tab pos="2844800" algn="l"/>
+                <a:tab pos="3200400" algn="l"/>
+                <a:tab pos="3556000" algn="l"/>
+                <a:tab pos="3911600" algn="l"/>
+                <a:tab pos="4267200" algn="l"/>
+              </a:tabLst>
+              <a:defRPr sz="2000">
+                <a:solidFill>
+                  <a:schemeClr val="accent5">
+                    <a:hueOff val="-82419"/>
+                    <a:satOff val="-9513"/>
+                    <a:lumOff val="-16343"/>
+                  </a:schemeClr>
+                </a:solidFill>
+                <a:latin typeface="Menlo Regular"/>
+                <a:ea typeface="Menlo Regular"/>
+                <a:cs typeface="Menlo Regular"/>
+                <a:sym typeface="Menlo Regular"/>
+              </a:defRPr>
+            </a:pPr>
+            <a:r>
+              <a:rPr lang="en-US" dirty="0">
+                <a:solidFill>
+                  <a:srgbClr val="0070C0"/>
+                </a:solidFill>
+              </a:rPr>
+              <a:t>&lt;/</a:t>
+            </a:r>
+            <a:r>
+              <a:rPr lang="en-US" dirty="0"/>
               <a:t>script</a:t>
             </a:r>
             <a:r>
-              <a:rPr>
-                <a:solidFill>
-                  <a:srgbClr val="FF0000"/>
+              <a:rPr lang="en-US" dirty="0">
+                <a:solidFill>
+                  <a:srgbClr val="0070C0"/>
                 </a:solidFill>
               </a:rPr>
-              <a:t> src</a:t>
-            </a:r>
-            <a:r>
-              <a:t>="B.js"&gt;</a:t>
-            </a:r>
-          </a:p>
-          <a:p>
-            <a:pPr algn="l" defTabSz="457200">
-              <a:lnSpc>
-                <a:spcPts val="3900"/>
-              </a:lnSpc>
-              <a:defRPr sz="1900">
-                <a:solidFill>
-                  <a:srgbClr val="0000CD"/>
-                </a:solidFill>
-                <a:latin typeface="Courier New"/>
-                <a:ea typeface="Courier New"/>
-                <a:cs typeface="Courier New"/>
-                <a:sym typeface="Courier New"/>
-              </a:defRPr>
-            </a:pPr>
-            <a:r>
-              <a:t>&lt;</a:t>
-            </a:r>
-            <a:r>
-              <a:rPr>
-                <a:solidFill>
-                  <a:srgbClr val="A52A2A"/>
+              <a:t>&gt;</a:t>
+            </a:r>
+          </a:p>
+          <a:p>
+            <a:pPr algn="l" defTabSz="12700">
+              <a:tabLst>
+                <a:tab pos="355600" algn="l"/>
+                <a:tab pos="711200" algn="l"/>
+                <a:tab pos="1066800" algn="l"/>
+                <a:tab pos="1422400" algn="l"/>
+                <a:tab pos="1778000" algn="l"/>
+                <a:tab pos="2133600" algn="l"/>
+                <a:tab pos="2489200" algn="l"/>
+                <a:tab pos="2844800" algn="l"/>
+                <a:tab pos="3200400" algn="l"/>
+                <a:tab pos="3556000" algn="l"/>
+                <a:tab pos="3911600" algn="l"/>
+                <a:tab pos="4267200" algn="l"/>
+              </a:tabLst>
+              <a:defRPr sz="2000">
+                <a:solidFill>
+                  <a:schemeClr val="accent5">
+                    <a:hueOff val="-82419"/>
+                    <a:satOff val="-9513"/>
+                    <a:lumOff val="-16343"/>
+                  </a:schemeClr>
+                </a:solidFill>
+                <a:latin typeface="Menlo Regular"/>
+                <a:ea typeface="Menlo Regular"/>
+                <a:cs typeface="Menlo Regular"/>
+                <a:sym typeface="Menlo Regular"/>
+              </a:defRPr>
+            </a:pPr>
+            <a:r>
+              <a:rPr lang="en-US" dirty="0">
+                <a:solidFill>
+                  <a:srgbClr val="0070C0"/>
                 </a:solidFill>
               </a:rPr>
-              <a:t>/script</a:t>
-            </a:r>
-            <a:r>
-              <a:t>&gt;</a:t>
-            </a:r>
-          </a:p>
-          <a:p>
-            <a:pPr algn="l" defTabSz="457200">
-              <a:lnSpc>
-                <a:spcPts val="3900"/>
-              </a:lnSpc>
-              <a:defRPr sz="1900">
-                <a:solidFill>
-                  <a:srgbClr val="0000CD"/>
-                </a:solidFill>
-                <a:latin typeface="Courier New"/>
-                <a:ea typeface="Courier New"/>
-                <a:cs typeface="Courier New"/>
-                <a:sym typeface="Courier New"/>
-              </a:defRPr>
-            </a:pPr>
-            <a:r>
               <a:t>&lt;/body&gt;</a:t>
             </a:r>
           </a:p>
           <a:p>
-            <a:pPr algn="l" defTabSz="457200">
-              <a:lnSpc>
-                <a:spcPts val="3900"/>
-              </a:lnSpc>
-              <a:defRPr sz="1900">
-                <a:solidFill>
-                  <a:srgbClr val="0000CD"/>
-                </a:solidFill>
-                <a:latin typeface="Courier New"/>
-                <a:ea typeface="Courier New"/>
-                <a:cs typeface="Courier New"/>
-                <a:sym typeface="Courier New"/>
-              </a:defRPr>
-            </a:pPr>
-            <a:r>
+            <a:pPr algn="l" defTabSz="12700">
+              <a:tabLst>
+                <a:tab pos="355600" algn="l"/>
+                <a:tab pos="711200" algn="l"/>
+                <a:tab pos="1066800" algn="l"/>
+                <a:tab pos="1422400" algn="l"/>
+                <a:tab pos="1778000" algn="l"/>
+                <a:tab pos="2133600" algn="l"/>
+                <a:tab pos="2489200" algn="l"/>
+                <a:tab pos="2844800" algn="l"/>
+                <a:tab pos="3200400" algn="l"/>
+                <a:tab pos="3556000" algn="l"/>
+                <a:tab pos="3911600" algn="l"/>
+                <a:tab pos="4267200" algn="l"/>
+              </a:tabLst>
+              <a:defRPr sz="2000">
+                <a:solidFill>
+                  <a:schemeClr val="accent5">
+                    <a:hueOff val="-82419"/>
+                    <a:satOff val="-9513"/>
+                    <a:lumOff val="-16343"/>
+                  </a:schemeClr>
+                </a:solidFill>
+                <a:latin typeface="Menlo Regular"/>
+                <a:ea typeface="Menlo Regular"/>
+                <a:cs typeface="Menlo Regular"/>
+                <a:sym typeface="Menlo Regular"/>
+              </a:defRPr>
+            </a:pPr>
+            <a:r>
+              <a:rPr lang="en-US" dirty="0">
+                <a:solidFill>
+                  <a:srgbClr val="0070C0"/>
+                </a:solidFill>
+              </a:rPr>
               <a:t>&lt;/html&gt;</a:t>
             </a:r>
           </a:p>
@@ -12095,7 +12197,7 @@
           </a:ln>
           <a:extLst>
             <a:ext uri="{C572A759-6A51-4108-AA02-DFA0A04FC94B}">
-              <ma14:wrappingTextBoxFlag xmlns:ma14="http://schemas.microsoft.com/office/mac/drawingml/2011/main" xmlns:a14="http://schemas.microsoft.com/office/drawing/2010/main" xmlns:m="http://schemas.openxmlformats.org/officeDocument/2006/math" xmlns="" val="1"/>
+              <ma14:wrappingTextBoxFlag xmlns="" xmlns:m="http://schemas.openxmlformats.org/officeDocument/2006/math" xmlns:a14="http://schemas.microsoft.com/office/drawing/2010/main" xmlns:ma14="http://schemas.microsoft.com/office/mac/drawingml/2011/main" val="1"/>
             </a:ext>
           </a:extLst>
         </p:spPr>
@@ -12107,7 +12209,7 @@
           <a:p>
             <a:pPr algn="l"/>
             <a:r>
-              <a:rPr>
+              <a:rPr dirty="0">
                 <a:latin typeface="Gill Sans"/>
                 <a:ea typeface="Gill Sans"/>
                 <a:cs typeface="Gill Sans"/>
@@ -12116,9 +12218,10 @@
               <a:t>requests</a:t>
             </a:r>
             <a:r>
+              <a:rPr dirty="0"/>
               <a:t> module (FAST!)</a:t>
             </a:r>
-            <a:endParaRPr>
+            <a:endParaRPr dirty="0">
               <a:solidFill>
                 <a:schemeClr val="accent5">
                   <a:hueOff val="-82419"/>
@@ -12134,7 +12237,7 @@
               <a:buChar char="-"/>
             </a:pPr>
             <a:r>
-              <a:rPr>
+              <a:rPr dirty="0">
                 <a:solidFill>
                   <a:schemeClr val="accent3">
                     <a:hueOff val="362282"/>
@@ -12146,17 +12249,34 @@
               <a:t>can</a:t>
             </a:r>
             <a:r>
-              <a:t> fetch .html, .js, .etc file</a:t>
+              <a:rPr dirty="0"/>
+              <a:t> fetch .html, .</a:t>
+            </a:r>
+            <a:r>
+              <a:rPr dirty="0" err="1"/>
+              <a:t>js</a:t>
+            </a:r>
+            <a:r>
+              <a:rPr dirty="0"/>
+              <a:t>, .</a:t>
+            </a:r>
+            <a:r>
+              <a:rPr dirty="0" err="1"/>
+              <a:t>etc</a:t>
+            </a:r>
+            <a:r>
+              <a:rPr dirty="0"/>
+              <a:t> file</a:t>
             </a:r>
           </a:p>
           <a:p>
             <a:pPr algn="l"/>
-            <a:endParaRPr/>
+            <a:endParaRPr dirty="0"/>
           </a:p>
           <a:p>
             <a:pPr algn="l"/>
             <a:r>
-              <a:rPr>
+              <a:rPr dirty="0">
                 <a:latin typeface="Gill Sans"/>
                 <a:ea typeface="Gill Sans"/>
                 <a:cs typeface="Gill Sans"/>
@@ -12164,7 +12284,7 @@
               </a:rPr>
               <a:t>Selenium</a:t>
             </a:r>
-            <a:endParaRPr>
+            <a:endParaRPr dirty="0">
               <a:solidFill>
                 <a:schemeClr val="accent5">
                   <a:hueOff val="-82419"/>
@@ -12180,7 +12300,7 @@
               <a:buChar char="-"/>
             </a:pPr>
             <a:r>
-              <a:rPr>
+              <a:rPr dirty="0">
                 <a:solidFill>
                   <a:schemeClr val="accent3">
                     <a:hueOff val="362282"/>
@@ -12192,7 +12312,24 @@
               <a:t>can</a:t>
             </a:r>
             <a:r>
-              <a:t> fetch .html, .js, .etc file</a:t>
+              <a:rPr dirty="0"/>
+              <a:t> fetch .html, .</a:t>
+            </a:r>
+            <a:r>
+              <a:rPr dirty="0" err="1"/>
+              <a:t>js</a:t>
+            </a:r>
+            <a:r>
+              <a:rPr dirty="0"/>
+              <a:t>, .</a:t>
+            </a:r>
+            <a:r>
+              <a:rPr dirty="0" err="1"/>
+              <a:t>etc</a:t>
+            </a:r>
+            <a:r>
+              <a:rPr dirty="0"/>
+              <a:t> file</a:t>
             </a:r>
           </a:p>
           <a:p>
@@ -12201,7 +12338,7 @@
               <a:buChar char="-"/>
             </a:pPr>
             <a:r>
-              <a:rPr>
+              <a:rPr dirty="0">
                 <a:solidFill>
                   <a:schemeClr val="accent3">
                     <a:hueOff val="362282"/>
@@ -12213,7 +12350,16 @@
               <a:t>can</a:t>
             </a:r>
             <a:r>
-              <a:t> run a .js file in browser</a:t>
+              <a:rPr dirty="0"/>
+              <a:t> run a .</a:t>
+            </a:r>
+            <a:r>
+              <a:rPr dirty="0" err="1"/>
+              <a:t>js</a:t>
+            </a:r>
+            <a:r>
+              <a:rPr dirty="0"/>
+              <a:t> file in browser</a:t>
             </a:r>
           </a:p>
           <a:p>
@@ -12222,7 +12368,7 @@
               <a:buChar char="-"/>
             </a:pPr>
             <a:r>
-              <a:rPr>
+              <a:rPr dirty="0">
                 <a:solidFill>
                   <a:schemeClr val="accent3">
                     <a:hueOff val="362282"/>
@@ -12234,6 +12380,7 @@
               <a:t>can</a:t>
             </a:r>
             <a:r>
+              <a:rPr dirty="0"/>
               <a:t> grab HTML version of DOM after JavaScript has modified it</a:t>
             </a:r>
           </a:p>
@@ -12258,7 +12405,7 @@
           </a:ln>
           <a:extLst>
             <a:ext uri="{C572A759-6A51-4108-AA02-DFA0A04FC94B}">
-              <ma14:wrappingTextBoxFlag xmlns:ma14="http://schemas.microsoft.com/office/mac/drawingml/2011/main" xmlns:a14="http://schemas.microsoft.com/office/drawing/2010/main" xmlns:m="http://schemas.openxmlformats.org/officeDocument/2006/math" xmlns="" val="1"/>
+              <ma14:wrappingTextBoxFlag xmlns="" xmlns:m="http://schemas.openxmlformats.org/officeDocument/2006/math" xmlns:a14="http://schemas.microsoft.com/office/drawing/2010/main" xmlns:ma14="http://schemas.microsoft.com/office/mac/drawingml/2011/main" val="1"/>
             </a:ext>
           </a:extLst>
         </p:spPr>
@@ -12522,7 +12669,7 @@
           </a:ln>
           <a:extLst>
             <a:ext uri="{C572A759-6A51-4108-AA02-DFA0A04FC94B}">
-              <ma14:wrappingTextBoxFlag xmlns:ma14="http://schemas.microsoft.com/office/mac/drawingml/2011/main" xmlns:a14="http://schemas.microsoft.com/office/drawing/2010/main" xmlns:m="http://schemas.openxmlformats.org/officeDocument/2006/math" xmlns="" val="1"/>
+              <ma14:wrappingTextBoxFlag xmlns="" xmlns:m="http://schemas.openxmlformats.org/officeDocument/2006/math" xmlns:a14="http://schemas.microsoft.com/office/drawing/2010/main" xmlns:ma14="http://schemas.microsoft.com/office/mac/drawingml/2011/main" val="1"/>
             </a:ext>
           </a:extLst>
         </p:spPr>
@@ -12577,7 +12724,7 @@
           </a:ln>
           <a:extLst>
             <a:ext uri="{C572A759-6A51-4108-AA02-DFA0A04FC94B}">
-              <ma14:wrappingTextBoxFlag xmlns:ma14="http://schemas.microsoft.com/office/mac/drawingml/2011/main" xmlns:a14="http://schemas.microsoft.com/office/drawing/2010/main" xmlns:m="http://schemas.openxmlformats.org/officeDocument/2006/math" xmlns="" val="1"/>
+              <ma14:wrappingTextBoxFlag xmlns="" xmlns:m="http://schemas.openxmlformats.org/officeDocument/2006/math" xmlns:a14="http://schemas.microsoft.com/office/drawing/2010/main" xmlns:ma14="http://schemas.microsoft.com/office/mac/drawingml/2011/main" val="1"/>
             </a:ext>
           </a:extLst>
         </p:spPr>
@@ -12726,7 +12873,7 @@
           </a:ln>
           <a:extLst>
             <a:ext uri="{C572A759-6A51-4108-AA02-DFA0A04FC94B}">
-              <ma14:wrappingTextBoxFlag xmlns:ma14="http://schemas.microsoft.com/office/mac/drawingml/2011/main" xmlns:a14="http://schemas.microsoft.com/office/drawing/2010/main" xmlns:m="http://schemas.openxmlformats.org/officeDocument/2006/math" xmlns="" val="1"/>
+              <ma14:wrappingTextBoxFlag xmlns="" xmlns:m="http://schemas.openxmlformats.org/officeDocument/2006/math" xmlns:a14="http://schemas.microsoft.com/office/drawing/2010/main" xmlns:ma14="http://schemas.microsoft.com/office/mac/drawingml/2011/main" val="1"/>
             </a:ext>
           </a:extLst>
         </p:spPr>
@@ -12782,7 +12929,7 @@
           </a:ln>
           <a:extLst>
             <a:ext uri="{C572A759-6A51-4108-AA02-DFA0A04FC94B}">
-              <ma14:wrappingTextBoxFlag xmlns:ma14="http://schemas.microsoft.com/office/mac/drawingml/2011/main" xmlns:a14="http://schemas.microsoft.com/office/drawing/2010/main" xmlns:m="http://schemas.openxmlformats.org/officeDocument/2006/math" xmlns="" val="1"/>
+              <ma14:wrappingTextBoxFlag xmlns="" xmlns:m="http://schemas.openxmlformats.org/officeDocument/2006/math" xmlns:a14="http://schemas.microsoft.com/office/drawing/2010/main" xmlns:ma14="http://schemas.microsoft.com/office/mac/drawingml/2011/main" val="1"/>
             </a:ext>
           </a:extLst>
         </p:spPr>
@@ -12937,7 +13084,7 @@
           </a:ln>
           <a:extLst>
             <a:ext uri="{C572A759-6A51-4108-AA02-DFA0A04FC94B}">
-              <ma14:wrappingTextBoxFlag xmlns:ma14="http://schemas.microsoft.com/office/mac/drawingml/2011/main" xmlns:a14="http://schemas.microsoft.com/office/drawing/2010/main" xmlns:m="http://schemas.openxmlformats.org/officeDocument/2006/math" xmlns="" val="1"/>
+              <ma14:wrappingTextBoxFlag xmlns="" xmlns:m="http://schemas.openxmlformats.org/officeDocument/2006/math" xmlns:a14="http://schemas.microsoft.com/office/drawing/2010/main" xmlns:ma14="http://schemas.microsoft.com/office/mac/drawingml/2011/main" val="1"/>
             </a:ext>
           </a:extLst>
         </p:spPr>
@@ -13034,7 +13181,7 @@
           </a:ln>
           <a:extLst>
             <a:ext uri="{C572A759-6A51-4108-AA02-DFA0A04FC94B}">
-              <ma14:wrappingTextBoxFlag xmlns:ma14="http://schemas.microsoft.com/office/mac/drawingml/2011/main" xmlns:a14="http://schemas.microsoft.com/office/drawing/2010/main" xmlns:m="http://schemas.openxmlformats.org/officeDocument/2006/math" xmlns="" val="1"/>
+              <ma14:wrappingTextBoxFlag xmlns="" xmlns:m="http://schemas.openxmlformats.org/officeDocument/2006/math" xmlns:a14="http://schemas.microsoft.com/office/drawing/2010/main" xmlns:ma14="http://schemas.microsoft.com/office/mac/drawingml/2011/main" val="1"/>
             </a:ext>
           </a:extLst>
         </p:spPr>
@@ -13097,240 +13244,24 @@
       </p:sp>
       <p:sp>
         <p:nvSpPr>
-          <p:cNvPr id="417" name="&lt;html&gt;…"/>
-          <p:cNvSpPr/>
-          <p:nvPr/>
-        </p:nvSpPr>
-        <p:spPr>
-          <a:xfrm>
-            <a:off x="4777903" y="4618067"/>
-            <a:ext cx="2921547" cy="2403724"/>
+          <p:cNvPr id="418" name="requests module (FAST!)…"/>
+          <p:cNvSpPr txBox="1"/>
+          <p:nvPr/>
+        </p:nvSpPr>
+        <p:spPr>
+          <a:xfrm>
+            <a:off x="1028700" y="1383655"/>
+            <a:ext cx="8662938" cy="2593182"/>
           </a:xfrm>
           <a:prstGeom prst="rect">
             <a:avLst/>
           </a:prstGeom>
-          <a:solidFill>
-            <a:srgbClr val="FFFFFF"/>
-          </a:solidFill>
           <a:ln w="12700">
-            <a:solidFill>
-              <a:srgbClr val="FF2600"/>
-            </a:solidFill>
             <a:miter lim="400000"/>
           </a:ln>
           <a:extLst>
             <a:ext uri="{C572A759-6A51-4108-AA02-DFA0A04FC94B}">
-              <ma14:wrappingTextBoxFlag xmlns:ma14="http://schemas.microsoft.com/office/mac/drawingml/2011/main" xmlns:a14="http://schemas.microsoft.com/office/drawing/2010/main" xmlns:m="http://schemas.openxmlformats.org/officeDocument/2006/math" xmlns="" val="1"/>
-            </a:ext>
-          </a:extLst>
-        </p:spPr>
-        <p:txBody>
-          <a:bodyPr lIns="50800" tIns="50800" rIns="50800" bIns="50800"/>
-          <a:lstStyle/>
-          <a:p>
-            <a:pPr algn="l" defTabSz="457200">
-              <a:lnSpc>
-                <a:spcPts val="3900"/>
-              </a:lnSpc>
-              <a:defRPr sz="1900">
-                <a:solidFill>
-                  <a:srgbClr val="0000CD"/>
-                </a:solidFill>
-                <a:latin typeface="Courier New"/>
-                <a:ea typeface="Courier New"/>
-                <a:cs typeface="Courier New"/>
-                <a:sym typeface="Courier New"/>
-              </a:defRPr>
-            </a:pPr>
-            <a:r>
-              <a:t>&lt;html&gt;</a:t>
-            </a:r>
-          </a:p>
-          <a:p>
-            <a:pPr algn="l" defTabSz="457200">
-              <a:lnSpc>
-                <a:spcPts val="3900"/>
-              </a:lnSpc>
-              <a:defRPr sz="1900">
-                <a:solidFill>
-                  <a:srgbClr val="0000CD"/>
-                </a:solidFill>
-                <a:latin typeface="Courier New"/>
-                <a:ea typeface="Courier New"/>
-                <a:cs typeface="Courier New"/>
-                <a:sym typeface="Courier New"/>
-              </a:defRPr>
-            </a:pPr>
-            <a:r>
-              <a:t>&lt;body&gt;</a:t>
-            </a:r>
-          </a:p>
-          <a:p>
-            <a:pPr algn="l" defTabSz="457200">
-              <a:lnSpc>
-                <a:spcPts val="3900"/>
-              </a:lnSpc>
-              <a:defRPr sz="1900">
-                <a:solidFill>
-                  <a:srgbClr val="0000CD"/>
-                </a:solidFill>
-                <a:latin typeface="Courier New"/>
-                <a:ea typeface="Courier New"/>
-                <a:cs typeface="Courier New"/>
-                <a:sym typeface="Courier New"/>
-              </a:defRPr>
-            </a:pPr>
-            <a:r>
-              <a:t>&lt;img src="A.png"&gt;</a:t>
-            </a:r>
-          </a:p>
-          <a:p>
-            <a:pPr algn="l" defTabSz="457200">
-              <a:lnSpc>
-                <a:spcPts val="3900"/>
-              </a:lnSpc>
-              <a:defRPr sz="1900">
-                <a:solidFill>
-                  <a:srgbClr val="0000CD"/>
-                </a:solidFill>
-                <a:latin typeface="Courier New"/>
-                <a:ea typeface="Courier New"/>
-                <a:cs typeface="Courier New"/>
-                <a:sym typeface="Courier New"/>
-              </a:defRPr>
-            </a:pPr>
-            <a:r>
-              <a:t>&lt;b&gt;Hello&lt;/b&gt;</a:t>
-            </a:r>
-          </a:p>
-          <a:p>
-            <a:pPr algn="l" defTabSz="457200">
-              <a:lnSpc>
-                <a:spcPts val="3900"/>
-              </a:lnSpc>
-              <a:defRPr sz="1900">
-                <a:solidFill>
-                  <a:srgbClr val="0000CD"/>
-                </a:solidFill>
-                <a:latin typeface="Courier New"/>
-                <a:ea typeface="Courier New"/>
-                <a:cs typeface="Courier New"/>
-                <a:sym typeface="Courier New"/>
-              </a:defRPr>
-            </a:pPr>
-            <a:r>
-              <a:t>&lt;</a:t>
-            </a:r>
-            <a:r>
-              <a:rPr>
-                <a:solidFill>
-                  <a:srgbClr val="A52A2A"/>
-                </a:solidFill>
-              </a:rPr>
-              <a:t>script</a:t>
-            </a:r>
-            <a:r>
-              <a:rPr>
-                <a:solidFill>
-                  <a:srgbClr val="FF0000"/>
-                </a:solidFill>
-              </a:rPr>
-              <a:t> src</a:t>
-            </a:r>
-            <a:r>
-              <a:t>="B.js"&gt;</a:t>
-            </a:r>
-          </a:p>
-          <a:p>
-            <a:pPr algn="l" defTabSz="457200">
-              <a:lnSpc>
-                <a:spcPts val="3900"/>
-              </a:lnSpc>
-              <a:defRPr sz="1900">
-                <a:solidFill>
-                  <a:srgbClr val="0000CD"/>
-                </a:solidFill>
-                <a:latin typeface="Courier New"/>
-                <a:ea typeface="Courier New"/>
-                <a:cs typeface="Courier New"/>
-                <a:sym typeface="Courier New"/>
-              </a:defRPr>
-            </a:pPr>
-            <a:r>
-              <a:t>&lt;</a:t>
-            </a:r>
-            <a:r>
-              <a:rPr>
-                <a:solidFill>
-                  <a:srgbClr val="A52A2A"/>
-                </a:solidFill>
-              </a:rPr>
-              <a:t>/script</a:t>
-            </a:r>
-            <a:r>
-              <a:t>&gt;</a:t>
-            </a:r>
-          </a:p>
-          <a:p>
-            <a:pPr algn="l" defTabSz="457200">
-              <a:lnSpc>
-                <a:spcPts val="3900"/>
-              </a:lnSpc>
-              <a:defRPr sz="1900">
-                <a:solidFill>
-                  <a:srgbClr val="0000CD"/>
-                </a:solidFill>
-                <a:latin typeface="Courier New"/>
-                <a:ea typeface="Courier New"/>
-                <a:cs typeface="Courier New"/>
-                <a:sym typeface="Courier New"/>
-              </a:defRPr>
-            </a:pPr>
-            <a:r>
-              <a:t>&lt;/body&gt;</a:t>
-            </a:r>
-          </a:p>
-          <a:p>
-            <a:pPr algn="l" defTabSz="457200">
-              <a:lnSpc>
-                <a:spcPts val="3900"/>
-              </a:lnSpc>
-              <a:defRPr sz="1900">
-                <a:solidFill>
-                  <a:srgbClr val="0000CD"/>
-                </a:solidFill>
-                <a:latin typeface="Courier New"/>
-                <a:ea typeface="Courier New"/>
-                <a:cs typeface="Courier New"/>
-                <a:sym typeface="Courier New"/>
-              </a:defRPr>
-            </a:pPr>
-            <a:r>
-              <a:t>&lt;/html&gt;</a:t>
-            </a:r>
-          </a:p>
-        </p:txBody>
-      </p:sp>
-      <p:sp>
-        <p:nvSpPr>
-          <p:cNvPr id="418" name="requests module (FAST!)…"/>
-          <p:cNvSpPr txBox="1"/>
-          <p:nvPr/>
-        </p:nvSpPr>
-        <p:spPr>
-          <a:xfrm>
-            <a:off x="1028700" y="1383655"/>
-            <a:ext cx="8662938" cy="2593182"/>
-          </a:xfrm>
-          <a:prstGeom prst="rect">
-            <a:avLst/>
-          </a:prstGeom>
-          <a:ln w="12700">
-            <a:miter lim="400000"/>
-          </a:ln>
-          <a:extLst>
-            <a:ext uri="{C572A759-6A51-4108-AA02-DFA0A04FC94B}">
-              <ma14:wrappingTextBoxFlag xmlns:ma14="http://schemas.microsoft.com/office/mac/drawingml/2011/main" xmlns:a14="http://schemas.microsoft.com/office/drawing/2010/main" xmlns:m="http://schemas.openxmlformats.org/officeDocument/2006/math" xmlns="" val="1"/>
+              <ma14:wrappingTextBoxFlag xmlns="" xmlns:m="http://schemas.openxmlformats.org/officeDocument/2006/math" xmlns:a14="http://schemas.microsoft.com/office/drawing/2010/main" xmlns:ma14="http://schemas.microsoft.com/office/mac/drawingml/2011/main" val="1"/>
             </a:ext>
           </a:extLst>
         </p:spPr>
@@ -13722,7 +13653,7 @@
           </a:ln>
           <a:extLst>
             <a:ext uri="{C572A759-6A51-4108-AA02-DFA0A04FC94B}">
-              <ma14:wrappingTextBoxFlag xmlns:ma14="http://schemas.microsoft.com/office/mac/drawingml/2011/main" xmlns:a14="http://schemas.microsoft.com/office/drawing/2010/main" xmlns:m="http://schemas.openxmlformats.org/officeDocument/2006/math" xmlns="" val="1"/>
+              <ma14:wrappingTextBoxFlag xmlns="" xmlns:m="http://schemas.openxmlformats.org/officeDocument/2006/math" xmlns:a14="http://schemas.microsoft.com/office/drawing/2010/main" xmlns:ma14="http://schemas.microsoft.com/office/mac/drawingml/2011/main" val="1"/>
             </a:ext>
           </a:extLst>
         </p:spPr>
@@ -13804,7 +13735,7 @@
           </a:ln>
           <a:extLst>
             <a:ext uri="{C572A759-6A51-4108-AA02-DFA0A04FC94B}">
-              <ma14:wrappingTextBoxFlag xmlns:ma14="http://schemas.microsoft.com/office/mac/drawingml/2011/main" xmlns:a14="http://schemas.microsoft.com/office/drawing/2010/main" xmlns:m="http://schemas.openxmlformats.org/officeDocument/2006/math" xmlns="" val="1"/>
+              <ma14:wrappingTextBoxFlag xmlns="" xmlns:m="http://schemas.openxmlformats.org/officeDocument/2006/math" xmlns:a14="http://schemas.microsoft.com/office/drawing/2010/main" xmlns:ma14="http://schemas.microsoft.com/office/mac/drawingml/2011/main" val="1"/>
             </a:ext>
           </a:extLst>
         </p:spPr>
@@ -13852,7 +13783,7 @@
           </a:ln>
           <a:extLst>
             <a:ext uri="{C572A759-6A51-4108-AA02-DFA0A04FC94B}">
-              <ma14:wrappingTextBoxFlag xmlns:ma14="http://schemas.microsoft.com/office/mac/drawingml/2011/main" xmlns:a14="http://schemas.microsoft.com/office/drawing/2010/main" xmlns:m="http://schemas.openxmlformats.org/officeDocument/2006/math" xmlns="" val="1"/>
+              <ma14:wrappingTextBoxFlag xmlns="" xmlns:m="http://schemas.openxmlformats.org/officeDocument/2006/math" xmlns:a14="http://schemas.microsoft.com/office/drawing/2010/main" xmlns:ma14="http://schemas.microsoft.com/office/mac/drawingml/2011/main" val="1"/>
             </a:ext>
           </a:extLst>
         </p:spPr>
@@ -14023,7 +13954,7 @@
           </a:ln>
           <a:extLst>
             <a:ext uri="{C572A759-6A51-4108-AA02-DFA0A04FC94B}">
-              <ma14:wrappingTextBoxFlag xmlns:ma14="http://schemas.microsoft.com/office/mac/drawingml/2011/main" xmlns:a14="http://schemas.microsoft.com/office/drawing/2010/main" xmlns:m="http://schemas.openxmlformats.org/officeDocument/2006/math" xmlns="" val="1"/>
+              <ma14:wrappingTextBoxFlag xmlns="" xmlns:m="http://schemas.openxmlformats.org/officeDocument/2006/math" xmlns:a14="http://schemas.microsoft.com/office/drawing/2010/main" xmlns:ma14="http://schemas.microsoft.com/office/mac/drawingml/2011/main" val="1"/>
             </a:ext>
           </a:extLst>
         </p:spPr>
@@ -14119,7 +14050,7 @@
           </a:ln>
           <a:extLst>
             <a:ext uri="{C572A759-6A51-4108-AA02-DFA0A04FC94B}">
-              <ma14:wrappingTextBoxFlag xmlns:ma14="http://schemas.microsoft.com/office/mac/drawingml/2011/main" xmlns:a14="http://schemas.microsoft.com/office/drawing/2010/main" xmlns:m="http://schemas.openxmlformats.org/officeDocument/2006/math" xmlns="" val="1"/>
+              <ma14:wrappingTextBoxFlag xmlns="" xmlns:m="http://schemas.openxmlformats.org/officeDocument/2006/math" xmlns:a14="http://schemas.microsoft.com/office/drawing/2010/main" xmlns:ma14="http://schemas.microsoft.com/office/mac/drawingml/2011/main" val="1"/>
             </a:ext>
           </a:extLst>
         </p:spPr>
@@ -14199,7 +14130,7 @@
           </a:ln>
           <a:extLst>
             <a:ext uri="{C572A759-6A51-4108-AA02-DFA0A04FC94B}">
-              <ma14:wrappingTextBoxFlag xmlns:ma14="http://schemas.microsoft.com/office/mac/drawingml/2011/main" xmlns:a14="http://schemas.microsoft.com/office/drawing/2010/main" xmlns:m="http://schemas.openxmlformats.org/officeDocument/2006/math" xmlns="" val="1"/>
+              <ma14:wrappingTextBoxFlag xmlns="" xmlns:m="http://schemas.openxmlformats.org/officeDocument/2006/math" xmlns:a14="http://schemas.microsoft.com/office/drawing/2010/main" xmlns:ma14="http://schemas.microsoft.com/office/mac/drawingml/2011/main" val="1"/>
             </a:ext>
           </a:extLst>
         </p:spPr>
@@ -14215,6 +14146,367 @@
           <a:p>
             <a:r>
               <a:t>...</a:t>
+            </a:r>
+          </a:p>
+        </p:txBody>
+      </p:sp>
+      <p:sp>
+        <p:nvSpPr>
+          <p:cNvPr id="3" name="&lt;html&gt;…">
+            <a:extLst>
+              <a:ext uri="{FF2B5EF4-FFF2-40B4-BE49-F238E27FC236}">
+                <a16:creationId xmlns:a16="http://schemas.microsoft.com/office/drawing/2014/main" id="{878F58C5-D704-A868-0B14-FB9751083C67}"/>
+              </a:ext>
+            </a:extLst>
+          </p:cNvPr>
+          <p:cNvSpPr/>
+          <p:nvPr/>
+        </p:nvSpPr>
+        <p:spPr>
+          <a:xfrm>
+            <a:off x="4732284" y="4475579"/>
+            <a:ext cx="3221926" cy="2620653"/>
+          </a:xfrm>
+          <a:prstGeom prst="rect">
+            <a:avLst/>
+          </a:prstGeom>
+          <a:solidFill>
+            <a:srgbClr val="FFFFFF"/>
+          </a:solidFill>
+          <a:ln w="12700">
+            <a:solidFill>
+              <a:srgbClr val="FF2600"/>
+            </a:solidFill>
+            <a:miter lim="400000"/>
+          </a:ln>
+          <a:extLst>
+            <a:ext uri="{C572A759-6A51-4108-AA02-DFA0A04FC94B}">
+              <ma14:wrappingTextBoxFlag xmlns="" xmlns:m="http://schemas.openxmlformats.org/officeDocument/2006/math" xmlns:a14="http://schemas.microsoft.com/office/drawing/2010/main" xmlns:ma14="http://schemas.microsoft.com/office/mac/drawingml/2011/main" val="1"/>
+            </a:ext>
+          </a:extLst>
+        </p:spPr>
+        <p:txBody>
+          <a:bodyPr lIns="50800" tIns="50800" rIns="50800" bIns="50800"/>
+          <a:lstStyle/>
+          <a:p>
+            <a:pPr algn="l" defTabSz="12700">
+              <a:tabLst>
+                <a:tab pos="355600" algn="l"/>
+                <a:tab pos="711200" algn="l"/>
+                <a:tab pos="1066800" algn="l"/>
+                <a:tab pos="1422400" algn="l"/>
+                <a:tab pos="1778000" algn="l"/>
+                <a:tab pos="2133600" algn="l"/>
+                <a:tab pos="2489200" algn="l"/>
+                <a:tab pos="2844800" algn="l"/>
+                <a:tab pos="3200400" algn="l"/>
+                <a:tab pos="3556000" algn="l"/>
+                <a:tab pos="3911600" algn="l"/>
+                <a:tab pos="4267200" algn="l"/>
+              </a:tabLst>
+              <a:defRPr sz="2000">
+                <a:solidFill>
+                  <a:schemeClr val="accent5">
+                    <a:hueOff val="-82419"/>
+                    <a:satOff val="-9513"/>
+                    <a:lumOff val="-16343"/>
+                  </a:schemeClr>
+                </a:solidFill>
+                <a:latin typeface="Menlo Regular"/>
+                <a:ea typeface="Menlo Regular"/>
+                <a:cs typeface="Menlo Regular"/>
+                <a:sym typeface="Menlo Regular"/>
+              </a:defRPr>
+            </a:pPr>
+            <a:r>
+              <a:rPr lang="en-US" dirty="0">
+                <a:solidFill>
+                  <a:srgbClr val="0070C0"/>
+                </a:solidFill>
+              </a:rPr>
+              <a:t>&lt;html&gt;</a:t>
+            </a:r>
+          </a:p>
+          <a:p>
+            <a:pPr algn="l" defTabSz="12700">
+              <a:tabLst>
+                <a:tab pos="355600" algn="l"/>
+                <a:tab pos="711200" algn="l"/>
+                <a:tab pos="1066800" algn="l"/>
+                <a:tab pos="1422400" algn="l"/>
+                <a:tab pos="1778000" algn="l"/>
+                <a:tab pos="2133600" algn="l"/>
+                <a:tab pos="2489200" algn="l"/>
+                <a:tab pos="2844800" algn="l"/>
+                <a:tab pos="3200400" algn="l"/>
+                <a:tab pos="3556000" algn="l"/>
+                <a:tab pos="3911600" algn="l"/>
+                <a:tab pos="4267200" algn="l"/>
+              </a:tabLst>
+              <a:defRPr sz="2000">
+                <a:solidFill>
+                  <a:schemeClr val="accent5">
+                    <a:hueOff val="-82419"/>
+                    <a:satOff val="-9513"/>
+                    <a:lumOff val="-16343"/>
+                  </a:schemeClr>
+                </a:solidFill>
+                <a:latin typeface="Menlo Regular"/>
+                <a:ea typeface="Menlo Regular"/>
+                <a:cs typeface="Menlo Regular"/>
+                <a:sym typeface="Menlo Regular"/>
+              </a:defRPr>
+            </a:pPr>
+            <a:r>
+              <a:rPr lang="en-US" dirty="0">
+                <a:solidFill>
+                  <a:srgbClr val="0070C0"/>
+                </a:solidFill>
+              </a:rPr>
+              <a:t>&lt;body&gt;</a:t>
+            </a:r>
+          </a:p>
+          <a:p>
+            <a:pPr algn="l" defTabSz="12700">
+              <a:tabLst>
+                <a:tab pos="355600" algn="l"/>
+                <a:tab pos="711200" algn="l"/>
+                <a:tab pos="1066800" algn="l"/>
+                <a:tab pos="1422400" algn="l"/>
+                <a:tab pos="1778000" algn="l"/>
+                <a:tab pos="2133600" algn="l"/>
+                <a:tab pos="2489200" algn="l"/>
+                <a:tab pos="2844800" algn="l"/>
+                <a:tab pos="3200400" algn="l"/>
+                <a:tab pos="3556000" algn="l"/>
+                <a:tab pos="3911600" algn="l"/>
+                <a:tab pos="4267200" algn="l"/>
+              </a:tabLst>
+              <a:defRPr sz="2000">
+                <a:solidFill>
+                  <a:schemeClr val="accent5">
+                    <a:hueOff val="-82419"/>
+                    <a:satOff val="-9513"/>
+                    <a:lumOff val="-16343"/>
+                  </a:schemeClr>
+                </a:solidFill>
+                <a:latin typeface="Menlo Regular"/>
+                <a:ea typeface="Menlo Regular"/>
+                <a:cs typeface="Menlo Regular"/>
+                <a:sym typeface="Menlo Regular"/>
+              </a:defRPr>
+            </a:pPr>
+            <a:r>
+              <a:rPr lang="en-US" dirty="0">
+                <a:solidFill>
+                  <a:srgbClr val="0070C0"/>
+                </a:solidFill>
+              </a:rPr>
+              <a:t>&lt;img src=“A.png”&gt;</a:t>
+            </a:r>
+          </a:p>
+          <a:p>
+            <a:pPr algn="l" defTabSz="12700">
+              <a:tabLst>
+                <a:tab pos="355600" algn="l"/>
+                <a:tab pos="711200" algn="l"/>
+                <a:tab pos="1066800" algn="l"/>
+                <a:tab pos="1422400" algn="l"/>
+                <a:tab pos="1778000" algn="l"/>
+                <a:tab pos="2133600" algn="l"/>
+                <a:tab pos="2489200" algn="l"/>
+                <a:tab pos="2844800" algn="l"/>
+                <a:tab pos="3200400" algn="l"/>
+                <a:tab pos="3556000" algn="l"/>
+                <a:tab pos="3911600" algn="l"/>
+                <a:tab pos="4267200" algn="l"/>
+              </a:tabLst>
+              <a:defRPr sz="2000">
+                <a:solidFill>
+                  <a:schemeClr val="accent5">
+                    <a:hueOff val="-82419"/>
+                    <a:satOff val="-9513"/>
+                    <a:lumOff val="-16343"/>
+                  </a:schemeClr>
+                </a:solidFill>
+                <a:latin typeface="Menlo Regular"/>
+                <a:ea typeface="Menlo Regular"/>
+                <a:cs typeface="Menlo Regular"/>
+                <a:sym typeface="Menlo Regular"/>
+              </a:defRPr>
+            </a:pPr>
+            <a:r>
+              <a:rPr lang="en-US" dirty="0">
+                <a:solidFill>
+                  <a:srgbClr val="0070C0"/>
+                </a:solidFill>
+              </a:rPr>
+              <a:t>&lt;b&gt;Hello&lt;/b&gt;</a:t>
+            </a:r>
+          </a:p>
+          <a:p>
+            <a:pPr algn="l" defTabSz="12700">
+              <a:tabLst>
+                <a:tab pos="355600" algn="l"/>
+                <a:tab pos="711200" algn="l"/>
+                <a:tab pos="1066800" algn="l"/>
+                <a:tab pos="1422400" algn="l"/>
+                <a:tab pos="1778000" algn="l"/>
+                <a:tab pos="2133600" algn="l"/>
+                <a:tab pos="2489200" algn="l"/>
+                <a:tab pos="2844800" algn="l"/>
+                <a:tab pos="3200400" algn="l"/>
+                <a:tab pos="3556000" algn="l"/>
+                <a:tab pos="3911600" algn="l"/>
+                <a:tab pos="4267200" algn="l"/>
+              </a:tabLst>
+              <a:defRPr sz="2000">
+                <a:solidFill>
+                  <a:schemeClr val="accent5">
+                    <a:hueOff val="-82419"/>
+                    <a:satOff val="-9513"/>
+                    <a:lumOff val="-16343"/>
+                  </a:schemeClr>
+                </a:solidFill>
+                <a:latin typeface="Menlo Regular"/>
+                <a:ea typeface="Menlo Regular"/>
+                <a:cs typeface="Menlo Regular"/>
+                <a:sym typeface="Menlo Regular"/>
+              </a:defRPr>
+            </a:pPr>
+            <a:r>
+              <a:rPr lang="en-US" dirty="0"/>
+              <a:t>&lt;script src</a:t>
+            </a:r>
+            <a:r>
+              <a:rPr lang="en-US" dirty="0">
+                <a:solidFill>
+                  <a:srgbClr val="0070C0"/>
+                </a:solidFill>
+              </a:rPr>
+              <a:t>=“B.js”</a:t>
+            </a:r>
+            <a:r>
+              <a:rPr lang="en-US" dirty="0"/>
+              <a:t>&gt;</a:t>
+            </a:r>
+          </a:p>
+          <a:p>
+            <a:pPr algn="l" defTabSz="12700">
+              <a:tabLst>
+                <a:tab pos="355600" algn="l"/>
+                <a:tab pos="711200" algn="l"/>
+                <a:tab pos="1066800" algn="l"/>
+                <a:tab pos="1422400" algn="l"/>
+                <a:tab pos="1778000" algn="l"/>
+                <a:tab pos="2133600" algn="l"/>
+                <a:tab pos="2489200" algn="l"/>
+                <a:tab pos="2844800" algn="l"/>
+                <a:tab pos="3200400" algn="l"/>
+                <a:tab pos="3556000" algn="l"/>
+                <a:tab pos="3911600" algn="l"/>
+                <a:tab pos="4267200" algn="l"/>
+              </a:tabLst>
+              <a:defRPr sz="2000">
+                <a:solidFill>
+                  <a:schemeClr val="accent5">
+                    <a:hueOff val="-82419"/>
+                    <a:satOff val="-9513"/>
+                    <a:lumOff val="-16343"/>
+                  </a:schemeClr>
+                </a:solidFill>
+                <a:latin typeface="Menlo Regular"/>
+                <a:ea typeface="Menlo Regular"/>
+                <a:cs typeface="Menlo Regular"/>
+                <a:sym typeface="Menlo Regular"/>
+              </a:defRPr>
+            </a:pPr>
+            <a:r>
+              <a:rPr lang="en-US" dirty="0"/>
+              <a:t>&lt;/script&gt;</a:t>
+            </a:r>
+            <a:endParaRPr lang="en-US" dirty="0">
+              <a:solidFill>
+                <a:srgbClr val="0070C0"/>
+              </a:solidFill>
+            </a:endParaRPr>
+          </a:p>
+          <a:p>
+            <a:pPr algn="l" defTabSz="12700">
+              <a:tabLst>
+                <a:tab pos="355600" algn="l"/>
+                <a:tab pos="711200" algn="l"/>
+                <a:tab pos="1066800" algn="l"/>
+                <a:tab pos="1422400" algn="l"/>
+                <a:tab pos="1778000" algn="l"/>
+                <a:tab pos="2133600" algn="l"/>
+                <a:tab pos="2489200" algn="l"/>
+                <a:tab pos="2844800" algn="l"/>
+                <a:tab pos="3200400" algn="l"/>
+                <a:tab pos="3556000" algn="l"/>
+                <a:tab pos="3911600" algn="l"/>
+                <a:tab pos="4267200" algn="l"/>
+              </a:tabLst>
+              <a:defRPr sz="2000">
+                <a:solidFill>
+                  <a:schemeClr val="accent5">
+                    <a:hueOff val="-82419"/>
+                    <a:satOff val="-9513"/>
+                    <a:lumOff val="-16343"/>
+                  </a:schemeClr>
+                </a:solidFill>
+                <a:latin typeface="Menlo Regular"/>
+                <a:ea typeface="Menlo Regular"/>
+                <a:cs typeface="Menlo Regular"/>
+                <a:sym typeface="Menlo Regular"/>
+              </a:defRPr>
+            </a:pPr>
+            <a:r>
+              <a:rPr lang="en-US" dirty="0">
+                <a:solidFill>
+                  <a:srgbClr val="0070C0"/>
+                </a:solidFill>
+              </a:rPr>
+              <a:t>&lt;/body&gt;</a:t>
+            </a:r>
+          </a:p>
+          <a:p>
+            <a:pPr algn="l" defTabSz="12700">
+              <a:tabLst>
+                <a:tab pos="355600" algn="l"/>
+                <a:tab pos="711200" algn="l"/>
+                <a:tab pos="1066800" algn="l"/>
+                <a:tab pos="1422400" algn="l"/>
+                <a:tab pos="1778000" algn="l"/>
+                <a:tab pos="2133600" algn="l"/>
+                <a:tab pos="2489200" algn="l"/>
+                <a:tab pos="2844800" algn="l"/>
+                <a:tab pos="3200400" algn="l"/>
+                <a:tab pos="3556000" algn="l"/>
+                <a:tab pos="3911600" algn="l"/>
+                <a:tab pos="4267200" algn="l"/>
+              </a:tabLst>
+              <a:defRPr sz="2000">
+                <a:solidFill>
+                  <a:schemeClr val="accent5">
+                    <a:hueOff val="-82419"/>
+                    <a:satOff val="-9513"/>
+                    <a:lumOff val="-16343"/>
+                  </a:schemeClr>
+                </a:solidFill>
+                <a:latin typeface="Menlo Regular"/>
+                <a:ea typeface="Menlo Regular"/>
+                <a:cs typeface="Menlo Regular"/>
+                <a:sym typeface="Menlo Regular"/>
+              </a:defRPr>
+            </a:pPr>
+            <a:r>
+              <a:rPr lang="en-US" dirty="0">
+                <a:solidFill>
+                  <a:srgbClr val="0070C0"/>
+                </a:solidFill>
+              </a:rPr>
+              <a:t>&lt;/html&gt;</a:t>
             </a:r>
           </a:p>
         </p:txBody>
@@ -14469,7 +14761,7 @@
           </a:ln>
           <a:extLst>
             <a:ext uri="{C572A759-6A51-4108-AA02-DFA0A04FC94B}">
-              <ma14:wrappingTextBoxFlag xmlns:ma14="http://schemas.microsoft.com/office/mac/drawingml/2011/main" xmlns:a14="http://schemas.microsoft.com/office/drawing/2010/main" xmlns:m="http://schemas.openxmlformats.org/officeDocument/2006/math" xmlns="" val="1"/>
+              <ma14:wrappingTextBoxFlag xmlns="" xmlns:m="http://schemas.openxmlformats.org/officeDocument/2006/math" xmlns:a14="http://schemas.microsoft.com/office/drawing/2010/main" xmlns:ma14="http://schemas.microsoft.com/office/mac/drawingml/2011/main" val="1"/>
             </a:ext>
           </a:extLst>
         </p:spPr>
@@ -14754,7 +15046,7 @@
           </a:ln>
           <a:extLst>
             <a:ext uri="{C572A759-6A51-4108-AA02-DFA0A04FC94B}">
-              <ma14:wrappingTextBoxFlag xmlns:ma14="http://schemas.microsoft.com/office/mac/drawingml/2011/main" xmlns:a14="http://schemas.microsoft.com/office/drawing/2010/main" xmlns:m="http://schemas.openxmlformats.org/officeDocument/2006/math" xmlns="" val="1"/>
+              <ma14:wrappingTextBoxFlag xmlns="" xmlns:m="http://schemas.openxmlformats.org/officeDocument/2006/math" xmlns:a14="http://schemas.microsoft.com/office/drawing/2010/main" xmlns:ma14="http://schemas.microsoft.com/office/mac/drawingml/2011/main" val="1"/>
             </a:ext>
           </a:extLst>
         </p:spPr>
@@ -14836,7 +15128,7 @@
           </a:ln>
           <a:extLst>
             <a:ext uri="{C572A759-6A51-4108-AA02-DFA0A04FC94B}">
-              <ma14:wrappingTextBoxFlag xmlns:ma14="http://schemas.microsoft.com/office/mac/drawingml/2011/main" xmlns:a14="http://schemas.microsoft.com/office/drawing/2010/main" xmlns:m="http://schemas.openxmlformats.org/officeDocument/2006/math" xmlns="" val="1"/>
+              <ma14:wrappingTextBoxFlag xmlns="" xmlns:m="http://schemas.openxmlformats.org/officeDocument/2006/math" xmlns:a14="http://schemas.microsoft.com/office/drawing/2010/main" xmlns:ma14="http://schemas.microsoft.com/office/mac/drawingml/2011/main" val="1"/>
             </a:ext>
           </a:extLst>
         </p:spPr>
@@ -15007,7 +15299,7 @@
           </a:ln>
           <a:extLst>
             <a:ext uri="{C572A759-6A51-4108-AA02-DFA0A04FC94B}">
-              <ma14:wrappingTextBoxFlag xmlns:ma14="http://schemas.microsoft.com/office/mac/drawingml/2011/main" xmlns:a14="http://schemas.microsoft.com/office/drawing/2010/main" xmlns:m="http://schemas.openxmlformats.org/officeDocument/2006/math" xmlns="" val="1"/>
+              <ma14:wrappingTextBoxFlag xmlns="" xmlns:m="http://schemas.openxmlformats.org/officeDocument/2006/math" xmlns:a14="http://schemas.microsoft.com/office/drawing/2010/main" xmlns:ma14="http://schemas.microsoft.com/office/mac/drawingml/2011/main" val="1"/>
             </a:ext>
           </a:extLst>
         </p:spPr>
@@ -15054,7 +15346,7 @@
           </a:ln>
           <a:extLst>
             <a:ext uri="{C572A759-6A51-4108-AA02-DFA0A04FC94B}">
-              <ma14:wrappingTextBoxFlag xmlns:ma14="http://schemas.microsoft.com/office/mac/drawingml/2011/main" xmlns:a14="http://schemas.microsoft.com/office/drawing/2010/main" xmlns:m="http://schemas.openxmlformats.org/officeDocument/2006/math" xmlns="" val="1"/>
+              <ma14:wrappingTextBoxFlag xmlns="" xmlns:m="http://schemas.openxmlformats.org/officeDocument/2006/math" xmlns:a14="http://schemas.microsoft.com/office/drawing/2010/main" xmlns:ma14="http://schemas.microsoft.com/office/mac/drawingml/2011/main" val="1"/>
             </a:ext>
           </a:extLst>
         </p:spPr>
@@ -15225,7 +15517,7 @@
           </a:ln>
           <a:extLst>
             <a:ext uri="{C572A759-6A51-4108-AA02-DFA0A04FC94B}">
-              <ma14:wrappingTextBoxFlag xmlns:ma14="http://schemas.microsoft.com/office/mac/drawingml/2011/main" xmlns:a14="http://schemas.microsoft.com/office/drawing/2010/main" xmlns:m="http://schemas.openxmlformats.org/officeDocument/2006/math" xmlns="" val="1"/>
+              <ma14:wrappingTextBoxFlag xmlns="" xmlns:m="http://schemas.openxmlformats.org/officeDocument/2006/math" xmlns:a14="http://schemas.microsoft.com/office/drawing/2010/main" xmlns:ma14="http://schemas.microsoft.com/office/mac/drawingml/2011/main" val="1"/>
             </a:ext>
           </a:extLst>
         </p:spPr>
@@ -15333,7 +15625,7 @@
           </a:ln>
           <a:extLst>
             <a:ext uri="{C572A759-6A51-4108-AA02-DFA0A04FC94B}">
-              <ma14:wrappingTextBoxFlag xmlns:ma14="http://schemas.microsoft.com/office/mac/drawingml/2011/main" xmlns:a14="http://schemas.microsoft.com/office/drawing/2010/main" xmlns:m="http://schemas.openxmlformats.org/officeDocument/2006/math" xmlns="" val="1"/>
+              <ma14:wrappingTextBoxFlag xmlns="" xmlns:m="http://schemas.openxmlformats.org/officeDocument/2006/math" xmlns:a14="http://schemas.microsoft.com/office/drawing/2010/main" xmlns:ma14="http://schemas.microsoft.com/office/mac/drawingml/2011/main" val="1"/>
             </a:ext>
           </a:extLst>
         </p:spPr>
@@ -15536,7 +15828,7 @@
           </a:ln>
           <a:extLst>
             <a:ext uri="{C572A759-6A51-4108-AA02-DFA0A04FC94B}">
-              <ma14:wrappingTextBoxFlag xmlns:ma14="http://schemas.microsoft.com/office/mac/drawingml/2011/main" xmlns:a14="http://schemas.microsoft.com/office/drawing/2010/main" xmlns:m="http://schemas.openxmlformats.org/officeDocument/2006/math" xmlns="" val="1"/>
+              <ma14:wrappingTextBoxFlag xmlns="" xmlns:m="http://schemas.openxmlformats.org/officeDocument/2006/math" xmlns:a14="http://schemas.microsoft.com/office/drawing/2010/main" xmlns:ma14="http://schemas.microsoft.com/office/mac/drawingml/2011/main" val="1"/>
             </a:ext>
           </a:extLst>
         </p:spPr>
@@ -15594,8 +15886,8 @@
         </p:nvSpPr>
         <p:spPr>
           <a:xfrm>
-            <a:off x="1410946" y="1581149"/>
-            <a:ext cx="9956007" cy="457201"/>
+            <a:off x="285516" y="1573788"/>
+            <a:ext cx="12206868" cy="471924"/>
           </a:xfrm>
           <a:prstGeom prst="rect">
             <a:avLst/>
@@ -15605,7 +15897,7 @@
           </a:ln>
           <a:extLst>
             <a:ext uri="{C572A759-6A51-4108-AA02-DFA0A04FC94B}">
-              <ma14:wrappingTextBoxFlag xmlns:ma14="http://schemas.microsoft.com/office/mac/drawingml/2011/main" xmlns:a14="http://schemas.microsoft.com/office/drawing/2010/main" xmlns:m="http://schemas.openxmlformats.org/officeDocument/2006/math" xmlns="" val="1"/>
+              <ma14:wrappingTextBoxFlag xmlns="" xmlns:m="http://schemas.openxmlformats.org/officeDocument/2006/math" xmlns:a14="http://schemas.microsoft.com/office/drawing/2010/main" xmlns:ma14="http://schemas.microsoft.com/office/mac/drawingml/2011/main" val="1"/>
             </a:ext>
           </a:extLst>
         </p:spPr>
@@ -15622,11 +15914,14 @@
           </a:lstStyle>
           <a:p>
             <a:r>
-              <a:rPr>
+              <a:rPr lang="en-US" dirty="0">
                 <a:hlinkClick r:id="rId9"/>
               </a:rPr>
-              <a:t>https://github.com/cs320-wisc/f22/tree/main/p3#part-3-web-crawling-websearcher</a:t>
-            </a:r>
+              <a:t>https://github.com/msyamkumar/cs320-s23-projects/tree/main/p3#part-3-web-crawling-websearcher</a:t>
+            </a:r>
+            <a:endParaRPr dirty="0">
+              <a:hlinkClick r:id="rId9"/>
+            </a:endParaRPr>
           </a:p>
         </p:txBody>
       </p:sp>
@@ -15649,7 +15944,7 @@
           </a:ln>
           <a:extLst>
             <a:ext uri="{C572A759-6A51-4108-AA02-DFA0A04FC94B}">
-              <ma14:wrappingTextBoxFlag xmlns:ma14="http://schemas.microsoft.com/office/mac/drawingml/2011/main" xmlns:a14="http://schemas.microsoft.com/office/drawing/2010/main" xmlns:m="http://schemas.openxmlformats.org/officeDocument/2006/math" xmlns="" val="1"/>
+              <ma14:wrappingTextBoxFlag xmlns="" xmlns:m="http://schemas.openxmlformats.org/officeDocument/2006/math" xmlns:a14="http://schemas.microsoft.com/office/drawing/2010/main" xmlns:ma14="http://schemas.microsoft.com/office/mac/drawingml/2011/main" val="1"/>
             </a:ext>
           </a:extLst>
         </p:spPr>
@@ -15785,7 +16080,7 @@
           </a:ln>
           <a:extLst>
             <a:ext uri="{C572A759-6A51-4108-AA02-DFA0A04FC94B}">
-              <ma14:wrappingTextBoxFlag xmlns:ma14="http://schemas.microsoft.com/office/mac/drawingml/2011/main" xmlns:a14="http://schemas.microsoft.com/office/drawing/2010/main" xmlns:m="http://schemas.openxmlformats.org/officeDocument/2006/math" xmlns="" val="1"/>
+              <ma14:wrappingTextBoxFlag xmlns="" xmlns:m="http://schemas.openxmlformats.org/officeDocument/2006/math" xmlns:a14="http://schemas.microsoft.com/office/drawing/2010/main" xmlns:ma14="http://schemas.microsoft.com/office/mac/drawingml/2011/main" val="1"/>
             </a:ext>
           </a:extLst>
         </p:spPr>
@@ -15820,7 +16115,7 @@
           </a:ln>
           <a:extLst>
             <a:ext uri="{C572A759-6A51-4108-AA02-DFA0A04FC94B}">
-              <ma14:wrappingTextBoxFlag xmlns:ma14="http://schemas.microsoft.com/office/mac/drawingml/2011/main" xmlns:a14="http://schemas.microsoft.com/office/drawing/2010/main" xmlns:m="http://schemas.openxmlformats.org/officeDocument/2006/math" xmlns="" val="1"/>
+              <ma14:wrappingTextBoxFlag xmlns="" xmlns:m="http://schemas.openxmlformats.org/officeDocument/2006/math" xmlns:a14="http://schemas.microsoft.com/office/drawing/2010/main" xmlns:ma14="http://schemas.microsoft.com/office/mac/drawingml/2011/main" val="1"/>
             </a:ext>
           </a:extLst>
         </p:spPr>
@@ -15855,7 +16150,7 @@
           </a:ln>
           <a:extLst>
             <a:ext uri="{C572A759-6A51-4108-AA02-DFA0A04FC94B}">
-              <ma14:wrappingTextBoxFlag xmlns:ma14="http://schemas.microsoft.com/office/mac/drawingml/2011/main" xmlns:a14="http://schemas.microsoft.com/office/drawing/2010/main" xmlns:m="http://schemas.openxmlformats.org/officeDocument/2006/math" xmlns="" val="1"/>
+              <ma14:wrappingTextBoxFlag xmlns="" xmlns:m="http://schemas.openxmlformats.org/officeDocument/2006/math" xmlns:a14="http://schemas.microsoft.com/office/drawing/2010/main" xmlns:ma14="http://schemas.microsoft.com/office/mac/drawingml/2011/main" val="1"/>
             </a:ext>
           </a:extLst>
         </p:spPr>
@@ -15890,7 +16185,7 @@
           </a:ln>
           <a:extLst>
             <a:ext uri="{C572A759-6A51-4108-AA02-DFA0A04FC94B}">
-              <ma14:wrappingTextBoxFlag xmlns:ma14="http://schemas.microsoft.com/office/mac/drawingml/2011/main" xmlns:a14="http://schemas.microsoft.com/office/drawing/2010/main" xmlns:m="http://schemas.openxmlformats.org/officeDocument/2006/math" xmlns="" val="1"/>
+              <ma14:wrappingTextBoxFlag xmlns="" xmlns:m="http://schemas.openxmlformats.org/officeDocument/2006/math" xmlns:a14="http://schemas.microsoft.com/office/drawing/2010/main" xmlns:ma14="http://schemas.microsoft.com/office/mac/drawingml/2011/main" val="1"/>
             </a:ext>
           </a:extLst>
         </p:spPr>
@@ -15928,7 +16223,7 @@
           </a:ln>
           <a:extLst>
             <a:ext uri="{C572A759-6A51-4108-AA02-DFA0A04FC94B}">
-              <ma14:wrappingTextBoxFlag xmlns:ma14="http://schemas.microsoft.com/office/mac/drawingml/2011/main" xmlns:a14="http://schemas.microsoft.com/office/drawing/2010/main" xmlns:m="http://schemas.openxmlformats.org/officeDocument/2006/math" xmlns="" val="1"/>
+              <ma14:wrappingTextBoxFlag xmlns="" xmlns:m="http://schemas.openxmlformats.org/officeDocument/2006/math" xmlns:a14="http://schemas.microsoft.com/office/drawing/2010/main" xmlns:ma14="http://schemas.microsoft.com/office/mac/drawingml/2011/main" val="1"/>
             </a:ext>
           </a:extLst>
         </p:spPr>
@@ -15976,7 +16271,7 @@
           </a:ln>
           <a:extLst>
             <a:ext uri="{C572A759-6A51-4108-AA02-DFA0A04FC94B}">
-              <ma14:wrappingTextBoxFlag xmlns:ma14="http://schemas.microsoft.com/office/mac/drawingml/2011/main" xmlns:a14="http://schemas.microsoft.com/office/drawing/2010/main" xmlns:m="http://schemas.openxmlformats.org/officeDocument/2006/math" xmlns="" val="1"/>
+              <ma14:wrappingTextBoxFlag xmlns="" xmlns:m="http://schemas.openxmlformats.org/officeDocument/2006/math" xmlns:a14="http://schemas.microsoft.com/office/drawing/2010/main" xmlns:ma14="http://schemas.microsoft.com/office/mac/drawingml/2011/main" val="1"/>
             </a:ext>
           </a:extLst>
         </p:spPr>
@@ -16024,7 +16319,7 @@
           </a:ln>
           <a:extLst>
             <a:ext uri="{C572A759-6A51-4108-AA02-DFA0A04FC94B}">
-              <ma14:wrappingTextBoxFlag xmlns:ma14="http://schemas.microsoft.com/office/mac/drawingml/2011/main" xmlns:a14="http://schemas.microsoft.com/office/drawing/2010/main" xmlns:m="http://schemas.openxmlformats.org/officeDocument/2006/math" xmlns="" val="1"/>
+              <ma14:wrappingTextBoxFlag xmlns="" xmlns:m="http://schemas.openxmlformats.org/officeDocument/2006/math" xmlns:a14="http://schemas.microsoft.com/office/drawing/2010/main" xmlns:ma14="http://schemas.microsoft.com/office/mac/drawingml/2011/main" val="1"/>
             </a:ext>
           </a:extLst>
         </p:spPr>
@@ -16072,7 +16367,7 @@
           </a:ln>
           <a:extLst>
             <a:ext uri="{C572A759-6A51-4108-AA02-DFA0A04FC94B}">
-              <ma14:wrappingTextBoxFlag xmlns:ma14="http://schemas.microsoft.com/office/mac/drawingml/2011/main" xmlns:a14="http://schemas.microsoft.com/office/drawing/2010/main" xmlns:m="http://schemas.openxmlformats.org/officeDocument/2006/math" xmlns="" val="1"/>
+              <ma14:wrappingTextBoxFlag xmlns="" xmlns:m="http://schemas.openxmlformats.org/officeDocument/2006/math" xmlns:a14="http://schemas.microsoft.com/office/drawing/2010/main" xmlns:ma14="http://schemas.microsoft.com/office/mac/drawingml/2011/main" val="1"/>
             </a:ext>
           </a:extLst>
         </p:spPr>
@@ -16120,7 +16415,7 @@
           </a:ln>
           <a:extLst>
             <a:ext uri="{C572A759-6A51-4108-AA02-DFA0A04FC94B}">
-              <ma14:wrappingTextBoxFlag xmlns:ma14="http://schemas.microsoft.com/office/mac/drawingml/2011/main" xmlns:a14="http://schemas.microsoft.com/office/drawing/2010/main" xmlns:m="http://schemas.openxmlformats.org/officeDocument/2006/math" xmlns="" val="1"/>
+              <ma14:wrappingTextBoxFlag xmlns="" xmlns:m="http://schemas.openxmlformats.org/officeDocument/2006/math" xmlns:a14="http://schemas.microsoft.com/office/drawing/2010/main" xmlns:ma14="http://schemas.microsoft.com/office/mac/drawingml/2011/main" val="1"/>
             </a:ext>
           </a:extLst>
         </p:spPr>
@@ -16222,7 +16517,7 @@
           </a:ln>
           <a:extLst>
             <a:ext uri="{C572A759-6A51-4108-AA02-DFA0A04FC94B}">
-              <ma14:wrappingTextBoxFlag xmlns:ma14="http://schemas.microsoft.com/office/mac/drawingml/2011/main" xmlns:a14="http://schemas.microsoft.com/office/drawing/2010/main" xmlns:m="http://schemas.openxmlformats.org/officeDocument/2006/math" xmlns="" val="1"/>
+              <ma14:wrappingTextBoxFlag xmlns="" xmlns:m="http://schemas.openxmlformats.org/officeDocument/2006/math" xmlns:a14="http://schemas.microsoft.com/office/drawing/2010/main" xmlns:ma14="http://schemas.microsoft.com/office/mac/drawingml/2011/main" val="1"/>
             </a:ext>
           </a:extLst>
         </p:spPr>
@@ -16270,7 +16565,7 @@
           </a:ln>
           <a:extLst>
             <a:ext uri="{C572A759-6A51-4108-AA02-DFA0A04FC94B}">
-              <ma14:wrappingTextBoxFlag xmlns:ma14="http://schemas.microsoft.com/office/mac/drawingml/2011/main" xmlns:a14="http://schemas.microsoft.com/office/drawing/2010/main" xmlns:m="http://schemas.openxmlformats.org/officeDocument/2006/math" xmlns="" val="1"/>
+              <ma14:wrappingTextBoxFlag xmlns="" xmlns:m="http://schemas.openxmlformats.org/officeDocument/2006/math" xmlns:a14="http://schemas.microsoft.com/office/drawing/2010/main" xmlns:ma14="http://schemas.microsoft.com/office/mac/drawingml/2011/main" val="1"/>
             </a:ext>
           </a:extLst>
         </p:spPr>
@@ -16673,7 +16968,7 @@
           </a:ln>
           <a:extLst>
             <a:ext uri="{C572A759-6A51-4108-AA02-DFA0A04FC94B}">
-              <ma14:wrappingTextBoxFlag xmlns:ma14="http://schemas.microsoft.com/office/mac/drawingml/2011/main" xmlns:a14="http://schemas.microsoft.com/office/drawing/2010/main" xmlns:m="http://schemas.openxmlformats.org/officeDocument/2006/math" xmlns="" val="1"/>
+              <ma14:wrappingTextBoxFlag xmlns="" xmlns:m="http://schemas.openxmlformats.org/officeDocument/2006/math" xmlns:a14="http://schemas.microsoft.com/office/drawing/2010/main" xmlns:ma14="http://schemas.microsoft.com/office/mac/drawingml/2011/main" val="1"/>
             </a:ext>
           </a:extLst>
         </p:spPr>
@@ -16723,7 +17018,7 @@
           </a:ln>
           <a:extLst>
             <a:ext uri="{C572A759-6A51-4108-AA02-DFA0A04FC94B}">
-              <ma14:wrappingTextBoxFlag xmlns:ma14="http://schemas.microsoft.com/office/mac/drawingml/2011/main" xmlns:a14="http://schemas.microsoft.com/office/drawing/2010/main" xmlns:m="http://schemas.openxmlformats.org/officeDocument/2006/math" xmlns="" val="1"/>
+              <ma14:wrappingTextBoxFlag xmlns="" xmlns:m="http://schemas.openxmlformats.org/officeDocument/2006/math" xmlns:a14="http://schemas.microsoft.com/office/drawing/2010/main" xmlns:ma14="http://schemas.microsoft.com/office/mac/drawingml/2011/main" val="1"/>
             </a:ext>
           </a:extLst>
         </p:spPr>
@@ -16773,7 +17068,7 @@
           </a:ln>
           <a:extLst>
             <a:ext uri="{C572A759-6A51-4108-AA02-DFA0A04FC94B}">
-              <ma14:wrappingTextBoxFlag xmlns:ma14="http://schemas.microsoft.com/office/mac/drawingml/2011/main" xmlns:a14="http://schemas.microsoft.com/office/drawing/2010/main" xmlns:m="http://schemas.openxmlformats.org/officeDocument/2006/math" xmlns="" val="1"/>
+              <ma14:wrappingTextBoxFlag xmlns="" xmlns:m="http://schemas.openxmlformats.org/officeDocument/2006/math" xmlns:a14="http://schemas.microsoft.com/office/drawing/2010/main" xmlns:ma14="http://schemas.microsoft.com/office/mac/drawingml/2011/main" val="1"/>
             </a:ext>
           </a:extLst>
         </p:spPr>
@@ -16823,7 +17118,7 @@
           </a:ln>
           <a:extLst>
             <a:ext uri="{C572A759-6A51-4108-AA02-DFA0A04FC94B}">
-              <ma14:wrappingTextBoxFlag xmlns:ma14="http://schemas.microsoft.com/office/mac/drawingml/2011/main" xmlns:a14="http://schemas.microsoft.com/office/drawing/2010/main" xmlns:m="http://schemas.openxmlformats.org/officeDocument/2006/math" xmlns="" val="1"/>
+              <ma14:wrappingTextBoxFlag xmlns="" xmlns:m="http://schemas.openxmlformats.org/officeDocument/2006/math" xmlns:a14="http://schemas.microsoft.com/office/drawing/2010/main" xmlns:ma14="http://schemas.microsoft.com/office/mac/drawingml/2011/main" val="1"/>
             </a:ext>
           </a:extLst>
         </p:spPr>
@@ -17073,7 +17368,7 @@
           </a:ln>
           <a:extLst>
             <a:ext uri="{C572A759-6A51-4108-AA02-DFA0A04FC94B}">
-              <ma14:wrappingTextBoxFlag xmlns:ma14="http://schemas.microsoft.com/office/mac/drawingml/2011/main" xmlns:a14="http://schemas.microsoft.com/office/drawing/2010/main" xmlns:m="http://schemas.openxmlformats.org/officeDocument/2006/math" xmlns="" val="1"/>
+              <ma14:wrappingTextBoxFlag xmlns="" xmlns:m="http://schemas.openxmlformats.org/officeDocument/2006/math" xmlns:a14="http://schemas.microsoft.com/office/drawing/2010/main" xmlns:ma14="http://schemas.microsoft.com/office/mac/drawingml/2011/main" val="1"/>
             </a:ext>
           </a:extLst>
         </p:spPr>
@@ -17108,7 +17403,7 @@
           </a:ln>
           <a:extLst>
             <a:ext uri="{C572A759-6A51-4108-AA02-DFA0A04FC94B}">
-              <ma14:wrappingTextBoxFlag xmlns:ma14="http://schemas.microsoft.com/office/mac/drawingml/2011/main" xmlns:a14="http://schemas.microsoft.com/office/drawing/2010/main" xmlns:m="http://schemas.openxmlformats.org/officeDocument/2006/math" xmlns="" val="1"/>
+              <ma14:wrappingTextBoxFlag xmlns="" xmlns:m="http://schemas.openxmlformats.org/officeDocument/2006/math" xmlns:a14="http://schemas.microsoft.com/office/drawing/2010/main" xmlns:ma14="http://schemas.microsoft.com/office/mac/drawingml/2011/main" val="1"/>
             </a:ext>
           </a:extLst>
         </p:spPr>
@@ -17346,7 +17641,7 @@
           </a:ln>
           <a:extLst>
             <a:ext uri="{C572A759-6A51-4108-AA02-DFA0A04FC94B}">
-              <ma14:wrappingTextBoxFlag xmlns:ma14="http://schemas.microsoft.com/office/mac/drawingml/2011/main" xmlns:a14="http://schemas.microsoft.com/office/drawing/2010/main" xmlns:m="http://schemas.openxmlformats.org/officeDocument/2006/math" xmlns="" val="1"/>
+              <ma14:wrappingTextBoxFlag xmlns="" xmlns:m="http://schemas.openxmlformats.org/officeDocument/2006/math" xmlns:a14="http://schemas.microsoft.com/office/drawing/2010/main" xmlns:ma14="http://schemas.microsoft.com/office/mac/drawingml/2011/main" val="1"/>
             </a:ext>
           </a:extLst>
         </p:spPr>
@@ -17457,7 +17752,7 @@
           </a:ln>
           <a:extLst>
             <a:ext uri="{C572A759-6A51-4108-AA02-DFA0A04FC94B}">
-              <ma14:wrappingTextBoxFlag xmlns:ma14="http://schemas.microsoft.com/office/mac/drawingml/2011/main" xmlns:a14="http://schemas.microsoft.com/office/drawing/2010/main" xmlns:m="http://schemas.openxmlformats.org/officeDocument/2006/math" xmlns="" val="1"/>
+              <ma14:wrappingTextBoxFlag xmlns="" xmlns:m="http://schemas.openxmlformats.org/officeDocument/2006/math" xmlns:a14="http://schemas.microsoft.com/office/drawing/2010/main" xmlns:ma14="http://schemas.microsoft.com/office/mac/drawingml/2011/main" val="1"/>
             </a:ext>
           </a:extLst>
         </p:spPr>
@@ -17766,7 +18061,7 @@
           </a:ln>
           <a:extLst>
             <a:ext uri="{C572A759-6A51-4108-AA02-DFA0A04FC94B}">
-              <ma14:wrappingTextBoxFlag xmlns:ma14="http://schemas.microsoft.com/office/mac/drawingml/2011/main" xmlns:a14="http://schemas.microsoft.com/office/drawing/2010/main" xmlns:m="http://schemas.openxmlformats.org/officeDocument/2006/math" xmlns="" val="1"/>
+              <ma14:wrappingTextBoxFlag xmlns="" xmlns:m="http://schemas.openxmlformats.org/officeDocument/2006/math" xmlns:a14="http://schemas.microsoft.com/office/drawing/2010/main" xmlns:ma14="http://schemas.microsoft.com/office/mac/drawingml/2011/main" val="1"/>
             </a:ext>
           </a:extLst>
         </p:spPr>
@@ -18056,7 +18351,7 @@
           </a:ln>
           <a:extLst>
             <a:ext uri="{C572A759-6A51-4108-AA02-DFA0A04FC94B}">
-              <ma14:wrappingTextBoxFlag xmlns:ma14="http://schemas.microsoft.com/office/mac/drawingml/2011/main" xmlns:a14="http://schemas.microsoft.com/office/drawing/2010/main" xmlns:m="http://schemas.openxmlformats.org/officeDocument/2006/math" xmlns="" val="1"/>
+              <ma14:wrappingTextBoxFlag xmlns="" xmlns:m="http://schemas.openxmlformats.org/officeDocument/2006/math" xmlns:a14="http://schemas.microsoft.com/office/drawing/2010/main" xmlns:ma14="http://schemas.microsoft.com/office/mac/drawingml/2011/main" val="1"/>
             </a:ext>
           </a:extLst>
         </p:spPr>
@@ -18167,7 +18462,7 @@
           </a:ln>
           <a:extLst>
             <a:ext uri="{C572A759-6A51-4108-AA02-DFA0A04FC94B}">
-              <ma14:wrappingTextBoxFlag xmlns:ma14="http://schemas.microsoft.com/office/mac/drawingml/2011/main" xmlns:a14="http://schemas.microsoft.com/office/drawing/2010/main" xmlns:m="http://schemas.openxmlformats.org/officeDocument/2006/math" xmlns="" val="1"/>
+              <ma14:wrappingTextBoxFlag xmlns="" xmlns:m="http://schemas.openxmlformats.org/officeDocument/2006/math" xmlns:a14="http://schemas.microsoft.com/office/drawing/2010/main" xmlns:ma14="http://schemas.microsoft.com/office/mac/drawingml/2011/main" val="1"/>
             </a:ext>
           </a:extLst>
         </p:spPr>
@@ -18608,7 +18903,7 @@
           </a:ln>
           <a:extLst>
             <a:ext uri="{C572A759-6A51-4108-AA02-DFA0A04FC94B}">
-              <ma14:wrappingTextBoxFlag xmlns:ma14="http://schemas.microsoft.com/office/mac/drawingml/2011/main" xmlns:a14="http://schemas.microsoft.com/office/drawing/2010/main" xmlns:m="http://schemas.openxmlformats.org/officeDocument/2006/math" xmlns="" val="1"/>
+              <ma14:wrappingTextBoxFlag xmlns="" xmlns:m="http://schemas.openxmlformats.org/officeDocument/2006/math" xmlns:a14="http://schemas.microsoft.com/office/drawing/2010/main" xmlns:ma14="http://schemas.microsoft.com/office/mac/drawingml/2011/main" val="1"/>
             </a:ext>
           </a:extLst>
         </p:spPr>
@@ -18658,7 +18953,7 @@
           </a:ln>
           <a:extLst>
             <a:ext uri="{C572A759-6A51-4108-AA02-DFA0A04FC94B}">
-              <ma14:wrappingTextBoxFlag xmlns:ma14="http://schemas.microsoft.com/office/mac/drawingml/2011/main" xmlns:a14="http://schemas.microsoft.com/office/drawing/2010/main" xmlns:m="http://schemas.openxmlformats.org/officeDocument/2006/math" xmlns="" val="1"/>
+              <ma14:wrappingTextBoxFlag xmlns="" xmlns:m="http://schemas.openxmlformats.org/officeDocument/2006/math" xmlns:a14="http://schemas.microsoft.com/office/drawing/2010/main" xmlns:ma14="http://schemas.microsoft.com/office/mac/drawingml/2011/main" val="1"/>
             </a:ext>
           </a:extLst>
         </p:spPr>
@@ -18708,7 +19003,7 @@
           </a:ln>
           <a:extLst>
             <a:ext uri="{C572A759-6A51-4108-AA02-DFA0A04FC94B}">
-              <ma14:wrappingTextBoxFlag xmlns:ma14="http://schemas.microsoft.com/office/mac/drawingml/2011/main" xmlns:a14="http://schemas.microsoft.com/office/drawing/2010/main" xmlns:m="http://schemas.openxmlformats.org/officeDocument/2006/math" xmlns="" val="1"/>
+              <ma14:wrappingTextBoxFlag xmlns="" xmlns:m="http://schemas.openxmlformats.org/officeDocument/2006/math" xmlns:a14="http://schemas.microsoft.com/office/drawing/2010/main" xmlns:ma14="http://schemas.microsoft.com/office/mac/drawingml/2011/main" val="1"/>
             </a:ext>
           </a:extLst>
         </p:spPr>
@@ -18758,7 +19053,7 @@
           </a:ln>
           <a:extLst>
             <a:ext uri="{C572A759-6A51-4108-AA02-DFA0A04FC94B}">
-              <ma14:wrappingTextBoxFlag xmlns:ma14="http://schemas.microsoft.com/office/mac/drawingml/2011/main" xmlns:a14="http://schemas.microsoft.com/office/drawing/2010/main" xmlns:m="http://schemas.openxmlformats.org/officeDocument/2006/math" xmlns="" val="1"/>
+              <ma14:wrappingTextBoxFlag xmlns="" xmlns:m="http://schemas.openxmlformats.org/officeDocument/2006/math" xmlns:a14="http://schemas.microsoft.com/office/drawing/2010/main" xmlns:ma14="http://schemas.microsoft.com/office/mac/drawingml/2011/main" val="1"/>
             </a:ext>
           </a:extLst>
         </p:spPr>
@@ -19008,7 +19303,7 @@
           </a:ln>
           <a:extLst>
             <a:ext uri="{C572A759-6A51-4108-AA02-DFA0A04FC94B}">
-              <ma14:wrappingTextBoxFlag xmlns:ma14="http://schemas.microsoft.com/office/mac/drawingml/2011/main" xmlns:a14="http://schemas.microsoft.com/office/drawing/2010/main" xmlns:m="http://schemas.openxmlformats.org/officeDocument/2006/math" xmlns="" val="1"/>
+              <ma14:wrappingTextBoxFlag xmlns="" xmlns:m="http://schemas.openxmlformats.org/officeDocument/2006/math" xmlns:a14="http://schemas.microsoft.com/office/drawing/2010/main" xmlns:ma14="http://schemas.microsoft.com/office/mac/drawingml/2011/main" val="1"/>
             </a:ext>
           </a:extLst>
         </p:spPr>
@@ -19043,7 +19338,7 @@
           </a:ln>
           <a:extLst>
             <a:ext uri="{C572A759-6A51-4108-AA02-DFA0A04FC94B}">
-              <ma14:wrappingTextBoxFlag xmlns:ma14="http://schemas.microsoft.com/office/mac/drawingml/2011/main" xmlns:a14="http://schemas.microsoft.com/office/drawing/2010/main" xmlns:m="http://schemas.openxmlformats.org/officeDocument/2006/math" xmlns="" val="1"/>
+              <ma14:wrappingTextBoxFlag xmlns="" xmlns:m="http://schemas.openxmlformats.org/officeDocument/2006/math" xmlns:a14="http://schemas.microsoft.com/office/drawing/2010/main" xmlns:ma14="http://schemas.microsoft.com/office/mac/drawingml/2011/main" val="1"/>
             </a:ext>
           </a:extLst>
         </p:spPr>
@@ -19078,7 +19373,7 @@
           </a:ln>
           <a:extLst>
             <a:ext uri="{C572A759-6A51-4108-AA02-DFA0A04FC94B}">
-              <ma14:wrappingTextBoxFlag xmlns:ma14="http://schemas.microsoft.com/office/mac/drawingml/2011/main" xmlns:a14="http://schemas.microsoft.com/office/drawing/2010/main" xmlns:m="http://schemas.openxmlformats.org/officeDocument/2006/math" xmlns="" val="1"/>
+              <ma14:wrappingTextBoxFlag xmlns="" xmlns:m="http://schemas.openxmlformats.org/officeDocument/2006/math" xmlns:a14="http://schemas.microsoft.com/office/drawing/2010/main" xmlns:ma14="http://schemas.microsoft.com/office/mac/drawingml/2011/main" val="1"/>
             </a:ext>
           </a:extLst>
         </p:spPr>
@@ -19115,7 +19410,7 @@
           </a:ln>
           <a:extLst>
             <a:ext uri="{C572A759-6A51-4108-AA02-DFA0A04FC94B}">
-              <ma14:wrappingTextBoxFlag xmlns:ma14="http://schemas.microsoft.com/office/mac/drawingml/2011/main" xmlns:a14="http://schemas.microsoft.com/office/drawing/2010/main" xmlns:m="http://schemas.openxmlformats.org/officeDocument/2006/math" xmlns="" val="1"/>
+              <ma14:wrappingTextBoxFlag xmlns="" xmlns:m="http://schemas.openxmlformats.org/officeDocument/2006/math" xmlns:a14="http://schemas.microsoft.com/office/drawing/2010/main" xmlns:ma14="http://schemas.microsoft.com/office/mac/drawingml/2011/main" val="1"/>
             </a:ext>
           </a:extLst>
         </p:spPr>
@@ -19565,7 +19860,7 @@
           </a:ln>
           <a:extLst>
             <a:ext uri="{C572A759-6A51-4108-AA02-DFA0A04FC94B}">
-              <ma14:wrappingTextBoxFlag xmlns:ma14="http://schemas.microsoft.com/office/mac/drawingml/2011/main" xmlns:a14="http://schemas.microsoft.com/office/drawing/2010/main" xmlns:m="http://schemas.openxmlformats.org/officeDocument/2006/math" xmlns="" val="1"/>
+              <ma14:wrappingTextBoxFlag xmlns="" xmlns:m="http://schemas.openxmlformats.org/officeDocument/2006/math" xmlns:a14="http://schemas.microsoft.com/office/drawing/2010/main" xmlns:ma14="http://schemas.microsoft.com/office/mac/drawingml/2011/main" val="1"/>
             </a:ext>
           </a:extLst>
         </p:spPr>
@@ -19616,7 +19911,7 @@
           </a:ln>
           <a:extLst>
             <a:ext uri="{C572A759-6A51-4108-AA02-DFA0A04FC94B}">
-              <ma14:wrappingTextBoxFlag xmlns:ma14="http://schemas.microsoft.com/office/mac/drawingml/2011/main" xmlns:a14="http://schemas.microsoft.com/office/drawing/2010/main" xmlns:m="http://schemas.openxmlformats.org/officeDocument/2006/math" xmlns="" val="1"/>
+              <ma14:wrappingTextBoxFlag xmlns="" xmlns:m="http://schemas.openxmlformats.org/officeDocument/2006/math" xmlns:a14="http://schemas.microsoft.com/office/drawing/2010/main" xmlns:ma14="http://schemas.microsoft.com/office/mac/drawingml/2011/main" val="1"/>
             </a:ext>
           </a:extLst>
         </p:spPr>
@@ -19663,7 +19958,7 @@
           </a:ln>
           <a:extLst>
             <a:ext uri="{C572A759-6A51-4108-AA02-DFA0A04FC94B}">
-              <ma14:wrappingTextBoxFlag xmlns:ma14="http://schemas.microsoft.com/office/mac/drawingml/2011/main" xmlns:a14="http://schemas.microsoft.com/office/drawing/2010/main" xmlns:m="http://schemas.openxmlformats.org/officeDocument/2006/math" xmlns="" val="1"/>
+              <ma14:wrappingTextBoxFlag xmlns="" xmlns:m="http://schemas.openxmlformats.org/officeDocument/2006/math" xmlns:a14="http://schemas.microsoft.com/office/drawing/2010/main" xmlns:ma14="http://schemas.microsoft.com/office/mac/drawingml/2011/main" val="1"/>
             </a:ext>
           </a:extLst>
         </p:spPr>
@@ -20151,7 +20446,7 @@
           </a:ln>
           <a:extLst>
             <a:ext uri="{C572A759-6A51-4108-AA02-DFA0A04FC94B}">
-              <ma14:wrappingTextBoxFlag xmlns:ma14="http://schemas.microsoft.com/office/mac/drawingml/2011/main" xmlns:a14="http://schemas.microsoft.com/office/drawing/2010/main" xmlns:m="http://schemas.openxmlformats.org/officeDocument/2006/math" xmlns="" val="1"/>
+              <ma14:wrappingTextBoxFlag xmlns="" xmlns:m="http://schemas.openxmlformats.org/officeDocument/2006/math" xmlns:a14="http://schemas.microsoft.com/office/drawing/2010/main" xmlns:ma14="http://schemas.microsoft.com/office/mac/drawingml/2011/main" val="1"/>
             </a:ext>
           </a:extLst>
         </p:spPr>
@@ -20198,7 +20493,7 @@
           </a:ln>
           <a:extLst>
             <a:ext uri="{C572A759-6A51-4108-AA02-DFA0A04FC94B}">
-              <ma14:wrappingTextBoxFlag xmlns:ma14="http://schemas.microsoft.com/office/mac/drawingml/2011/main" xmlns:a14="http://schemas.microsoft.com/office/drawing/2010/main" xmlns:m="http://schemas.openxmlformats.org/officeDocument/2006/math" xmlns="" val="1"/>
+              <ma14:wrappingTextBoxFlag xmlns="" xmlns:m="http://schemas.openxmlformats.org/officeDocument/2006/math" xmlns:a14="http://schemas.microsoft.com/office/drawing/2010/main" xmlns:ma14="http://schemas.microsoft.com/office/mac/drawingml/2011/main" val="1"/>
             </a:ext>
           </a:extLst>
         </p:spPr>
@@ -20271,7 +20566,7 @@
           </a:ln>
           <a:extLst>
             <a:ext uri="{C572A759-6A51-4108-AA02-DFA0A04FC94B}">
-              <ma14:wrappingTextBoxFlag xmlns:ma14="http://schemas.microsoft.com/office/mac/drawingml/2011/main" xmlns:a14="http://schemas.microsoft.com/office/drawing/2010/main" xmlns:m="http://schemas.openxmlformats.org/officeDocument/2006/math" xmlns="" val="1"/>
+              <ma14:wrappingTextBoxFlag xmlns="" xmlns:m="http://schemas.openxmlformats.org/officeDocument/2006/math" xmlns:a14="http://schemas.microsoft.com/office/drawing/2010/main" xmlns:ma14="http://schemas.microsoft.com/office/mac/drawingml/2011/main" val="1"/>
             </a:ext>
           </a:extLst>
         </p:spPr>
@@ -20311,7 +20606,7 @@
           </a:ln>
           <a:extLst>
             <a:ext uri="{C572A759-6A51-4108-AA02-DFA0A04FC94B}">
-              <ma14:wrappingTextBoxFlag xmlns:ma14="http://schemas.microsoft.com/office/mac/drawingml/2011/main" xmlns:a14="http://schemas.microsoft.com/office/drawing/2010/main" xmlns:m="http://schemas.openxmlformats.org/officeDocument/2006/math" xmlns="" val="1"/>
+              <ma14:wrappingTextBoxFlag xmlns="" xmlns:m="http://schemas.openxmlformats.org/officeDocument/2006/math" xmlns:a14="http://schemas.microsoft.com/office/drawing/2010/main" xmlns:ma14="http://schemas.microsoft.com/office/mac/drawingml/2011/main" val="1"/>
             </a:ext>
           </a:extLst>
         </p:spPr>
@@ -20601,7 +20896,7 @@
           </a:ln>
           <a:extLst>
             <a:ext uri="{C572A759-6A51-4108-AA02-DFA0A04FC94B}">
-              <ma14:wrappingTextBoxFlag xmlns:ma14="http://schemas.microsoft.com/office/mac/drawingml/2011/main" xmlns:a14="http://schemas.microsoft.com/office/drawing/2010/main" xmlns:m="http://schemas.openxmlformats.org/officeDocument/2006/math" xmlns="" val="1"/>
+              <ma14:wrappingTextBoxFlag xmlns="" xmlns:m="http://schemas.openxmlformats.org/officeDocument/2006/math" xmlns:a14="http://schemas.microsoft.com/office/drawing/2010/main" xmlns:ma14="http://schemas.microsoft.com/office/mac/drawingml/2011/main" val="1"/>
             </a:ext>
           </a:extLst>
         </p:spPr>
@@ -20652,7 +20947,7 @@
           </a:ln>
           <a:extLst>
             <a:ext uri="{C572A759-6A51-4108-AA02-DFA0A04FC94B}">
-              <ma14:wrappingTextBoxFlag xmlns:ma14="http://schemas.microsoft.com/office/mac/drawingml/2011/main" xmlns:a14="http://schemas.microsoft.com/office/drawing/2010/main" xmlns:m="http://schemas.openxmlformats.org/officeDocument/2006/math" xmlns="" val="1"/>
+              <ma14:wrappingTextBoxFlag xmlns="" xmlns:m="http://schemas.openxmlformats.org/officeDocument/2006/math" xmlns:a14="http://schemas.microsoft.com/office/drawing/2010/main" xmlns:ma14="http://schemas.microsoft.com/office/mac/drawingml/2011/main" val="1"/>
             </a:ext>
           </a:extLst>
         </p:spPr>
@@ -20776,7 +21071,7 @@
           </a:ln>
           <a:extLst>
             <a:ext uri="{C572A759-6A51-4108-AA02-DFA0A04FC94B}">
-              <ma14:wrappingTextBoxFlag xmlns:ma14="http://schemas.microsoft.com/office/mac/drawingml/2011/main" xmlns:a14="http://schemas.microsoft.com/office/drawing/2010/main" xmlns:m="http://schemas.openxmlformats.org/officeDocument/2006/math" xmlns="" val="1"/>
+              <ma14:wrappingTextBoxFlag xmlns="" xmlns:m="http://schemas.openxmlformats.org/officeDocument/2006/math" xmlns:a14="http://schemas.microsoft.com/office/drawing/2010/main" xmlns:ma14="http://schemas.microsoft.com/office/mac/drawingml/2011/main" val="1"/>
             </a:ext>
           </a:extLst>
         </p:spPr>
@@ -21047,7 +21342,7 @@
           </a:ln>
           <a:extLst>
             <a:ext uri="{C572A759-6A51-4108-AA02-DFA0A04FC94B}">
-              <ma14:wrappingTextBoxFlag xmlns:ma14="http://schemas.microsoft.com/office/mac/drawingml/2011/main" xmlns:a14="http://schemas.microsoft.com/office/drawing/2010/main" xmlns:m="http://schemas.openxmlformats.org/officeDocument/2006/math" xmlns="" val="1"/>
+              <ma14:wrappingTextBoxFlag xmlns="" xmlns:m="http://schemas.openxmlformats.org/officeDocument/2006/math" xmlns:a14="http://schemas.microsoft.com/office/drawing/2010/main" xmlns:ma14="http://schemas.microsoft.com/office/mac/drawingml/2011/main" val="1"/>
             </a:ext>
           </a:extLst>
         </p:spPr>
@@ -21705,7 +22000,7 @@
           </a:ln>
           <a:extLst>
             <a:ext uri="{C572A759-6A51-4108-AA02-DFA0A04FC94B}">
-              <ma14:wrappingTextBoxFlag xmlns:ma14="http://schemas.microsoft.com/office/mac/drawingml/2011/main" xmlns:a14="http://schemas.microsoft.com/office/drawing/2010/main" xmlns:m="http://schemas.openxmlformats.org/officeDocument/2006/math" xmlns="" val="1"/>
+              <ma14:wrappingTextBoxFlag xmlns="" xmlns:m="http://schemas.openxmlformats.org/officeDocument/2006/math" xmlns:a14="http://schemas.microsoft.com/office/drawing/2010/main" xmlns:ma14="http://schemas.microsoft.com/office/mac/drawingml/2011/main" val="1"/>
             </a:ext>
           </a:extLst>
         </p:spPr>
@@ -21756,7 +22051,7 @@
           </a:ln>
           <a:extLst>
             <a:ext uri="{C572A759-6A51-4108-AA02-DFA0A04FC94B}">
-              <ma14:wrappingTextBoxFlag xmlns:ma14="http://schemas.microsoft.com/office/mac/drawingml/2011/main" xmlns:a14="http://schemas.microsoft.com/office/drawing/2010/main" xmlns:m="http://schemas.openxmlformats.org/officeDocument/2006/math" xmlns="" val="1"/>
+              <ma14:wrappingTextBoxFlag xmlns="" xmlns:m="http://schemas.openxmlformats.org/officeDocument/2006/math" xmlns:a14="http://schemas.microsoft.com/office/drawing/2010/main" xmlns:ma14="http://schemas.microsoft.com/office/mac/drawingml/2011/main" val="1"/>
             </a:ext>
           </a:extLst>
         </p:spPr>
@@ -21907,7 +22202,7 @@
           </a:ln>
           <a:extLst>
             <a:ext uri="{C572A759-6A51-4108-AA02-DFA0A04FC94B}">
-              <ma14:wrappingTextBoxFlag xmlns:ma14="http://schemas.microsoft.com/office/mac/drawingml/2011/main" xmlns:a14="http://schemas.microsoft.com/office/drawing/2010/main" xmlns:m="http://schemas.openxmlformats.org/officeDocument/2006/math" xmlns="" val="1"/>
+              <ma14:wrappingTextBoxFlag xmlns="" xmlns:m="http://schemas.openxmlformats.org/officeDocument/2006/math" xmlns:a14="http://schemas.microsoft.com/office/drawing/2010/main" xmlns:ma14="http://schemas.microsoft.com/office/mac/drawingml/2011/main" val="1"/>
             </a:ext>
           </a:extLst>
         </p:spPr>
@@ -21966,7 +22261,7 @@
           </a:ln>
           <a:extLst>
             <a:ext uri="{C572A759-6A51-4108-AA02-DFA0A04FC94B}">
-              <ma14:wrappingTextBoxFlag xmlns:ma14="http://schemas.microsoft.com/office/mac/drawingml/2011/main" xmlns:a14="http://schemas.microsoft.com/office/drawing/2010/main" xmlns:m="http://schemas.openxmlformats.org/officeDocument/2006/math" xmlns="" val="1"/>
+              <ma14:wrappingTextBoxFlag xmlns="" xmlns:m="http://schemas.openxmlformats.org/officeDocument/2006/math" xmlns:a14="http://schemas.microsoft.com/office/drawing/2010/main" xmlns:ma14="http://schemas.microsoft.com/office/mac/drawingml/2011/main" val="1"/>
             </a:ext>
           </a:extLst>
         </p:spPr>
@@ -22624,7 +22919,7 @@
           </a:ln>
           <a:extLst>
             <a:ext uri="{C572A759-6A51-4108-AA02-DFA0A04FC94B}">
-              <ma14:wrappingTextBoxFlag xmlns:ma14="http://schemas.microsoft.com/office/mac/drawingml/2011/main" xmlns:a14="http://schemas.microsoft.com/office/drawing/2010/main" xmlns:m="http://schemas.openxmlformats.org/officeDocument/2006/math" xmlns="" val="1"/>
+              <ma14:wrappingTextBoxFlag xmlns="" xmlns:m="http://schemas.openxmlformats.org/officeDocument/2006/math" xmlns:a14="http://schemas.microsoft.com/office/drawing/2010/main" xmlns:ma14="http://schemas.microsoft.com/office/mac/drawingml/2011/main" val="1"/>
             </a:ext>
           </a:extLst>
         </p:spPr>
@@ -22675,7 +22970,7 @@
           </a:ln>
           <a:extLst>
             <a:ext uri="{C572A759-6A51-4108-AA02-DFA0A04FC94B}">
-              <ma14:wrappingTextBoxFlag xmlns:ma14="http://schemas.microsoft.com/office/mac/drawingml/2011/main" xmlns:a14="http://schemas.microsoft.com/office/drawing/2010/main" xmlns:m="http://schemas.openxmlformats.org/officeDocument/2006/math" xmlns="" val="1"/>
+              <ma14:wrappingTextBoxFlag xmlns="" xmlns:m="http://schemas.openxmlformats.org/officeDocument/2006/math" xmlns:a14="http://schemas.microsoft.com/office/drawing/2010/main" xmlns:ma14="http://schemas.microsoft.com/office/mac/drawingml/2011/main" val="1"/>
             </a:ext>
           </a:extLst>
         </p:spPr>
@@ -22802,7 +23097,7 @@
           </a:ln>
           <a:extLst>
             <a:ext uri="{C572A759-6A51-4108-AA02-DFA0A04FC94B}">
-              <ma14:wrappingTextBoxFlag xmlns:ma14="http://schemas.microsoft.com/office/mac/drawingml/2011/main" xmlns:a14="http://schemas.microsoft.com/office/drawing/2010/main" xmlns:m="http://schemas.openxmlformats.org/officeDocument/2006/math" xmlns="" val="1"/>
+              <ma14:wrappingTextBoxFlag xmlns="" xmlns:m="http://schemas.openxmlformats.org/officeDocument/2006/math" xmlns:a14="http://schemas.microsoft.com/office/drawing/2010/main" xmlns:ma14="http://schemas.microsoft.com/office/mac/drawingml/2011/main" val="1"/>
             </a:ext>
           </a:extLst>
         </p:spPr>
@@ -22850,7 +23145,7 @@
           </a:ln>
           <a:extLst>
             <a:ext uri="{C572A759-6A51-4108-AA02-DFA0A04FC94B}">
-              <ma14:wrappingTextBoxFlag xmlns:ma14="http://schemas.microsoft.com/office/mac/drawingml/2011/main" xmlns:a14="http://schemas.microsoft.com/office/drawing/2010/main" xmlns:m="http://schemas.openxmlformats.org/officeDocument/2006/math" xmlns="" val="1"/>
+              <ma14:wrappingTextBoxFlag xmlns="" xmlns:m="http://schemas.openxmlformats.org/officeDocument/2006/math" xmlns:a14="http://schemas.microsoft.com/office/drawing/2010/main" xmlns:ma14="http://schemas.microsoft.com/office/mac/drawingml/2011/main" val="1"/>
             </a:ext>
           </a:extLst>
         </p:spPr>
@@ -22898,7 +23193,7 @@
           </a:ln>
           <a:extLst>
             <a:ext uri="{C572A759-6A51-4108-AA02-DFA0A04FC94B}">
-              <ma14:wrappingTextBoxFlag xmlns:ma14="http://schemas.microsoft.com/office/mac/drawingml/2011/main" xmlns:a14="http://schemas.microsoft.com/office/drawing/2010/main" xmlns:m="http://schemas.openxmlformats.org/officeDocument/2006/math" xmlns="" val="1"/>
+              <ma14:wrappingTextBoxFlag xmlns="" xmlns:m="http://schemas.openxmlformats.org/officeDocument/2006/math" xmlns:a14="http://schemas.microsoft.com/office/drawing/2010/main" xmlns:ma14="http://schemas.microsoft.com/office/mac/drawingml/2011/main" val="1"/>
             </a:ext>
           </a:extLst>
         </p:spPr>
@@ -22946,7 +23241,7 @@
           </a:ln>
           <a:extLst>
             <a:ext uri="{C572A759-6A51-4108-AA02-DFA0A04FC94B}">
-              <ma14:wrappingTextBoxFlag xmlns:ma14="http://schemas.microsoft.com/office/mac/drawingml/2011/main" xmlns:a14="http://schemas.microsoft.com/office/drawing/2010/main" xmlns:m="http://schemas.openxmlformats.org/officeDocument/2006/math" xmlns="" val="1"/>
+              <ma14:wrappingTextBoxFlag xmlns="" xmlns:m="http://schemas.openxmlformats.org/officeDocument/2006/math" xmlns:a14="http://schemas.microsoft.com/office/drawing/2010/main" xmlns:ma14="http://schemas.microsoft.com/office/mac/drawingml/2011/main" val="1"/>
             </a:ext>
           </a:extLst>
         </p:spPr>
@@ -22994,7 +23289,7 @@
           </a:ln>
           <a:extLst>
             <a:ext uri="{C572A759-6A51-4108-AA02-DFA0A04FC94B}">
-              <ma14:wrappingTextBoxFlag xmlns:ma14="http://schemas.microsoft.com/office/mac/drawingml/2011/main" xmlns:a14="http://schemas.microsoft.com/office/drawing/2010/main" xmlns:m="http://schemas.openxmlformats.org/officeDocument/2006/math" xmlns="" val="1"/>
+              <ma14:wrappingTextBoxFlag xmlns="" xmlns:m="http://schemas.openxmlformats.org/officeDocument/2006/math" xmlns:a14="http://schemas.microsoft.com/office/drawing/2010/main" xmlns:ma14="http://schemas.microsoft.com/office/mac/drawingml/2011/main" val="1"/>
             </a:ext>
           </a:extLst>
         </p:spPr>
@@ -23203,7 +23498,7 @@
           </a:ln>
           <a:extLst>
             <a:ext uri="{C572A759-6A51-4108-AA02-DFA0A04FC94B}">
-              <ma14:wrappingTextBoxFlag xmlns:ma14="http://schemas.microsoft.com/office/mac/drawingml/2011/main" xmlns:a14="http://schemas.microsoft.com/office/drawing/2010/main" xmlns:m="http://schemas.openxmlformats.org/officeDocument/2006/math" xmlns="" val="1"/>
+              <ma14:wrappingTextBoxFlag xmlns="" xmlns:m="http://schemas.openxmlformats.org/officeDocument/2006/math" xmlns:a14="http://schemas.microsoft.com/office/drawing/2010/main" xmlns:ma14="http://schemas.microsoft.com/office/mac/drawingml/2011/main" val="1"/>
             </a:ext>
           </a:extLst>
         </p:spPr>
@@ -23386,7 +23681,7 @@
           </a:ln>
           <a:extLst>
             <a:ext uri="{C572A759-6A51-4108-AA02-DFA0A04FC94B}">
-              <ma14:wrappingTextBoxFlag xmlns:ma14="http://schemas.microsoft.com/office/mac/drawingml/2011/main" xmlns:a14="http://schemas.microsoft.com/office/drawing/2010/main" xmlns:m="http://schemas.openxmlformats.org/officeDocument/2006/math" xmlns="" val="1"/>
+              <ma14:wrappingTextBoxFlag xmlns="" xmlns:m="http://schemas.openxmlformats.org/officeDocument/2006/math" xmlns:a14="http://schemas.microsoft.com/office/drawing/2010/main" xmlns:ma14="http://schemas.microsoft.com/office/mac/drawingml/2011/main" val="1"/>
             </a:ext>
           </a:extLst>
         </p:spPr>
@@ -24044,7 +24339,7 @@
           </a:ln>
           <a:extLst>
             <a:ext uri="{C572A759-6A51-4108-AA02-DFA0A04FC94B}">
-              <ma14:wrappingTextBoxFlag xmlns:ma14="http://schemas.microsoft.com/office/mac/drawingml/2011/main" xmlns:a14="http://schemas.microsoft.com/office/drawing/2010/main" xmlns:m="http://schemas.openxmlformats.org/officeDocument/2006/math" xmlns="" val="1"/>
+              <ma14:wrappingTextBoxFlag xmlns="" xmlns:m="http://schemas.openxmlformats.org/officeDocument/2006/math" xmlns:a14="http://schemas.microsoft.com/office/drawing/2010/main" xmlns:ma14="http://schemas.microsoft.com/office/mac/drawingml/2011/main" val="1"/>
             </a:ext>
           </a:extLst>
         </p:spPr>
@@ -24095,7 +24390,7 @@
           </a:ln>
           <a:extLst>
             <a:ext uri="{C572A759-6A51-4108-AA02-DFA0A04FC94B}">
-              <ma14:wrappingTextBoxFlag xmlns:ma14="http://schemas.microsoft.com/office/mac/drawingml/2011/main" xmlns:a14="http://schemas.microsoft.com/office/drawing/2010/main" xmlns:m="http://schemas.openxmlformats.org/officeDocument/2006/math" xmlns="" val="1"/>
+              <ma14:wrappingTextBoxFlag xmlns="" xmlns:m="http://schemas.openxmlformats.org/officeDocument/2006/math" xmlns:a14="http://schemas.microsoft.com/office/drawing/2010/main" xmlns:ma14="http://schemas.microsoft.com/office/mac/drawingml/2011/main" val="1"/>
             </a:ext>
           </a:extLst>
         </p:spPr>
@@ -24222,7 +24517,7 @@
           </a:ln>
           <a:extLst>
             <a:ext uri="{C572A759-6A51-4108-AA02-DFA0A04FC94B}">
-              <ma14:wrappingTextBoxFlag xmlns:ma14="http://schemas.microsoft.com/office/mac/drawingml/2011/main" xmlns:a14="http://schemas.microsoft.com/office/drawing/2010/main" xmlns:m="http://schemas.openxmlformats.org/officeDocument/2006/math" xmlns="" val="1"/>
+              <ma14:wrappingTextBoxFlag xmlns="" xmlns:m="http://schemas.openxmlformats.org/officeDocument/2006/math" xmlns:a14="http://schemas.microsoft.com/office/drawing/2010/main" xmlns:ma14="http://schemas.microsoft.com/office/mac/drawingml/2011/main" val="1"/>
             </a:ext>
           </a:extLst>
         </p:spPr>
@@ -24270,7 +24565,7 @@
           </a:ln>
           <a:extLst>
             <a:ext uri="{C572A759-6A51-4108-AA02-DFA0A04FC94B}">
-              <ma14:wrappingTextBoxFlag xmlns:ma14="http://schemas.microsoft.com/office/mac/drawingml/2011/main" xmlns:a14="http://schemas.microsoft.com/office/drawing/2010/main" xmlns:m="http://schemas.openxmlformats.org/officeDocument/2006/math" xmlns="" val="1"/>
+              <ma14:wrappingTextBoxFlag xmlns="" xmlns:m="http://schemas.openxmlformats.org/officeDocument/2006/math" xmlns:a14="http://schemas.microsoft.com/office/drawing/2010/main" xmlns:ma14="http://schemas.microsoft.com/office/mac/drawingml/2011/main" val="1"/>
             </a:ext>
           </a:extLst>
         </p:spPr>
@@ -24318,7 +24613,7 @@
           </a:ln>
           <a:extLst>
             <a:ext uri="{C572A759-6A51-4108-AA02-DFA0A04FC94B}">
-              <ma14:wrappingTextBoxFlag xmlns:ma14="http://schemas.microsoft.com/office/mac/drawingml/2011/main" xmlns:a14="http://schemas.microsoft.com/office/drawing/2010/main" xmlns:m="http://schemas.openxmlformats.org/officeDocument/2006/math" xmlns="" val="1"/>
+              <ma14:wrappingTextBoxFlag xmlns="" xmlns:m="http://schemas.openxmlformats.org/officeDocument/2006/math" xmlns:a14="http://schemas.microsoft.com/office/drawing/2010/main" xmlns:ma14="http://schemas.microsoft.com/office/mac/drawingml/2011/main" val="1"/>
             </a:ext>
           </a:extLst>
         </p:spPr>
@@ -24366,7 +24661,7 @@
           </a:ln>
           <a:extLst>
             <a:ext uri="{C572A759-6A51-4108-AA02-DFA0A04FC94B}">
-              <ma14:wrappingTextBoxFlag xmlns:ma14="http://schemas.microsoft.com/office/mac/drawingml/2011/main" xmlns:a14="http://schemas.microsoft.com/office/drawing/2010/main" xmlns:m="http://schemas.openxmlformats.org/officeDocument/2006/math" xmlns="" val="1"/>
+              <ma14:wrappingTextBoxFlag xmlns="" xmlns:m="http://schemas.openxmlformats.org/officeDocument/2006/math" xmlns:a14="http://schemas.microsoft.com/office/drawing/2010/main" xmlns:ma14="http://schemas.microsoft.com/office/mac/drawingml/2011/main" val="1"/>
             </a:ext>
           </a:extLst>
         </p:spPr>
@@ -24414,7 +24709,7 @@
           </a:ln>
           <a:extLst>
             <a:ext uri="{C572A759-6A51-4108-AA02-DFA0A04FC94B}">
-              <ma14:wrappingTextBoxFlag xmlns:ma14="http://schemas.microsoft.com/office/mac/drawingml/2011/main" xmlns:a14="http://schemas.microsoft.com/office/drawing/2010/main" xmlns:m="http://schemas.openxmlformats.org/officeDocument/2006/math" xmlns="" val="1"/>
+              <ma14:wrappingTextBoxFlag xmlns="" xmlns:m="http://schemas.openxmlformats.org/officeDocument/2006/math" xmlns:a14="http://schemas.microsoft.com/office/drawing/2010/main" xmlns:ma14="http://schemas.microsoft.com/office/mac/drawingml/2011/main" val="1"/>
             </a:ext>
           </a:extLst>
         </p:spPr>
@@ -24763,7 +25058,7 @@
           </a:ln>
           <a:extLst>
             <a:ext uri="{C572A759-6A51-4108-AA02-DFA0A04FC94B}">
-              <ma14:wrappingTextBoxFlag xmlns:ma14="http://schemas.microsoft.com/office/mac/drawingml/2011/main" xmlns:a14="http://schemas.microsoft.com/office/drawing/2010/main" xmlns:m="http://schemas.openxmlformats.org/officeDocument/2006/math" xmlns="" val="1"/>
+              <ma14:wrappingTextBoxFlag xmlns="" xmlns:m="http://schemas.openxmlformats.org/officeDocument/2006/math" xmlns:a14="http://schemas.microsoft.com/office/drawing/2010/main" xmlns:ma14="http://schemas.microsoft.com/office/mac/drawingml/2011/main" val="1"/>
             </a:ext>
           </a:extLst>
         </p:spPr>
@@ -24815,7 +25110,7 @@
           </a:ln>
           <a:extLst>
             <a:ext uri="{C572A759-6A51-4108-AA02-DFA0A04FC94B}">
-              <ma14:wrappingTextBoxFlag xmlns:ma14="http://schemas.microsoft.com/office/mac/drawingml/2011/main" xmlns:a14="http://schemas.microsoft.com/office/drawing/2010/main" xmlns:m="http://schemas.openxmlformats.org/officeDocument/2006/math" xmlns="" val="1"/>
+              <ma14:wrappingTextBoxFlag xmlns="" xmlns:m="http://schemas.openxmlformats.org/officeDocument/2006/math" xmlns:a14="http://schemas.microsoft.com/office/drawing/2010/main" xmlns:ma14="http://schemas.microsoft.com/office/mac/drawingml/2011/main" val="1"/>
             </a:ext>
           </a:extLst>
         </p:spPr>
@@ -24978,7 +25273,7 @@
           </a:ln>
           <a:extLst>
             <a:ext uri="{C572A759-6A51-4108-AA02-DFA0A04FC94B}">
-              <ma14:wrappingTextBoxFlag xmlns:ma14="http://schemas.microsoft.com/office/mac/drawingml/2011/main" xmlns:a14="http://schemas.microsoft.com/office/drawing/2010/main" xmlns:m="http://schemas.openxmlformats.org/officeDocument/2006/math" xmlns="" val="1"/>
+              <ma14:wrappingTextBoxFlag xmlns="" xmlns:m="http://schemas.openxmlformats.org/officeDocument/2006/math" xmlns:a14="http://schemas.microsoft.com/office/drawing/2010/main" xmlns:ma14="http://schemas.microsoft.com/office/mac/drawingml/2011/main" val="1"/>
             </a:ext>
           </a:extLst>
         </p:spPr>
@@ -25042,7 +25337,7 @@
           </a:ln>
           <a:extLst>
             <a:ext uri="{C572A759-6A51-4108-AA02-DFA0A04FC94B}">
-              <ma14:wrappingTextBoxFlag xmlns:ma14="http://schemas.microsoft.com/office/mac/drawingml/2011/main" xmlns:a14="http://schemas.microsoft.com/office/drawing/2010/main" xmlns:m="http://schemas.openxmlformats.org/officeDocument/2006/math" xmlns="" val="1"/>
+              <ma14:wrappingTextBoxFlag xmlns="" xmlns:m="http://schemas.openxmlformats.org/officeDocument/2006/math" xmlns:a14="http://schemas.microsoft.com/office/drawing/2010/main" xmlns:ma14="http://schemas.microsoft.com/office/mac/drawingml/2011/main" val="1"/>
             </a:ext>
           </a:extLst>
         </p:spPr>

</xml_diff>